<commit_message>
Setup initial backend structure
</commit_message>
<xml_diff>
--- a/presentation/פרויקט עיצוב התנהגות - מסכים.pptx
+++ b/presentation/פרויקט עיצוב התנהגות - מסכים.pptx
@@ -8,6 +8,14 @@
     <p:sldId id="256" r:id="rId2"/>
     <p:sldId id="257" r:id="rId3"/>
     <p:sldId id="258" r:id="rId4"/>
+    <p:sldId id="259" r:id="rId5"/>
+    <p:sldId id="260" r:id="rId6"/>
+    <p:sldId id="261" r:id="rId7"/>
+    <p:sldId id="262" r:id="rId8"/>
+    <p:sldId id="263" r:id="rId9"/>
+    <p:sldId id="264" r:id="rId10"/>
+    <p:sldId id="265" r:id="rId11"/>
+    <p:sldId id="266" r:id="rId12"/>
   </p:sldIdLst>
   <p:sldSz cx="12192000" cy="6858000"/>
   <p:notesSz cx="6858000" cy="9144000"/>
@@ -106,6 +114,11 @@
       </a:defRPr>
     </a:lvl9pPr>
   </p:defaultTextStyle>
+  <p:extLst>
+    <p:ext uri="{EFAFB233-063F-42B5-8137-9DF3F51BA10A}">
+      <p15:sldGuideLst xmlns:p15="http://schemas.microsoft.com/office/powerpoint/2012/main"/>
+    </p:ext>
+  </p:extLst>
 </p:presentation>
 </file>
 
@@ -256,7 +269,7 @@
           <a:p>
             <a:fld id="{1FFCD2AE-C8D6-4C5C-8058-C519C73E84B5}" type="datetimeFigureOut">
               <a:rPr lang="he-IL" smtClean="0"/>
-              <a:t>י"ז/חשון/תשפ"ו</a:t>
+              <a:t>ז'/כסלו/תשפ"ו</a:t>
             </a:fld>
             <a:endParaRPr lang="he-IL"/>
           </a:p>
@@ -454,7 +467,7 @@
           <a:p>
             <a:fld id="{1FFCD2AE-C8D6-4C5C-8058-C519C73E84B5}" type="datetimeFigureOut">
               <a:rPr lang="he-IL" smtClean="0"/>
-              <a:t>י"ז/חשון/תשפ"ו</a:t>
+              <a:t>ז'/כסלו/תשפ"ו</a:t>
             </a:fld>
             <a:endParaRPr lang="he-IL"/>
           </a:p>
@@ -662,7 +675,7 @@
           <a:p>
             <a:fld id="{1FFCD2AE-C8D6-4C5C-8058-C519C73E84B5}" type="datetimeFigureOut">
               <a:rPr lang="he-IL" smtClean="0"/>
-              <a:t>י"ז/חשון/תשפ"ו</a:t>
+              <a:t>ז'/כסלו/תשפ"ו</a:t>
             </a:fld>
             <a:endParaRPr lang="he-IL"/>
           </a:p>
@@ -860,7 +873,7 @@
           <a:p>
             <a:fld id="{1FFCD2AE-C8D6-4C5C-8058-C519C73E84B5}" type="datetimeFigureOut">
               <a:rPr lang="he-IL" smtClean="0"/>
-              <a:t>י"ז/חשון/תשפ"ו</a:t>
+              <a:t>ז'/כסלו/תשפ"ו</a:t>
             </a:fld>
             <a:endParaRPr lang="he-IL"/>
           </a:p>
@@ -1135,7 +1148,7 @@
           <a:p>
             <a:fld id="{1FFCD2AE-C8D6-4C5C-8058-C519C73E84B5}" type="datetimeFigureOut">
               <a:rPr lang="he-IL" smtClean="0"/>
-              <a:t>י"ז/חשון/תשפ"ו</a:t>
+              <a:t>ז'/כסלו/תשפ"ו</a:t>
             </a:fld>
             <a:endParaRPr lang="he-IL"/>
           </a:p>
@@ -1400,7 +1413,7 @@
           <a:p>
             <a:fld id="{1FFCD2AE-C8D6-4C5C-8058-C519C73E84B5}" type="datetimeFigureOut">
               <a:rPr lang="he-IL" smtClean="0"/>
-              <a:t>י"ז/חשון/תשפ"ו</a:t>
+              <a:t>ז'/כסלו/תשפ"ו</a:t>
             </a:fld>
             <a:endParaRPr lang="he-IL"/>
           </a:p>
@@ -1812,7 +1825,7 @@
           <a:p>
             <a:fld id="{1FFCD2AE-C8D6-4C5C-8058-C519C73E84B5}" type="datetimeFigureOut">
               <a:rPr lang="he-IL" smtClean="0"/>
-              <a:t>י"ז/חשון/תשפ"ו</a:t>
+              <a:t>ז'/כסלו/תשפ"ו</a:t>
             </a:fld>
             <a:endParaRPr lang="he-IL"/>
           </a:p>
@@ -1953,7 +1966,7 @@
           <a:p>
             <a:fld id="{1FFCD2AE-C8D6-4C5C-8058-C519C73E84B5}" type="datetimeFigureOut">
               <a:rPr lang="he-IL" smtClean="0"/>
-              <a:t>י"ז/חשון/תשפ"ו</a:t>
+              <a:t>ז'/כסלו/תשפ"ו</a:t>
             </a:fld>
             <a:endParaRPr lang="he-IL"/>
           </a:p>
@@ -2066,7 +2079,7 @@
           <a:p>
             <a:fld id="{1FFCD2AE-C8D6-4C5C-8058-C519C73E84B5}" type="datetimeFigureOut">
               <a:rPr lang="he-IL" smtClean="0"/>
-              <a:t>י"ז/חשון/תשפ"ו</a:t>
+              <a:t>ז'/כסלו/תשפ"ו</a:t>
             </a:fld>
             <a:endParaRPr lang="he-IL"/>
           </a:p>
@@ -2377,7 +2390,7 @@
           <a:p>
             <a:fld id="{1FFCD2AE-C8D6-4C5C-8058-C519C73E84B5}" type="datetimeFigureOut">
               <a:rPr lang="he-IL" smtClean="0"/>
-              <a:t>י"ז/חשון/תשפ"ו</a:t>
+              <a:t>ז'/כסלו/תשפ"ו</a:t>
             </a:fld>
             <a:endParaRPr lang="he-IL"/>
           </a:p>
@@ -2665,7 +2678,7 @@
           <a:p>
             <a:fld id="{1FFCD2AE-C8D6-4C5C-8058-C519C73E84B5}" type="datetimeFigureOut">
               <a:rPr lang="he-IL" smtClean="0"/>
-              <a:t>י"ז/חשון/תשפ"ו</a:t>
+              <a:t>ז'/כסלו/תשפ"ו</a:t>
             </a:fld>
             <a:endParaRPr lang="he-IL"/>
           </a:p>
@@ -2906,7 +2919,7 @@
           <a:p>
             <a:fld id="{1FFCD2AE-C8D6-4C5C-8058-C519C73E84B5}" type="datetimeFigureOut">
               <a:rPr lang="he-IL" smtClean="0"/>
-              <a:t>י"ז/חשון/תשפ"ו</a:t>
+              <a:t>ז'/כסלו/תשפ"ו</a:t>
             </a:fld>
             <a:endParaRPr lang="he-IL"/>
           </a:p>
@@ -3428,6 +3441,1765 @@
 </p:sld>
 </file>
 
+<file path=ppt/slides/slide10.xml><?xml version="1.0" encoding="utf-8"?>
+<p:sld xmlns:a="http://schemas.openxmlformats.org/drawingml/2006/main" xmlns:r="http://schemas.openxmlformats.org/officeDocument/2006/relationships" xmlns:p="http://schemas.openxmlformats.org/presentationml/2006/main">
+  <p:cSld>
+    <p:spTree>
+      <p:nvGrpSpPr>
+        <p:cNvPr id="1" name=""/>
+        <p:cNvGrpSpPr/>
+        <p:nvPr/>
+      </p:nvGrpSpPr>
+      <p:grpSpPr>
+        <a:xfrm>
+          <a:off x="0" y="0"/>
+          <a:ext cx="0" cy="0"/>
+          <a:chOff x="0" y="0"/>
+          <a:chExt cx="0" cy="0"/>
+        </a:xfrm>
+      </p:grpSpPr>
+      <p:sp>
+        <p:nvSpPr>
+          <p:cNvPr id="2" name="כותרת 1">
+            <a:extLst>
+              <a:ext uri="{FF2B5EF4-FFF2-40B4-BE49-F238E27FC236}">
+                <a16:creationId xmlns:a16="http://schemas.microsoft.com/office/drawing/2014/main" id="{20506D07-20CE-0926-DCCB-18C9312D022E}"/>
+              </a:ext>
+            </a:extLst>
+          </p:cNvPr>
+          <p:cNvSpPr>
+            <a:spLocks noGrp="1"/>
+          </p:cNvSpPr>
+          <p:nvPr>
+            <p:ph type="title"/>
+          </p:nvPr>
+        </p:nvSpPr>
+        <p:spPr>
+          <a:xfrm>
+            <a:off x="838200" y="3032910"/>
+            <a:ext cx="10515600" cy="1325563"/>
+          </a:xfrm>
+        </p:spPr>
+        <p:txBody>
+          <a:bodyPr>
+            <a:normAutofit/>
+          </a:bodyPr>
+          <a:lstStyle/>
+          <a:p>
+            <a:pPr algn="ctr"/>
+            <a:r>
+              <a:rPr lang="he-IL" sz="4800" dirty="0"/>
+              <a:t>תודה רבה !</a:t>
+            </a:r>
+          </a:p>
+        </p:txBody>
+      </p:sp>
+      <p:pic>
+        <p:nvPicPr>
+          <p:cNvPr id="4" name="תמונה 3">
+            <a:extLst>
+              <a:ext uri="{FF2B5EF4-FFF2-40B4-BE49-F238E27FC236}">
+                <a16:creationId xmlns:a16="http://schemas.microsoft.com/office/drawing/2014/main" id="{4F9EF8B7-6A9F-B447-B80C-15D9F1A2BB58}"/>
+              </a:ext>
+            </a:extLst>
+          </p:cNvPr>
+          <p:cNvPicPr>
+            <a:picLocks noChangeAspect="1"/>
+          </p:cNvPicPr>
+          <p:nvPr/>
+        </p:nvPicPr>
+        <p:blipFill>
+          <a:blip r:embed="rId2">
+            <a:extLst>
+              <a:ext uri="{28A0092B-C50C-407E-A947-70E740481C1C}">
+                <a14:useLocalDpi xmlns:a14="http://schemas.microsoft.com/office/drawing/2010/main" val="0"/>
+              </a:ext>
+            </a:extLst>
+          </a:blip>
+          <a:stretch>
+            <a:fillRect/>
+          </a:stretch>
+        </p:blipFill>
+        <p:spPr>
+          <a:xfrm>
+            <a:off x="0" y="-873558"/>
+            <a:ext cx="3656804" cy="3899767"/>
+          </a:xfrm>
+          <a:prstGeom prst="rect">
+            <a:avLst/>
+          </a:prstGeom>
+        </p:spPr>
+      </p:pic>
+    </p:spTree>
+    <p:extLst>
+      <p:ext uri="{BB962C8B-B14F-4D97-AF65-F5344CB8AC3E}">
+        <p14:creationId xmlns:p14="http://schemas.microsoft.com/office/powerpoint/2010/main" val="1204733904"/>
+      </p:ext>
+    </p:extLst>
+  </p:cSld>
+  <p:clrMapOvr>
+    <a:masterClrMapping/>
+  </p:clrMapOvr>
+</p:sld>
+</file>
+
+<file path=ppt/slides/slide11.xml><?xml version="1.0" encoding="utf-8"?>
+<p:sld xmlns:a="http://schemas.openxmlformats.org/drawingml/2006/main" xmlns:r="http://schemas.openxmlformats.org/officeDocument/2006/relationships" xmlns:p="http://schemas.openxmlformats.org/presentationml/2006/main">
+  <p:cSld>
+    <p:spTree>
+      <p:nvGrpSpPr>
+        <p:cNvPr id="1" name=""/>
+        <p:cNvGrpSpPr/>
+        <p:nvPr/>
+      </p:nvGrpSpPr>
+      <p:grpSpPr>
+        <a:xfrm>
+          <a:off x="0" y="0"/>
+          <a:ext cx="0" cy="0"/>
+          <a:chOff x="0" y="0"/>
+          <a:chExt cx="0" cy="0"/>
+        </a:xfrm>
+      </p:grpSpPr>
+      <p:sp>
+        <p:nvSpPr>
+          <p:cNvPr id="6" name="מלבן 5">
+            <a:extLst>
+              <a:ext uri="{FF2B5EF4-FFF2-40B4-BE49-F238E27FC236}">
+                <a16:creationId xmlns:a16="http://schemas.microsoft.com/office/drawing/2014/main" id="{0558B633-D71C-4C7C-291F-FED7F61B21B1}"/>
+              </a:ext>
+            </a:extLst>
+          </p:cNvPr>
+          <p:cNvSpPr/>
+          <p:nvPr/>
+        </p:nvSpPr>
+        <p:spPr>
+          <a:xfrm>
+            <a:off x="5486400" y="84841"/>
+            <a:ext cx="1857080" cy="678730"/>
+          </a:xfrm>
+          <a:prstGeom prst="rect">
+            <a:avLst/>
+          </a:prstGeom>
+          <a:solidFill>
+            <a:schemeClr val="accent5">
+              <a:lumMod val="20000"/>
+              <a:lumOff val="80000"/>
+            </a:schemeClr>
+          </a:solidFill>
+          <a:ln>
+            <a:solidFill>
+              <a:schemeClr val="tx1"/>
+            </a:solidFill>
+          </a:ln>
+        </p:spPr>
+        <p:style>
+          <a:lnRef idx="2">
+            <a:schemeClr val="accent1">
+              <a:shade val="15000"/>
+            </a:schemeClr>
+          </a:lnRef>
+          <a:fillRef idx="1">
+            <a:schemeClr val="accent1"/>
+          </a:fillRef>
+          <a:effectRef idx="0">
+            <a:schemeClr val="accent1"/>
+          </a:effectRef>
+          <a:fontRef idx="minor">
+            <a:schemeClr val="lt1"/>
+          </a:fontRef>
+        </p:style>
+        <p:txBody>
+          <a:bodyPr rtlCol="1" anchor="ctr"/>
+          <a:lstStyle/>
+          <a:p>
+            <a:pPr algn="ctr"/>
+            <a:endParaRPr lang="he-IL"/>
+          </a:p>
+        </p:txBody>
+      </p:sp>
+      <p:sp>
+        <p:nvSpPr>
+          <p:cNvPr id="7" name="מלבן 6">
+            <a:extLst>
+              <a:ext uri="{FF2B5EF4-FFF2-40B4-BE49-F238E27FC236}">
+                <a16:creationId xmlns:a16="http://schemas.microsoft.com/office/drawing/2014/main" id="{D07F6B8E-6076-A314-CC4A-971653C0E912}"/>
+              </a:ext>
+            </a:extLst>
+          </p:cNvPr>
+          <p:cNvSpPr/>
+          <p:nvPr/>
+        </p:nvSpPr>
+        <p:spPr>
+          <a:xfrm>
+            <a:off x="5577210" y="254929"/>
+            <a:ext cx="1675459" cy="338554"/>
+          </a:xfrm>
+          <a:prstGeom prst="rect">
+            <a:avLst/>
+          </a:prstGeom>
+          <a:noFill/>
+        </p:spPr>
+        <p:txBody>
+          <a:bodyPr wrap="none" lIns="91440" tIns="45720" rIns="91440" bIns="45720">
+            <a:spAutoFit/>
+          </a:bodyPr>
+          <a:lstStyle/>
+          <a:p>
+            <a:pPr algn="ctr"/>
+            <a:r>
+              <a:rPr lang="he-IL" sz="1600" b="0" cap="none" spc="0" dirty="0">
+                <a:ln w="0"/>
+                <a:solidFill>
+                  <a:schemeClr val="tx1"/>
+                </a:solidFill>
+                <a:effectLst>
+                  <a:outerShdw blurRad="38100" dist="19050" dir="2700000" algn="tl" rotWithShape="0">
+                    <a:schemeClr val="dk1">
+                      <a:alpha val="40000"/>
+                    </a:schemeClr>
+                  </a:outerShdw>
+                </a:effectLst>
+              </a:rPr>
+              <a:t>התחברות למערכת</a:t>
+            </a:r>
+          </a:p>
+        </p:txBody>
+      </p:sp>
+      <p:cxnSp>
+        <p:nvCxnSpPr>
+          <p:cNvPr id="9" name="מחבר חץ ישר 8">
+            <a:extLst>
+              <a:ext uri="{FF2B5EF4-FFF2-40B4-BE49-F238E27FC236}">
+                <a16:creationId xmlns:a16="http://schemas.microsoft.com/office/drawing/2014/main" id="{5995E033-F89A-204F-A7AA-8DB60147C26F}"/>
+              </a:ext>
+            </a:extLst>
+          </p:cNvPr>
+          <p:cNvCxnSpPr>
+            <a:cxnSpLocks/>
+          </p:cNvCxnSpPr>
+          <p:nvPr/>
+        </p:nvCxnSpPr>
+        <p:spPr>
+          <a:xfrm flipH="1">
+            <a:off x="2403835" y="763571"/>
+            <a:ext cx="3692165" cy="367645"/>
+          </a:xfrm>
+          <a:prstGeom prst="straightConnector1">
+            <a:avLst/>
+          </a:prstGeom>
+          <a:ln>
+            <a:solidFill>
+              <a:schemeClr val="tx1"/>
+            </a:solidFill>
+            <a:headEnd type="triangle"/>
+            <a:tailEnd type="triangle"/>
+          </a:ln>
+        </p:spPr>
+        <p:style>
+          <a:lnRef idx="1">
+            <a:schemeClr val="accent1"/>
+          </a:lnRef>
+          <a:fillRef idx="0">
+            <a:schemeClr val="accent1"/>
+          </a:fillRef>
+          <a:effectRef idx="0">
+            <a:schemeClr val="accent1"/>
+          </a:effectRef>
+          <a:fontRef idx="minor">
+            <a:schemeClr val="tx1"/>
+          </a:fontRef>
+        </p:style>
+      </p:cxnSp>
+      <p:cxnSp>
+        <p:nvCxnSpPr>
+          <p:cNvPr id="10" name="מחבר חץ ישר 9">
+            <a:extLst>
+              <a:ext uri="{FF2B5EF4-FFF2-40B4-BE49-F238E27FC236}">
+                <a16:creationId xmlns:a16="http://schemas.microsoft.com/office/drawing/2014/main" id="{718119C5-4C65-EC7C-08C3-E3E47EC01517}"/>
+              </a:ext>
+            </a:extLst>
+          </p:cNvPr>
+          <p:cNvCxnSpPr>
+            <a:cxnSpLocks/>
+          </p:cNvCxnSpPr>
+          <p:nvPr/>
+        </p:nvCxnSpPr>
+        <p:spPr>
+          <a:xfrm>
+            <a:off x="6429079" y="763571"/>
+            <a:ext cx="0" cy="367645"/>
+          </a:xfrm>
+          <a:prstGeom prst="straightConnector1">
+            <a:avLst/>
+          </a:prstGeom>
+          <a:ln>
+            <a:solidFill>
+              <a:schemeClr val="tx1"/>
+            </a:solidFill>
+            <a:headEnd type="triangle"/>
+            <a:tailEnd type="triangle"/>
+          </a:ln>
+        </p:spPr>
+        <p:style>
+          <a:lnRef idx="1">
+            <a:schemeClr val="accent1"/>
+          </a:lnRef>
+          <a:fillRef idx="0">
+            <a:schemeClr val="accent1"/>
+          </a:fillRef>
+          <a:effectRef idx="0">
+            <a:schemeClr val="accent1"/>
+          </a:effectRef>
+          <a:fontRef idx="minor">
+            <a:schemeClr val="tx1"/>
+          </a:fontRef>
+        </p:style>
+      </p:cxnSp>
+      <p:cxnSp>
+        <p:nvCxnSpPr>
+          <p:cNvPr id="15" name="מחבר חץ ישר 14">
+            <a:extLst>
+              <a:ext uri="{FF2B5EF4-FFF2-40B4-BE49-F238E27FC236}">
+                <a16:creationId xmlns:a16="http://schemas.microsoft.com/office/drawing/2014/main" id="{C528C623-9414-B3E0-B94D-2568DD3562B6}"/>
+              </a:ext>
+            </a:extLst>
+          </p:cNvPr>
+          <p:cNvCxnSpPr>
+            <a:cxnSpLocks/>
+          </p:cNvCxnSpPr>
+          <p:nvPr/>
+        </p:nvCxnSpPr>
+        <p:spPr>
+          <a:xfrm flipH="1" flipV="1">
+            <a:off x="6698529" y="784577"/>
+            <a:ext cx="3557440" cy="346639"/>
+          </a:xfrm>
+          <a:prstGeom prst="straightConnector1">
+            <a:avLst/>
+          </a:prstGeom>
+          <a:ln>
+            <a:solidFill>
+              <a:schemeClr val="tx1"/>
+            </a:solidFill>
+            <a:headEnd type="triangle"/>
+            <a:tailEnd type="triangle"/>
+          </a:ln>
+        </p:spPr>
+        <p:style>
+          <a:lnRef idx="1">
+            <a:schemeClr val="accent1"/>
+          </a:lnRef>
+          <a:fillRef idx="0">
+            <a:schemeClr val="accent1"/>
+          </a:fillRef>
+          <a:effectRef idx="0">
+            <a:schemeClr val="accent1"/>
+          </a:effectRef>
+          <a:fontRef idx="minor">
+            <a:schemeClr val="tx1"/>
+          </a:fontRef>
+        </p:style>
+      </p:cxnSp>
+      <p:sp>
+        <p:nvSpPr>
+          <p:cNvPr id="18" name="מלבן 17">
+            <a:extLst>
+              <a:ext uri="{FF2B5EF4-FFF2-40B4-BE49-F238E27FC236}">
+                <a16:creationId xmlns:a16="http://schemas.microsoft.com/office/drawing/2014/main" id="{01028E91-B88C-A4D8-E753-80C3864A2F34}"/>
+              </a:ext>
+            </a:extLst>
+          </p:cNvPr>
+          <p:cNvSpPr/>
+          <p:nvPr/>
+        </p:nvSpPr>
+        <p:spPr>
+          <a:xfrm>
+            <a:off x="9954705" y="1131216"/>
+            <a:ext cx="1538140" cy="471341"/>
+          </a:xfrm>
+          <a:prstGeom prst="rect">
+            <a:avLst/>
+          </a:prstGeom>
+          <a:solidFill>
+            <a:schemeClr val="accent6">
+              <a:lumMod val="60000"/>
+              <a:lumOff val="40000"/>
+            </a:schemeClr>
+          </a:solidFill>
+          <a:ln>
+            <a:solidFill>
+              <a:schemeClr val="tx1"/>
+            </a:solidFill>
+          </a:ln>
+        </p:spPr>
+        <p:style>
+          <a:lnRef idx="2">
+            <a:schemeClr val="accent1">
+              <a:shade val="15000"/>
+            </a:schemeClr>
+          </a:lnRef>
+          <a:fillRef idx="1">
+            <a:schemeClr val="accent1"/>
+          </a:fillRef>
+          <a:effectRef idx="0">
+            <a:schemeClr val="accent1"/>
+          </a:effectRef>
+          <a:fontRef idx="minor">
+            <a:schemeClr val="lt1"/>
+          </a:fontRef>
+        </p:style>
+        <p:txBody>
+          <a:bodyPr rtlCol="1" anchor="ctr"/>
+          <a:lstStyle/>
+          <a:p>
+            <a:pPr algn="ctr"/>
+            <a:endParaRPr lang="he-IL"/>
+          </a:p>
+        </p:txBody>
+      </p:sp>
+      <p:sp>
+        <p:nvSpPr>
+          <p:cNvPr id="19" name="מלבן 18">
+            <a:extLst>
+              <a:ext uri="{FF2B5EF4-FFF2-40B4-BE49-F238E27FC236}">
+                <a16:creationId xmlns:a16="http://schemas.microsoft.com/office/drawing/2014/main" id="{CB609F32-2C63-B79C-7827-E9CAC95A52B9}"/>
+              </a:ext>
+            </a:extLst>
+          </p:cNvPr>
+          <p:cNvSpPr/>
+          <p:nvPr/>
+        </p:nvSpPr>
+        <p:spPr>
+          <a:xfrm>
+            <a:off x="1710934" y="1141984"/>
+            <a:ext cx="1538140" cy="471341"/>
+          </a:xfrm>
+          <a:prstGeom prst="rect">
+            <a:avLst/>
+          </a:prstGeom>
+          <a:solidFill>
+            <a:schemeClr val="accent4">
+              <a:lumMod val="60000"/>
+              <a:lumOff val="40000"/>
+            </a:schemeClr>
+          </a:solidFill>
+          <a:ln>
+            <a:solidFill>
+              <a:schemeClr val="tx1"/>
+            </a:solidFill>
+          </a:ln>
+        </p:spPr>
+        <p:style>
+          <a:lnRef idx="2">
+            <a:schemeClr val="accent1">
+              <a:shade val="15000"/>
+            </a:schemeClr>
+          </a:lnRef>
+          <a:fillRef idx="1">
+            <a:schemeClr val="accent1"/>
+          </a:fillRef>
+          <a:effectRef idx="0">
+            <a:schemeClr val="accent1"/>
+          </a:effectRef>
+          <a:fontRef idx="minor">
+            <a:schemeClr val="lt1"/>
+          </a:fontRef>
+        </p:style>
+        <p:txBody>
+          <a:bodyPr rtlCol="1" anchor="ctr"/>
+          <a:lstStyle/>
+          <a:p>
+            <a:pPr algn="ctr"/>
+            <a:endParaRPr lang="he-IL"/>
+          </a:p>
+        </p:txBody>
+      </p:sp>
+      <p:sp>
+        <p:nvSpPr>
+          <p:cNvPr id="20" name="מלבן 19">
+            <a:extLst>
+              <a:ext uri="{FF2B5EF4-FFF2-40B4-BE49-F238E27FC236}">
+                <a16:creationId xmlns:a16="http://schemas.microsoft.com/office/drawing/2014/main" id="{FFDEDADF-CFAE-2F60-E273-BA7D8D14F29B}"/>
+              </a:ext>
+            </a:extLst>
+          </p:cNvPr>
+          <p:cNvSpPr/>
+          <p:nvPr/>
+        </p:nvSpPr>
+        <p:spPr>
+          <a:xfrm>
+            <a:off x="5794735" y="1132557"/>
+            <a:ext cx="1538140" cy="471341"/>
+          </a:xfrm>
+          <a:prstGeom prst="rect">
+            <a:avLst/>
+          </a:prstGeom>
+          <a:solidFill>
+            <a:schemeClr val="accent2">
+              <a:lumMod val="40000"/>
+              <a:lumOff val="60000"/>
+            </a:schemeClr>
+          </a:solidFill>
+          <a:ln>
+            <a:solidFill>
+              <a:schemeClr val="tx1"/>
+            </a:solidFill>
+          </a:ln>
+        </p:spPr>
+        <p:style>
+          <a:lnRef idx="2">
+            <a:schemeClr val="accent1">
+              <a:shade val="15000"/>
+            </a:schemeClr>
+          </a:lnRef>
+          <a:fillRef idx="1">
+            <a:schemeClr val="accent1"/>
+          </a:fillRef>
+          <a:effectRef idx="0">
+            <a:schemeClr val="accent1"/>
+          </a:effectRef>
+          <a:fontRef idx="minor">
+            <a:schemeClr val="lt1"/>
+          </a:fontRef>
+        </p:style>
+        <p:txBody>
+          <a:bodyPr rtlCol="1" anchor="ctr"/>
+          <a:lstStyle/>
+          <a:p>
+            <a:pPr algn="ctr"/>
+            <a:endParaRPr lang="he-IL"/>
+          </a:p>
+        </p:txBody>
+      </p:sp>
+      <p:sp>
+        <p:nvSpPr>
+          <p:cNvPr id="22" name="מלבן 21">
+            <a:extLst>
+              <a:ext uri="{FF2B5EF4-FFF2-40B4-BE49-F238E27FC236}">
+                <a16:creationId xmlns:a16="http://schemas.microsoft.com/office/drawing/2014/main" id="{DAF9FF1D-25C8-DF99-2D58-405CE4B56072}"/>
+              </a:ext>
+            </a:extLst>
+          </p:cNvPr>
+          <p:cNvSpPr/>
+          <p:nvPr/>
+        </p:nvSpPr>
+        <p:spPr>
+          <a:xfrm>
+            <a:off x="10270767" y="1161649"/>
+            <a:ext cx="906018" cy="338554"/>
+          </a:xfrm>
+          <a:prstGeom prst="rect">
+            <a:avLst/>
+          </a:prstGeom>
+          <a:noFill/>
+        </p:spPr>
+        <p:txBody>
+          <a:bodyPr wrap="none" lIns="91440" tIns="45720" rIns="91440" bIns="45720">
+            <a:spAutoFit/>
+          </a:bodyPr>
+          <a:lstStyle/>
+          <a:p>
+            <a:pPr algn="ctr"/>
+            <a:r>
+              <a:rPr lang="he-IL" sz="1600" b="0" cap="none" spc="0" dirty="0">
+                <a:ln w="0"/>
+                <a:solidFill>
+                  <a:schemeClr val="tx1"/>
+                </a:solidFill>
+                <a:effectLst>
+                  <a:outerShdw blurRad="38100" dist="19050" dir="2700000" algn="tl" rotWithShape="0">
+                    <a:schemeClr val="dk1">
+                      <a:alpha val="40000"/>
+                    </a:schemeClr>
+                  </a:outerShdw>
+                </a:effectLst>
+              </a:rPr>
+              <a:t>צד מורות</a:t>
+            </a:r>
+          </a:p>
+        </p:txBody>
+      </p:sp>
+      <p:sp>
+        <p:nvSpPr>
+          <p:cNvPr id="23" name="מלבן 22">
+            <a:extLst>
+              <a:ext uri="{FF2B5EF4-FFF2-40B4-BE49-F238E27FC236}">
+                <a16:creationId xmlns:a16="http://schemas.microsoft.com/office/drawing/2014/main" id="{384F41DF-960A-2766-B7D5-3E330E0D0736}"/>
+              </a:ext>
+            </a:extLst>
+          </p:cNvPr>
+          <p:cNvSpPr/>
+          <p:nvPr/>
+        </p:nvSpPr>
+        <p:spPr>
+          <a:xfrm>
+            <a:off x="5974478" y="1188359"/>
+            <a:ext cx="1132041" cy="338554"/>
+          </a:xfrm>
+          <a:prstGeom prst="rect">
+            <a:avLst/>
+          </a:prstGeom>
+          <a:noFill/>
+        </p:spPr>
+        <p:txBody>
+          <a:bodyPr wrap="none" lIns="91440" tIns="45720" rIns="91440" bIns="45720">
+            <a:spAutoFit/>
+          </a:bodyPr>
+          <a:lstStyle/>
+          <a:p>
+            <a:pPr algn="ctr"/>
+            <a:r>
+              <a:rPr lang="he-IL" sz="1600" b="0" cap="none" spc="0" dirty="0">
+                <a:ln w="0"/>
+                <a:solidFill>
+                  <a:schemeClr val="tx1"/>
+                </a:solidFill>
+                <a:effectLst>
+                  <a:outerShdw blurRad="38100" dist="19050" dir="2700000" algn="tl" rotWithShape="0">
+                    <a:schemeClr val="dk1">
+                      <a:alpha val="40000"/>
+                    </a:schemeClr>
+                  </a:outerShdw>
+                </a:effectLst>
+              </a:rPr>
+              <a:t>צד תלמידות</a:t>
+            </a:r>
+          </a:p>
+        </p:txBody>
+      </p:sp>
+      <p:sp>
+        <p:nvSpPr>
+          <p:cNvPr id="24" name="מלבן 23">
+            <a:extLst>
+              <a:ext uri="{FF2B5EF4-FFF2-40B4-BE49-F238E27FC236}">
+                <a16:creationId xmlns:a16="http://schemas.microsoft.com/office/drawing/2014/main" id="{06D7706E-4422-2808-A1E8-22C828A08854}"/>
+              </a:ext>
+            </a:extLst>
+          </p:cNvPr>
+          <p:cNvSpPr/>
+          <p:nvPr/>
+        </p:nvSpPr>
+        <p:spPr>
+          <a:xfrm>
+            <a:off x="1656971" y="1191500"/>
+            <a:ext cx="1592103" cy="338554"/>
+          </a:xfrm>
+          <a:prstGeom prst="rect">
+            <a:avLst/>
+          </a:prstGeom>
+          <a:noFill/>
+        </p:spPr>
+        <p:txBody>
+          <a:bodyPr wrap="none" lIns="91440" tIns="45720" rIns="91440" bIns="45720">
+            <a:spAutoFit/>
+          </a:bodyPr>
+          <a:lstStyle/>
+          <a:p>
+            <a:pPr algn="ctr"/>
+            <a:r>
+              <a:rPr lang="he-IL" sz="1600" b="0" cap="none" spc="0" dirty="0">
+                <a:ln w="0"/>
+                <a:solidFill>
+                  <a:schemeClr val="tx1"/>
+                </a:solidFill>
+                <a:effectLst>
+                  <a:outerShdw blurRad="38100" dist="19050" dir="2700000" algn="tl" rotWithShape="0">
+                    <a:schemeClr val="dk1">
+                      <a:alpha val="40000"/>
+                    </a:schemeClr>
+                  </a:outerShdw>
+                </a:effectLst>
+              </a:rPr>
+              <a:t>צד ניהולי - עתידני</a:t>
+            </a:r>
+          </a:p>
+        </p:txBody>
+      </p:sp>
+      <p:sp>
+        <p:nvSpPr>
+          <p:cNvPr id="25" name="מלבן 24">
+            <a:extLst>
+              <a:ext uri="{FF2B5EF4-FFF2-40B4-BE49-F238E27FC236}">
+                <a16:creationId xmlns:a16="http://schemas.microsoft.com/office/drawing/2014/main" id="{B4B5CE69-CD25-455D-B11D-61DE4AA46088}"/>
+              </a:ext>
+            </a:extLst>
+          </p:cNvPr>
+          <p:cNvSpPr/>
+          <p:nvPr/>
+        </p:nvSpPr>
+        <p:spPr>
+          <a:xfrm>
+            <a:off x="10159999" y="1847654"/>
+            <a:ext cx="1027523" cy="1206631"/>
+          </a:xfrm>
+          <a:prstGeom prst="rect">
+            <a:avLst/>
+          </a:prstGeom>
+          <a:solidFill>
+            <a:schemeClr val="accent6">
+              <a:lumMod val="60000"/>
+              <a:lumOff val="40000"/>
+            </a:schemeClr>
+          </a:solidFill>
+        </p:spPr>
+        <p:style>
+          <a:lnRef idx="2">
+            <a:schemeClr val="accent1">
+              <a:shade val="15000"/>
+            </a:schemeClr>
+          </a:lnRef>
+          <a:fillRef idx="1">
+            <a:schemeClr val="accent1"/>
+          </a:fillRef>
+          <a:effectRef idx="0">
+            <a:schemeClr val="accent1"/>
+          </a:effectRef>
+          <a:fontRef idx="minor">
+            <a:schemeClr val="lt1"/>
+          </a:fontRef>
+        </p:style>
+        <p:txBody>
+          <a:bodyPr rtlCol="1" anchor="ctr"/>
+          <a:lstStyle/>
+          <a:p>
+            <a:pPr algn="ctr"/>
+            <a:endParaRPr lang="he-IL"/>
+          </a:p>
+        </p:txBody>
+      </p:sp>
+      <p:sp>
+        <p:nvSpPr>
+          <p:cNvPr id="27" name="מלבן 26">
+            <a:extLst>
+              <a:ext uri="{FF2B5EF4-FFF2-40B4-BE49-F238E27FC236}">
+                <a16:creationId xmlns:a16="http://schemas.microsoft.com/office/drawing/2014/main" id="{12DB0C52-B78F-25CA-9C87-E37880CD430A}"/>
+              </a:ext>
+            </a:extLst>
+          </p:cNvPr>
+          <p:cNvSpPr/>
+          <p:nvPr/>
+        </p:nvSpPr>
+        <p:spPr>
+          <a:xfrm>
+            <a:off x="10157905" y="3271100"/>
+            <a:ext cx="1027523" cy="1206631"/>
+          </a:xfrm>
+          <a:prstGeom prst="rect">
+            <a:avLst/>
+          </a:prstGeom>
+          <a:solidFill>
+            <a:schemeClr val="accent6">
+              <a:lumMod val="60000"/>
+              <a:lumOff val="40000"/>
+            </a:schemeClr>
+          </a:solidFill>
+        </p:spPr>
+        <p:style>
+          <a:lnRef idx="2">
+            <a:schemeClr val="accent1">
+              <a:shade val="15000"/>
+            </a:schemeClr>
+          </a:lnRef>
+          <a:fillRef idx="1">
+            <a:schemeClr val="accent1"/>
+          </a:fillRef>
+          <a:effectRef idx="0">
+            <a:schemeClr val="accent1"/>
+          </a:effectRef>
+          <a:fontRef idx="minor">
+            <a:schemeClr val="lt1"/>
+          </a:fontRef>
+        </p:style>
+        <p:txBody>
+          <a:bodyPr rtlCol="1" anchor="ctr"/>
+          <a:lstStyle/>
+          <a:p>
+            <a:pPr algn="ctr"/>
+            <a:endParaRPr lang="he-IL"/>
+          </a:p>
+        </p:txBody>
+      </p:sp>
+      <p:cxnSp>
+        <p:nvCxnSpPr>
+          <p:cNvPr id="29" name="מחבר חץ ישר 28">
+            <a:extLst>
+              <a:ext uri="{FF2B5EF4-FFF2-40B4-BE49-F238E27FC236}">
+                <a16:creationId xmlns:a16="http://schemas.microsoft.com/office/drawing/2014/main" id="{A5390356-98EA-0ACA-239C-A2D2B8701CEA}"/>
+              </a:ext>
+            </a:extLst>
+          </p:cNvPr>
+          <p:cNvCxnSpPr>
+            <a:cxnSpLocks/>
+          </p:cNvCxnSpPr>
+          <p:nvPr/>
+        </p:nvCxnSpPr>
+        <p:spPr>
+          <a:xfrm>
+            <a:off x="10683187" y="1602558"/>
+            <a:ext cx="0" cy="245096"/>
+          </a:xfrm>
+          <a:prstGeom prst="straightConnector1">
+            <a:avLst/>
+          </a:prstGeom>
+          <a:ln>
+            <a:solidFill>
+              <a:schemeClr val="tx1"/>
+            </a:solidFill>
+            <a:headEnd type="triangle"/>
+            <a:tailEnd type="triangle"/>
+          </a:ln>
+        </p:spPr>
+        <p:style>
+          <a:lnRef idx="1">
+            <a:schemeClr val="accent1"/>
+          </a:lnRef>
+          <a:fillRef idx="0">
+            <a:schemeClr val="accent1"/>
+          </a:fillRef>
+          <a:effectRef idx="0">
+            <a:schemeClr val="accent1"/>
+          </a:effectRef>
+          <a:fontRef idx="minor">
+            <a:schemeClr val="tx1"/>
+          </a:fontRef>
+        </p:style>
+      </p:cxnSp>
+      <p:sp>
+        <p:nvSpPr>
+          <p:cNvPr id="32" name="מלבן 31">
+            <a:extLst>
+              <a:ext uri="{FF2B5EF4-FFF2-40B4-BE49-F238E27FC236}">
+                <a16:creationId xmlns:a16="http://schemas.microsoft.com/office/drawing/2014/main" id="{0542C143-EC34-1F4B-94E7-BF1E1AA1AB69}"/>
+              </a:ext>
+            </a:extLst>
+          </p:cNvPr>
+          <p:cNvSpPr/>
+          <p:nvPr/>
+        </p:nvSpPr>
+        <p:spPr>
+          <a:xfrm>
+            <a:off x="10169425" y="2073898"/>
+            <a:ext cx="1027523" cy="584775"/>
+          </a:xfrm>
+          <a:prstGeom prst="rect">
+            <a:avLst/>
+          </a:prstGeom>
+          <a:noFill/>
+        </p:spPr>
+        <p:txBody>
+          <a:bodyPr wrap="square" lIns="91440" tIns="45720" rIns="91440" bIns="45720">
+            <a:spAutoFit/>
+          </a:bodyPr>
+          <a:lstStyle/>
+          <a:p>
+            <a:pPr algn="ctr"/>
+            <a:r>
+              <a:rPr lang="he-IL" sz="1600" b="0" cap="none" spc="0" dirty="0">
+                <a:ln w="0"/>
+                <a:solidFill>
+                  <a:schemeClr val="tx1"/>
+                </a:solidFill>
+                <a:effectLst>
+                  <a:outerShdw blurRad="38100" dist="19050" dir="2700000" algn="tl" rotWithShape="0">
+                    <a:schemeClr val="dk1">
+                      <a:alpha val="40000"/>
+                    </a:schemeClr>
+                  </a:outerShdw>
+                </a:effectLst>
+              </a:rPr>
+              <a:t>מצב כלל התלמידות</a:t>
+            </a:r>
+          </a:p>
+        </p:txBody>
+      </p:sp>
+      <p:sp>
+        <p:nvSpPr>
+          <p:cNvPr id="33" name="מלבן 32">
+            <a:extLst>
+              <a:ext uri="{FF2B5EF4-FFF2-40B4-BE49-F238E27FC236}">
+                <a16:creationId xmlns:a16="http://schemas.microsoft.com/office/drawing/2014/main" id="{CA4ECD22-A71E-AA58-B681-5AA875756124}"/>
+              </a:ext>
+            </a:extLst>
+          </p:cNvPr>
+          <p:cNvSpPr/>
+          <p:nvPr/>
+        </p:nvSpPr>
+        <p:spPr>
+          <a:xfrm>
+            <a:off x="10157905" y="3335806"/>
+            <a:ext cx="1027523" cy="1077218"/>
+          </a:xfrm>
+          <a:prstGeom prst="rect">
+            <a:avLst/>
+          </a:prstGeom>
+          <a:noFill/>
+        </p:spPr>
+        <p:txBody>
+          <a:bodyPr wrap="square" lIns="91440" tIns="45720" rIns="91440" bIns="45720">
+            <a:spAutoFit/>
+          </a:bodyPr>
+          <a:lstStyle/>
+          <a:p>
+            <a:pPr algn="ctr"/>
+            <a:r>
+              <a:rPr lang="he-IL" sz="1600" b="0" cap="none" spc="0" dirty="0">
+                <a:ln w="0"/>
+                <a:solidFill>
+                  <a:schemeClr val="tx1"/>
+                </a:solidFill>
+                <a:effectLst>
+                  <a:outerShdw blurRad="38100" dist="19050" dir="2700000" algn="tl" rotWithShape="0">
+                    <a:schemeClr val="dk1">
+                      <a:alpha val="40000"/>
+                    </a:schemeClr>
+                  </a:outerShdw>
+                </a:effectLst>
+              </a:rPr>
+              <a:t>מצב תלמידה + אפשרויות עדכון</a:t>
+            </a:r>
+          </a:p>
+        </p:txBody>
+      </p:sp>
+      <p:cxnSp>
+        <p:nvCxnSpPr>
+          <p:cNvPr id="34" name="מחבר חץ ישר 33">
+            <a:extLst>
+              <a:ext uri="{FF2B5EF4-FFF2-40B4-BE49-F238E27FC236}">
+                <a16:creationId xmlns:a16="http://schemas.microsoft.com/office/drawing/2014/main" id="{4663F16F-A7AD-74DD-7E1F-55F6BEEEF1AD}"/>
+              </a:ext>
+            </a:extLst>
+          </p:cNvPr>
+          <p:cNvCxnSpPr>
+            <a:cxnSpLocks/>
+          </p:cNvCxnSpPr>
+          <p:nvPr/>
+        </p:nvCxnSpPr>
+        <p:spPr>
+          <a:xfrm>
+            <a:off x="10683187" y="3054285"/>
+            <a:ext cx="0" cy="245096"/>
+          </a:xfrm>
+          <a:prstGeom prst="straightConnector1">
+            <a:avLst/>
+          </a:prstGeom>
+          <a:ln>
+            <a:solidFill>
+              <a:schemeClr val="tx1"/>
+            </a:solidFill>
+            <a:headEnd type="triangle"/>
+            <a:tailEnd type="triangle"/>
+          </a:ln>
+        </p:spPr>
+        <p:style>
+          <a:lnRef idx="1">
+            <a:schemeClr val="accent1"/>
+          </a:lnRef>
+          <a:fillRef idx="0">
+            <a:schemeClr val="accent1"/>
+          </a:fillRef>
+          <a:effectRef idx="0">
+            <a:schemeClr val="accent1"/>
+          </a:effectRef>
+          <a:fontRef idx="minor">
+            <a:schemeClr val="tx1"/>
+          </a:fontRef>
+        </p:style>
+      </p:cxnSp>
+      <p:sp>
+        <p:nvSpPr>
+          <p:cNvPr id="35" name="מלבן 34">
+            <a:extLst>
+              <a:ext uri="{FF2B5EF4-FFF2-40B4-BE49-F238E27FC236}">
+                <a16:creationId xmlns:a16="http://schemas.microsoft.com/office/drawing/2014/main" id="{A62736AC-E924-3B93-5CAB-4DAB1001EA39}"/>
+              </a:ext>
+            </a:extLst>
+          </p:cNvPr>
+          <p:cNvSpPr/>
+          <p:nvPr/>
+        </p:nvSpPr>
+        <p:spPr>
+          <a:xfrm>
+            <a:off x="6096000" y="1847654"/>
+            <a:ext cx="1027523" cy="1206631"/>
+          </a:xfrm>
+          <a:prstGeom prst="rect">
+            <a:avLst/>
+          </a:prstGeom>
+          <a:solidFill>
+            <a:schemeClr val="accent2">
+              <a:lumMod val="40000"/>
+              <a:lumOff val="60000"/>
+            </a:schemeClr>
+          </a:solidFill>
+        </p:spPr>
+        <p:style>
+          <a:lnRef idx="2">
+            <a:schemeClr val="accent1">
+              <a:shade val="15000"/>
+            </a:schemeClr>
+          </a:lnRef>
+          <a:fillRef idx="1">
+            <a:schemeClr val="accent1"/>
+          </a:fillRef>
+          <a:effectRef idx="0">
+            <a:schemeClr val="accent1"/>
+          </a:effectRef>
+          <a:fontRef idx="minor">
+            <a:schemeClr val="lt1"/>
+          </a:fontRef>
+        </p:style>
+        <p:txBody>
+          <a:bodyPr rtlCol="1" anchor="ctr"/>
+          <a:lstStyle/>
+          <a:p>
+            <a:pPr algn="ctr"/>
+            <a:endParaRPr lang="he-IL" dirty="0"/>
+          </a:p>
+        </p:txBody>
+      </p:sp>
+      <p:sp>
+        <p:nvSpPr>
+          <p:cNvPr id="36" name="מלבן 35">
+            <a:extLst>
+              <a:ext uri="{FF2B5EF4-FFF2-40B4-BE49-F238E27FC236}">
+                <a16:creationId xmlns:a16="http://schemas.microsoft.com/office/drawing/2014/main" id="{F7FFBCAD-B22C-0FD0-7802-41318B3BBF19}"/>
+              </a:ext>
+            </a:extLst>
+          </p:cNvPr>
+          <p:cNvSpPr/>
+          <p:nvPr/>
+        </p:nvSpPr>
+        <p:spPr>
+          <a:xfrm>
+            <a:off x="6130302" y="2073898"/>
+            <a:ext cx="1027523" cy="584775"/>
+          </a:xfrm>
+          <a:prstGeom prst="rect">
+            <a:avLst/>
+          </a:prstGeom>
+          <a:noFill/>
+        </p:spPr>
+        <p:txBody>
+          <a:bodyPr wrap="square" lIns="91440" tIns="45720" rIns="91440" bIns="45720">
+            <a:spAutoFit/>
+          </a:bodyPr>
+          <a:lstStyle/>
+          <a:p>
+            <a:pPr algn="ctr"/>
+            <a:r>
+              <a:rPr lang="he-IL" sz="1600" b="0" cap="none" spc="0" dirty="0">
+                <a:ln w="0"/>
+                <a:solidFill>
+                  <a:schemeClr val="tx1"/>
+                </a:solidFill>
+                <a:effectLst>
+                  <a:outerShdw blurRad="38100" dist="19050" dir="2700000" algn="tl" rotWithShape="0">
+                    <a:schemeClr val="dk1">
+                      <a:alpha val="40000"/>
+                    </a:schemeClr>
+                  </a:outerShdw>
+                </a:effectLst>
+              </a:rPr>
+              <a:t>פרופיל אישי</a:t>
+            </a:r>
+          </a:p>
+        </p:txBody>
+      </p:sp>
+      <p:sp>
+        <p:nvSpPr>
+          <p:cNvPr id="37" name="מלבן 36">
+            <a:extLst>
+              <a:ext uri="{FF2B5EF4-FFF2-40B4-BE49-F238E27FC236}">
+                <a16:creationId xmlns:a16="http://schemas.microsoft.com/office/drawing/2014/main" id="{4106288C-DEE5-68D3-2B94-94150E761F21}"/>
+              </a:ext>
+            </a:extLst>
+          </p:cNvPr>
+          <p:cNvSpPr/>
+          <p:nvPr/>
+        </p:nvSpPr>
+        <p:spPr>
+          <a:xfrm>
+            <a:off x="5577210" y="3298413"/>
+            <a:ext cx="2228184" cy="900915"/>
+          </a:xfrm>
+          <a:prstGeom prst="rect">
+            <a:avLst/>
+          </a:prstGeom>
+          <a:solidFill>
+            <a:schemeClr val="accent2">
+              <a:lumMod val="40000"/>
+              <a:lumOff val="60000"/>
+            </a:schemeClr>
+          </a:solidFill>
+        </p:spPr>
+        <p:style>
+          <a:lnRef idx="2">
+            <a:schemeClr val="accent1">
+              <a:shade val="15000"/>
+            </a:schemeClr>
+          </a:lnRef>
+          <a:fillRef idx="1">
+            <a:schemeClr val="accent1"/>
+          </a:fillRef>
+          <a:effectRef idx="0">
+            <a:schemeClr val="accent1"/>
+          </a:effectRef>
+          <a:fontRef idx="minor">
+            <a:schemeClr val="lt1"/>
+          </a:fontRef>
+        </p:style>
+        <p:txBody>
+          <a:bodyPr rtlCol="1" anchor="ctr"/>
+          <a:lstStyle/>
+          <a:p>
+            <a:pPr algn="ctr"/>
+            <a:endParaRPr lang="he-IL"/>
+          </a:p>
+        </p:txBody>
+      </p:sp>
+      <p:sp>
+        <p:nvSpPr>
+          <p:cNvPr id="39" name="מלבן 38">
+            <a:extLst>
+              <a:ext uri="{FF2B5EF4-FFF2-40B4-BE49-F238E27FC236}">
+                <a16:creationId xmlns:a16="http://schemas.microsoft.com/office/drawing/2014/main" id="{50C5613F-6668-14F8-6E5C-99CD9540CBC1}"/>
+              </a:ext>
+            </a:extLst>
+          </p:cNvPr>
+          <p:cNvSpPr/>
+          <p:nvPr/>
+        </p:nvSpPr>
+        <p:spPr>
+          <a:xfrm>
+            <a:off x="6177540" y="3524285"/>
+            <a:ext cx="1027523" cy="338554"/>
+          </a:xfrm>
+          <a:prstGeom prst="rect">
+            <a:avLst/>
+          </a:prstGeom>
+          <a:noFill/>
+        </p:spPr>
+        <p:txBody>
+          <a:bodyPr wrap="square" lIns="91440" tIns="45720" rIns="91440" bIns="45720">
+            <a:spAutoFit/>
+          </a:bodyPr>
+          <a:lstStyle/>
+          <a:p>
+            <a:pPr algn="ctr"/>
+            <a:r>
+              <a:rPr lang="he-IL" sz="1600" b="0" cap="none" spc="0" dirty="0">
+                <a:ln w="0"/>
+                <a:solidFill>
+                  <a:schemeClr val="tx1"/>
+                </a:solidFill>
+                <a:effectLst>
+                  <a:outerShdw blurRad="38100" dist="19050" dir="2700000" algn="tl" rotWithShape="0">
+                    <a:schemeClr val="dk1">
+                      <a:alpha val="40000"/>
+                    </a:schemeClr>
+                  </a:outerShdw>
+                </a:effectLst>
+              </a:rPr>
+              <a:t>הקיוסק</a:t>
+            </a:r>
+          </a:p>
+        </p:txBody>
+      </p:sp>
+      <p:sp>
+        <p:nvSpPr>
+          <p:cNvPr id="40" name="מלבן 39">
+            <a:extLst>
+              <a:ext uri="{FF2B5EF4-FFF2-40B4-BE49-F238E27FC236}">
+                <a16:creationId xmlns:a16="http://schemas.microsoft.com/office/drawing/2014/main" id="{8BBB2050-855A-D1CA-559C-18E2E2986122}"/>
+              </a:ext>
+            </a:extLst>
+          </p:cNvPr>
+          <p:cNvSpPr/>
+          <p:nvPr/>
+        </p:nvSpPr>
+        <p:spPr>
+          <a:xfrm>
+            <a:off x="6787298" y="4394485"/>
+            <a:ext cx="1027523" cy="1206631"/>
+          </a:xfrm>
+          <a:prstGeom prst="rect">
+            <a:avLst/>
+          </a:prstGeom>
+          <a:solidFill>
+            <a:schemeClr val="accent2">
+              <a:lumMod val="40000"/>
+              <a:lumOff val="60000"/>
+            </a:schemeClr>
+          </a:solidFill>
+        </p:spPr>
+        <p:style>
+          <a:lnRef idx="2">
+            <a:schemeClr val="accent1">
+              <a:shade val="15000"/>
+            </a:schemeClr>
+          </a:lnRef>
+          <a:fillRef idx="1">
+            <a:schemeClr val="accent1"/>
+          </a:fillRef>
+          <a:effectRef idx="0">
+            <a:schemeClr val="accent1"/>
+          </a:effectRef>
+          <a:fontRef idx="minor">
+            <a:schemeClr val="lt1"/>
+          </a:fontRef>
+        </p:style>
+        <p:txBody>
+          <a:bodyPr rtlCol="1" anchor="ctr"/>
+          <a:lstStyle/>
+          <a:p>
+            <a:pPr algn="ctr"/>
+            <a:endParaRPr lang="he-IL" dirty="0"/>
+          </a:p>
+        </p:txBody>
+      </p:sp>
+      <p:sp>
+        <p:nvSpPr>
+          <p:cNvPr id="41" name="מלבן 40">
+            <a:extLst>
+              <a:ext uri="{FF2B5EF4-FFF2-40B4-BE49-F238E27FC236}">
+                <a16:creationId xmlns:a16="http://schemas.microsoft.com/office/drawing/2014/main" id="{25CD0EA2-8D5F-1BE7-B6FD-D613C8EBFAA1}"/>
+              </a:ext>
+            </a:extLst>
+          </p:cNvPr>
+          <p:cNvSpPr/>
+          <p:nvPr/>
+        </p:nvSpPr>
+        <p:spPr>
+          <a:xfrm>
+            <a:off x="6777870" y="4748800"/>
+            <a:ext cx="1027523" cy="338554"/>
+          </a:xfrm>
+          <a:prstGeom prst="rect">
+            <a:avLst/>
+          </a:prstGeom>
+          <a:noFill/>
+        </p:spPr>
+        <p:txBody>
+          <a:bodyPr wrap="square" lIns="91440" tIns="45720" rIns="91440" bIns="45720">
+            <a:spAutoFit/>
+          </a:bodyPr>
+          <a:lstStyle/>
+          <a:p>
+            <a:pPr algn="ctr"/>
+            <a:r>
+              <a:rPr lang="he-IL" sz="1600" b="0" cap="none" spc="0" dirty="0">
+                <a:ln w="0"/>
+                <a:solidFill>
+                  <a:schemeClr val="tx1"/>
+                </a:solidFill>
+                <a:effectLst>
+                  <a:outerShdw blurRad="38100" dist="19050" dir="2700000" algn="tl" rotWithShape="0">
+                    <a:schemeClr val="dk1">
+                      <a:alpha val="40000"/>
+                    </a:schemeClr>
+                  </a:outerShdw>
+                </a:effectLst>
+              </a:rPr>
+              <a:t>סל קניות</a:t>
+            </a:r>
+          </a:p>
+        </p:txBody>
+      </p:sp>
+      <p:cxnSp>
+        <p:nvCxnSpPr>
+          <p:cNvPr id="42" name="מחבר חץ ישר 41">
+            <a:extLst>
+              <a:ext uri="{FF2B5EF4-FFF2-40B4-BE49-F238E27FC236}">
+                <a16:creationId xmlns:a16="http://schemas.microsoft.com/office/drawing/2014/main" id="{94E94A2A-CCB7-4643-9C23-EB17D12BE3BB}"/>
+              </a:ext>
+            </a:extLst>
+          </p:cNvPr>
+          <p:cNvCxnSpPr>
+            <a:cxnSpLocks/>
+          </p:cNvCxnSpPr>
+          <p:nvPr/>
+        </p:nvCxnSpPr>
+        <p:spPr>
+          <a:xfrm>
+            <a:off x="6433791" y="1500203"/>
+            <a:ext cx="0" cy="367645"/>
+          </a:xfrm>
+          <a:prstGeom prst="straightConnector1">
+            <a:avLst/>
+          </a:prstGeom>
+          <a:ln>
+            <a:solidFill>
+              <a:schemeClr val="tx1"/>
+            </a:solidFill>
+            <a:headEnd type="triangle"/>
+            <a:tailEnd type="triangle"/>
+          </a:ln>
+        </p:spPr>
+        <p:style>
+          <a:lnRef idx="1">
+            <a:schemeClr val="accent1"/>
+          </a:lnRef>
+          <a:fillRef idx="0">
+            <a:schemeClr val="accent1"/>
+          </a:fillRef>
+          <a:effectRef idx="0">
+            <a:schemeClr val="accent1"/>
+          </a:effectRef>
+          <a:fontRef idx="minor">
+            <a:schemeClr val="tx1"/>
+          </a:fontRef>
+        </p:style>
+      </p:cxnSp>
+      <p:cxnSp>
+        <p:nvCxnSpPr>
+          <p:cNvPr id="43" name="מחבר חץ ישר 42">
+            <a:extLst>
+              <a:ext uri="{FF2B5EF4-FFF2-40B4-BE49-F238E27FC236}">
+                <a16:creationId xmlns:a16="http://schemas.microsoft.com/office/drawing/2014/main" id="{CA941C30-7F41-4F85-D16F-7757AD16E673}"/>
+              </a:ext>
+            </a:extLst>
+          </p:cNvPr>
+          <p:cNvCxnSpPr>
+            <a:cxnSpLocks/>
+          </p:cNvCxnSpPr>
+          <p:nvPr/>
+        </p:nvCxnSpPr>
+        <p:spPr>
+          <a:xfrm>
+            <a:off x="6526355" y="2993010"/>
+            <a:ext cx="0" cy="367645"/>
+          </a:xfrm>
+          <a:prstGeom prst="straightConnector1">
+            <a:avLst/>
+          </a:prstGeom>
+          <a:ln>
+            <a:solidFill>
+              <a:schemeClr val="tx1"/>
+            </a:solidFill>
+            <a:headEnd type="triangle"/>
+            <a:tailEnd type="triangle"/>
+          </a:ln>
+        </p:spPr>
+        <p:style>
+          <a:lnRef idx="1">
+            <a:schemeClr val="accent1"/>
+          </a:lnRef>
+          <a:fillRef idx="0">
+            <a:schemeClr val="accent1"/>
+          </a:fillRef>
+          <a:effectRef idx="0">
+            <a:schemeClr val="accent1"/>
+          </a:effectRef>
+          <a:fontRef idx="minor">
+            <a:schemeClr val="tx1"/>
+          </a:fontRef>
+        </p:style>
+      </p:cxnSp>
+      <p:cxnSp>
+        <p:nvCxnSpPr>
+          <p:cNvPr id="44" name="מחבר חץ ישר 43">
+            <a:extLst>
+              <a:ext uri="{FF2B5EF4-FFF2-40B4-BE49-F238E27FC236}">
+                <a16:creationId xmlns:a16="http://schemas.microsoft.com/office/drawing/2014/main" id="{1EDC9C5F-C2EC-51E3-6CE0-A14A74056AA7}"/>
+              </a:ext>
+            </a:extLst>
+          </p:cNvPr>
+          <p:cNvCxnSpPr>
+            <a:cxnSpLocks/>
+          </p:cNvCxnSpPr>
+          <p:nvPr/>
+        </p:nvCxnSpPr>
+        <p:spPr>
+          <a:xfrm>
+            <a:off x="7291631" y="4110086"/>
+            <a:ext cx="0" cy="367645"/>
+          </a:xfrm>
+          <a:prstGeom prst="straightConnector1">
+            <a:avLst/>
+          </a:prstGeom>
+          <a:ln>
+            <a:solidFill>
+              <a:schemeClr val="tx1"/>
+            </a:solidFill>
+            <a:headEnd type="triangle"/>
+            <a:tailEnd type="triangle"/>
+          </a:ln>
+        </p:spPr>
+        <p:style>
+          <a:lnRef idx="1">
+            <a:schemeClr val="accent1"/>
+          </a:lnRef>
+          <a:fillRef idx="0">
+            <a:schemeClr val="accent1"/>
+          </a:fillRef>
+          <a:effectRef idx="0">
+            <a:schemeClr val="accent1"/>
+          </a:effectRef>
+          <a:fontRef idx="minor">
+            <a:schemeClr val="tx1"/>
+          </a:fontRef>
+        </p:style>
+      </p:cxnSp>
+      <p:sp>
+        <p:nvSpPr>
+          <p:cNvPr id="45" name="מלבן 44">
+            <a:extLst>
+              <a:ext uri="{FF2B5EF4-FFF2-40B4-BE49-F238E27FC236}">
+                <a16:creationId xmlns:a16="http://schemas.microsoft.com/office/drawing/2014/main" id="{856928BC-A507-9EC2-5BFF-32A277B8590C}"/>
+              </a:ext>
+            </a:extLst>
+          </p:cNvPr>
+          <p:cNvSpPr/>
+          <p:nvPr/>
+        </p:nvSpPr>
+        <p:spPr>
+          <a:xfrm>
+            <a:off x="7058712" y="5793222"/>
+            <a:ext cx="548326" cy="750979"/>
+          </a:xfrm>
+          <a:prstGeom prst="rect">
+            <a:avLst/>
+          </a:prstGeom>
+          <a:solidFill>
+            <a:schemeClr val="accent2">
+              <a:lumMod val="40000"/>
+              <a:lumOff val="60000"/>
+            </a:schemeClr>
+          </a:solidFill>
+        </p:spPr>
+        <p:style>
+          <a:lnRef idx="2">
+            <a:schemeClr val="accent1">
+              <a:shade val="15000"/>
+            </a:schemeClr>
+          </a:lnRef>
+          <a:fillRef idx="1">
+            <a:schemeClr val="accent1"/>
+          </a:fillRef>
+          <a:effectRef idx="0">
+            <a:schemeClr val="accent1"/>
+          </a:effectRef>
+          <a:fontRef idx="minor">
+            <a:schemeClr val="lt1"/>
+          </a:fontRef>
+        </p:style>
+        <p:txBody>
+          <a:bodyPr rtlCol="1" anchor="ctr"/>
+          <a:lstStyle/>
+          <a:p>
+            <a:pPr algn="ctr"/>
+            <a:endParaRPr lang="he-IL" dirty="0"/>
+          </a:p>
+        </p:txBody>
+      </p:sp>
+      <p:sp>
+        <p:nvSpPr>
+          <p:cNvPr id="46" name="מלבן 45">
+            <a:extLst>
+              <a:ext uri="{FF2B5EF4-FFF2-40B4-BE49-F238E27FC236}">
+                <a16:creationId xmlns:a16="http://schemas.microsoft.com/office/drawing/2014/main" id="{1C099335-6198-7211-2079-D5BD049955D7}"/>
+              </a:ext>
+            </a:extLst>
+          </p:cNvPr>
+          <p:cNvSpPr/>
+          <p:nvPr/>
+        </p:nvSpPr>
+        <p:spPr>
+          <a:xfrm>
+            <a:off x="6829718" y="5872185"/>
+            <a:ext cx="1027523" cy="584775"/>
+          </a:xfrm>
+          <a:prstGeom prst="rect">
+            <a:avLst/>
+          </a:prstGeom>
+          <a:noFill/>
+        </p:spPr>
+        <p:txBody>
+          <a:bodyPr wrap="square" lIns="91440" tIns="45720" rIns="91440" bIns="45720">
+            <a:spAutoFit/>
+          </a:bodyPr>
+          <a:lstStyle/>
+          <a:p>
+            <a:pPr algn="ctr"/>
+            <a:r>
+              <a:rPr lang="he-IL" sz="1600" dirty="0">
+                <a:ln w="0"/>
+                <a:effectLst>
+                  <a:outerShdw blurRad="38100" dist="19050" dir="2700000" algn="tl" rotWithShape="0">
+                    <a:schemeClr val="dk1">
+                      <a:alpha val="40000"/>
+                    </a:schemeClr>
+                  </a:outerShdw>
+                </a:effectLst>
+              </a:rPr>
+              <a:t>אישור קניה</a:t>
+            </a:r>
+            <a:endParaRPr lang="he-IL" sz="1600" b="0" cap="none" spc="0" dirty="0">
+              <a:ln w="0"/>
+              <a:solidFill>
+                <a:schemeClr val="tx1"/>
+              </a:solidFill>
+              <a:effectLst>
+                <a:outerShdw blurRad="38100" dist="19050" dir="2700000" algn="tl" rotWithShape="0">
+                  <a:schemeClr val="dk1">
+                    <a:alpha val="40000"/>
+                  </a:schemeClr>
+                </a:outerShdw>
+              </a:effectLst>
+            </a:endParaRPr>
+          </a:p>
+        </p:txBody>
+      </p:sp>
+      <p:cxnSp>
+        <p:nvCxnSpPr>
+          <p:cNvPr id="47" name="מחבר חץ ישר 46">
+            <a:extLst>
+              <a:ext uri="{FF2B5EF4-FFF2-40B4-BE49-F238E27FC236}">
+                <a16:creationId xmlns:a16="http://schemas.microsoft.com/office/drawing/2014/main" id="{8E858565-EF14-35EC-210A-0D7AB1B7CBB1}"/>
+              </a:ext>
+            </a:extLst>
+          </p:cNvPr>
+          <p:cNvCxnSpPr>
+            <a:cxnSpLocks/>
+          </p:cNvCxnSpPr>
+          <p:nvPr/>
+        </p:nvCxnSpPr>
+        <p:spPr>
+          <a:xfrm>
+            <a:off x="7291631" y="5504540"/>
+            <a:ext cx="0" cy="367645"/>
+          </a:xfrm>
+          <a:prstGeom prst="straightConnector1">
+            <a:avLst/>
+          </a:prstGeom>
+          <a:ln>
+            <a:solidFill>
+              <a:schemeClr val="tx1"/>
+            </a:solidFill>
+            <a:headEnd type="triangle"/>
+            <a:tailEnd type="triangle"/>
+          </a:ln>
+        </p:spPr>
+        <p:style>
+          <a:lnRef idx="1">
+            <a:schemeClr val="accent1"/>
+          </a:lnRef>
+          <a:fillRef idx="0">
+            <a:schemeClr val="accent1"/>
+          </a:fillRef>
+          <a:effectRef idx="0">
+            <a:schemeClr val="accent1"/>
+          </a:effectRef>
+          <a:fontRef idx="minor">
+            <a:schemeClr val="tx1"/>
+          </a:fontRef>
+        </p:style>
+      </p:cxnSp>
+      <p:sp>
+        <p:nvSpPr>
+          <p:cNvPr id="48" name="מלבן 47">
+            <a:extLst>
+              <a:ext uri="{FF2B5EF4-FFF2-40B4-BE49-F238E27FC236}">
+                <a16:creationId xmlns:a16="http://schemas.microsoft.com/office/drawing/2014/main" id="{7A8ED8DB-3D31-88A9-14BA-0D4DD06F5825}"/>
+              </a:ext>
+            </a:extLst>
+          </p:cNvPr>
+          <p:cNvSpPr/>
+          <p:nvPr/>
+        </p:nvSpPr>
+        <p:spPr>
+          <a:xfrm>
+            <a:off x="5582238" y="4401288"/>
+            <a:ext cx="1027523" cy="1206631"/>
+          </a:xfrm>
+          <a:prstGeom prst="rect">
+            <a:avLst/>
+          </a:prstGeom>
+          <a:solidFill>
+            <a:schemeClr val="accent2">
+              <a:lumMod val="40000"/>
+              <a:lumOff val="60000"/>
+            </a:schemeClr>
+          </a:solidFill>
+        </p:spPr>
+        <p:style>
+          <a:lnRef idx="2">
+            <a:schemeClr val="accent1">
+              <a:shade val="15000"/>
+            </a:schemeClr>
+          </a:lnRef>
+          <a:fillRef idx="1">
+            <a:schemeClr val="accent1"/>
+          </a:fillRef>
+          <a:effectRef idx="0">
+            <a:schemeClr val="accent1"/>
+          </a:effectRef>
+          <a:fontRef idx="minor">
+            <a:schemeClr val="lt1"/>
+          </a:fontRef>
+        </p:style>
+        <p:txBody>
+          <a:bodyPr rtlCol="1" anchor="ctr"/>
+          <a:lstStyle/>
+          <a:p>
+            <a:pPr algn="ctr"/>
+            <a:endParaRPr lang="he-IL" dirty="0"/>
+          </a:p>
+        </p:txBody>
+      </p:sp>
+      <p:sp>
+        <p:nvSpPr>
+          <p:cNvPr id="49" name="מלבן 48">
+            <a:extLst>
+              <a:ext uri="{FF2B5EF4-FFF2-40B4-BE49-F238E27FC236}">
+                <a16:creationId xmlns:a16="http://schemas.microsoft.com/office/drawing/2014/main" id="{F4C1AD0E-B008-A96E-7756-3558B867F6AE}"/>
+              </a:ext>
+            </a:extLst>
+          </p:cNvPr>
+          <p:cNvSpPr/>
+          <p:nvPr/>
+        </p:nvSpPr>
+        <p:spPr>
+          <a:xfrm>
+            <a:off x="5536282" y="4748800"/>
+            <a:ext cx="1027523" cy="338554"/>
+          </a:xfrm>
+          <a:prstGeom prst="rect">
+            <a:avLst/>
+          </a:prstGeom>
+          <a:noFill/>
+        </p:spPr>
+        <p:txBody>
+          <a:bodyPr wrap="square" lIns="91440" tIns="45720" rIns="91440" bIns="45720">
+            <a:spAutoFit/>
+          </a:bodyPr>
+          <a:lstStyle/>
+          <a:p>
+            <a:pPr algn="ctr"/>
+            <a:r>
+              <a:rPr lang="he-IL" sz="1600" b="0" cap="none" spc="0" dirty="0">
+                <a:ln w="0"/>
+                <a:solidFill>
+                  <a:schemeClr val="tx1"/>
+                </a:solidFill>
+                <a:effectLst>
+                  <a:outerShdw blurRad="38100" dist="19050" dir="2700000" algn="tl" rotWithShape="0">
+                    <a:schemeClr val="dk1">
+                      <a:alpha val="40000"/>
+                    </a:schemeClr>
+                  </a:outerShdw>
+                </a:effectLst>
+              </a:rPr>
+              <a:t>פרטי מוצר</a:t>
+            </a:r>
+          </a:p>
+        </p:txBody>
+      </p:sp>
+      <p:cxnSp>
+        <p:nvCxnSpPr>
+          <p:cNvPr id="50" name="מחבר חץ ישר 49">
+            <a:extLst>
+              <a:ext uri="{FF2B5EF4-FFF2-40B4-BE49-F238E27FC236}">
+                <a16:creationId xmlns:a16="http://schemas.microsoft.com/office/drawing/2014/main" id="{CF61C0CF-B120-62A4-F721-5D5BD121ED37}"/>
+              </a:ext>
+            </a:extLst>
+          </p:cNvPr>
+          <p:cNvCxnSpPr>
+            <a:cxnSpLocks/>
+          </p:cNvCxnSpPr>
+          <p:nvPr/>
+        </p:nvCxnSpPr>
+        <p:spPr>
+          <a:xfrm>
+            <a:off x="5990187" y="4110086"/>
+            <a:ext cx="0" cy="367645"/>
+          </a:xfrm>
+          <a:prstGeom prst="straightConnector1">
+            <a:avLst/>
+          </a:prstGeom>
+          <a:ln>
+            <a:solidFill>
+              <a:schemeClr val="tx1"/>
+            </a:solidFill>
+            <a:headEnd type="triangle"/>
+            <a:tailEnd type="triangle"/>
+          </a:ln>
+        </p:spPr>
+        <p:style>
+          <a:lnRef idx="1">
+            <a:schemeClr val="accent1"/>
+          </a:lnRef>
+          <a:fillRef idx="0">
+            <a:schemeClr val="accent1"/>
+          </a:fillRef>
+          <a:effectRef idx="0">
+            <a:schemeClr val="accent1"/>
+          </a:effectRef>
+          <a:fontRef idx="minor">
+            <a:schemeClr val="tx1"/>
+          </a:fontRef>
+        </p:style>
+      </p:cxnSp>
+      <p:cxnSp>
+        <p:nvCxnSpPr>
+          <p:cNvPr id="51" name="מחבר חץ ישר 50">
+            <a:extLst>
+              <a:ext uri="{FF2B5EF4-FFF2-40B4-BE49-F238E27FC236}">
+                <a16:creationId xmlns:a16="http://schemas.microsoft.com/office/drawing/2014/main" id="{D50B463C-4591-1308-B1AF-43C5AB0E49C3}"/>
+              </a:ext>
+            </a:extLst>
+          </p:cNvPr>
+          <p:cNvCxnSpPr>
+            <a:cxnSpLocks/>
+            <a:stCxn id="48" idx="3"/>
+            <a:endCxn id="40" idx="1"/>
+          </p:cNvCxnSpPr>
+          <p:nvPr/>
+        </p:nvCxnSpPr>
+        <p:spPr>
+          <a:xfrm flipV="1">
+            <a:off x="6609761" y="4997801"/>
+            <a:ext cx="177537" cy="6803"/>
+          </a:xfrm>
+          <a:prstGeom prst="straightConnector1">
+            <a:avLst/>
+          </a:prstGeom>
+          <a:ln>
+            <a:solidFill>
+              <a:schemeClr val="tx1"/>
+            </a:solidFill>
+            <a:headEnd type="triangle"/>
+            <a:tailEnd type="triangle"/>
+          </a:ln>
+        </p:spPr>
+        <p:style>
+          <a:lnRef idx="1">
+            <a:schemeClr val="accent1"/>
+          </a:lnRef>
+          <a:fillRef idx="0">
+            <a:schemeClr val="accent1"/>
+          </a:fillRef>
+          <a:effectRef idx="0">
+            <a:schemeClr val="accent1"/>
+          </a:effectRef>
+          <a:fontRef idx="minor">
+            <a:schemeClr val="tx1"/>
+          </a:fontRef>
+        </p:style>
+      </p:cxnSp>
+    </p:spTree>
+    <p:extLst>
+      <p:ext uri="{BB962C8B-B14F-4D97-AF65-F5344CB8AC3E}">
+        <p14:creationId xmlns:p14="http://schemas.microsoft.com/office/powerpoint/2010/main" val="3653243272"/>
+      </p:ext>
+    </p:extLst>
+  </p:cSld>
+  <p:clrMapOvr>
+    <a:masterClrMapping/>
+  </p:clrMapOvr>
+</p:sld>
+</file>
+
 <file path=ppt/slides/slide2.xml><?xml version="1.0" encoding="utf-8"?>
 <p:sld xmlns:a="http://schemas.openxmlformats.org/drawingml/2006/main" xmlns:r="http://schemas.openxmlformats.org/officeDocument/2006/relationships" xmlns:p="http://schemas.openxmlformats.org/presentationml/2006/main">
   <p:cSld>
@@ -3496,8 +5268,17 @@
           <a:p>
             <a:r>
               <a:rPr lang="he-IL" dirty="0"/>
-              <a:t>ההתחברות מתבצעת ע"י מורה עם קוד משתמש וסיסמא</a:t>
-            </a:r>
+              <a:t>ההתחברות מתבצעת עם טלפון וסיסמא עבור כל בעלי התפקידים</a:t>
+            </a:r>
+          </a:p>
+          <a:p>
+            <a:r>
+              <a:rPr lang="he-IL" dirty="0"/>
+              <a:t>ניתוב לעמודים המתאימים לפי דרגת המשתמש </a:t>
+            </a:r>
+          </a:p>
+          <a:p>
+            <a:endParaRPr lang="he-IL" dirty="0"/>
           </a:p>
           <a:p>
             <a:endParaRPr lang="he-IL" dirty="0"/>
@@ -4308,7 +6089,10 @@
           <a:bodyPr/>
           <a:lstStyle/>
           <a:p>
-            <a:endParaRPr lang="he-IL"/>
+            <a:r>
+              <a:rPr lang="he-IL" dirty="0"/>
+              <a:t>כניסת מורות – בשלב ראשוני רק מחנכות</a:t>
+            </a:r>
           </a:p>
         </p:txBody>
       </p:sp>
@@ -4333,7 +6117,22 @@
           <a:bodyPr/>
           <a:lstStyle/>
           <a:p>
-            <a:endParaRPr lang="he-IL"/>
+            <a:r>
+              <a:rPr lang="he-IL" dirty="0"/>
+              <a:t>צפיה בנתוני התלמידות של המורה</a:t>
+            </a:r>
+          </a:p>
+          <a:p>
+            <a:r>
+              <a:rPr lang="he-IL" dirty="0"/>
+              <a:t>ניתן לראות שם תלמידה מס' נקודות מס' שוברים ושוברי בועה </a:t>
+            </a:r>
+          </a:p>
+          <a:p>
+            <a:r>
+              <a:rPr lang="he-IL" dirty="0"/>
+              <a:t>בלחיצה על תלמידה מגיעים לכרטיס האישי שלה </a:t>
+            </a:r>
           </a:p>
         </p:txBody>
       </p:sp>
@@ -4341,6 +6140,669 @@
     <p:extLst>
       <p:ext uri="{BB962C8B-B14F-4D97-AF65-F5344CB8AC3E}">
         <p14:creationId xmlns:p14="http://schemas.microsoft.com/office/powerpoint/2010/main" val="459599735"/>
+      </p:ext>
+    </p:extLst>
+  </p:cSld>
+  <p:clrMapOvr>
+    <a:masterClrMapping/>
+  </p:clrMapOvr>
+</p:sld>
+</file>
+
+<file path=ppt/slides/slide4.xml><?xml version="1.0" encoding="utf-8"?>
+<p:sld xmlns:a="http://schemas.openxmlformats.org/drawingml/2006/main" xmlns:r="http://schemas.openxmlformats.org/officeDocument/2006/relationships" xmlns:p="http://schemas.openxmlformats.org/presentationml/2006/main">
+  <p:cSld>
+    <p:spTree>
+      <p:nvGrpSpPr>
+        <p:cNvPr id="1" name=""/>
+        <p:cNvGrpSpPr/>
+        <p:nvPr/>
+      </p:nvGrpSpPr>
+      <p:grpSpPr>
+        <a:xfrm>
+          <a:off x="0" y="0"/>
+          <a:ext cx="0" cy="0"/>
+          <a:chOff x="0" y="0"/>
+          <a:chExt cx="0" cy="0"/>
+        </a:xfrm>
+      </p:grpSpPr>
+      <p:sp>
+        <p:nvSpPr>
+          <p:cNvPr id="2" name="כותרת 1">
+            <a:extLst>
+              <a:ext uri="{FF2B5EF4-FFF2-40B4-BE49-F238E27FC236}">
+                <a16:creationId xmlns:a16="http://schemas.microsoft.com/office/drawing/2014/main" id="{80D6FB60-312D-2125-529B-E2F6705703B6}"/>
+              </a:ext>
+            </a:extLst>
+          </p:cNvPr>
+          <p:cNvSpPr>
+            <a:spLocks noGrp="1"/>
+          </p:cNvSpPr>
+          <p:nvPr>
+            <p:ph type="title"/>
+          </p:nvPr>
+        </p:nvSpPr>
+        <p:spPr/>
+        <p:txBody>
+          <a:bodyPr/>
+          <a:lstStyle/>
+          <a:p>
+            <a:r>
+              <a:rPr lang="he-IL" dirty="0"/>
+              <a:t>פרטי תלמידה </a:t>
+            </a:r>
+          </a:p>
+        </p:txBody>
+      </p:sp>
+      <p:sp>
+        <p:nvSpPr>
+          <p:cNvPr id="3" name="מציין מיקום תוכן 2">
+            <a:extLst>
+              <a:ext uri="{FF2B5EF4-FFF2-40B4-BE49-F238E27FC236}">
+                <a16:creationId xmlns:a16="http://schemas.microsoft.com/office/drawing/2014/main" id="{6CF1FEE2-0CB2-AE9F-C083-DE1DC56A5000}"/>
+              </a:ext>
+            </a:extLst>
+          </p:cNvPr>
+          <p:cNvSpPr>
+            <a:spLocks noGrp="1"/>
+          </p:cNvSpPr>
+          <p:nvPr>
+            <p:ph idx="1"/>
+          </p:nvPr>
+        </p:nvSpPr>
+        <p:spPr/>
+        <p:txBody>
+          <a:bodyPr/>
+          <a:lstStyle/>
+          <a:p>
+            <a:r>
+              <a:rPr lang="he-IL" dirty="0"/>
+              <a:t>הפרטים של התלמידה בגדול </a:t>
+            </a:r>
+          </a:p>
+          <a:p>
+            <a:r>
+              <a:rPr lang="he-IL" dirty="0"/>
+              <a:t>ניתן לשנות את מספר הנקודות </a:t>
+            </a:r>
+          </a:p>
+          <a:p>
+            <a:r>
+              <a:rPr lang="he-IL" dirty="0"/>
+              <a:t>ניתן לשנות את מספר השוברים </a:t>
+            </a:r>
+          </a:p>
+          <a:p>
+            <a:r>
+              <a:rPr lang="he-IL" dirty="0"/>
+              <a:t>ניתן לשנות את מספר שוברי הבועה </a:t>
+            </a:r>
+          </a:p>
+          <a:p>
+            <a:r>
+              <a:rPr lang="he-IL" dirty="0"/>
+              <a:t>מוצג מספר השוברים שאמור להיות לה לפי הנקודות </a:t>
+            </a:r>
+          </a:p>
+          <a:p>
+            <a:r>
+              <a:rPr lang="he-IL" dirty="0"/>
+              <a:t>כפתור שמירה שינויים </a:t>
+            </a:r>
+          </a:p>
+          <a:p>
+            <a:pPr marL="0" indent="0">
+              <a:buNone/>
+            </a:pPr>
+            <a:endParaRPr lang="he-IL" dirty="0"/>
+          </a:p>
+        </p:txBody>
+      </p:sp>
+    </p:spTree>
+    <p:extLst>
+      <p:ext uri="{BB962C8B-B14F-4D97-AF65-F5344CB8AC3E}">
+        <p14:creationId xmlns:p14="http://schemas.microsoft.com/office/powerpoint/2010/main" val="4026757981"/>
+      </p:ext>
+    </p:extLst>
+  </p:cSld>
+  <p:clrMapOvr>
+    <a:masterClrMapping/>
+  </p:clrMapOvr>
+</p:sld>
+</file>
+
+<file path=ppt/slides/slide5.xml><?xml version="1.0" encoding="utf-8"?>
+<p:sld xmlns:a="http://schemas.openxmlformats.org/drawingml/2006/main" xmlns:r="http://schemas.openxmlformats.org/officeDocument/2006/relationships" xmlns:p="http://schemas.openxmlformats.org/presentationml/2006/main">
+  <p:cSld>
+    <p:spTree>
+      <p:nvGrpSpPr>
+        <p:cNvPr id="1" name=""/>
+        <p:cNvGrpSpPr/>
+        <p:nvPr/>
+      </p:nvGrpSpPr>
+      <p:grpSpPr>
+        <a:xfrm>
+          <a:off x="0" y="0"/>
+          <a:ext cx="0" cy="0"/>
+          <a:chOff x="0" y="0"/>
+          <a:chExt cx="0" cy="0"/>
+        </a:xfrm>
+      </p:grpSpPr>
+      <p:sp>
+        <p:nvSpPr>
+          <p:cNvPr id="2" name="כותרת 1">
+            <a:extLst>
+              <a:ext uri="{FF2B5EF4-FFF2-40B4-BE49-F238E27FC236}">
+                <a16:creationId xmlns:a16="http://schemas.microsoft.com/office/drawing/2014/main" id="{89A99409-B62F-F01A-E367-EA12225A1331}"/>
+              </a:ext>
+            </a:extLst>
+          </p:cNvPr>
+          <p:cNvSpPr>
+            <a:spLocks noGrp="1"/>
+          </p:cNvSpPr>
+          <p:nvPr>
+            <p:ph type="title"/>
+          </p:nvPr>
+        </p:nvSpPr>
+        <p:spPr/>
+        <p:txBody>
+          <a:bodyPr/>
+          <a:lstStyle/>
+          <a:p>
+            <a:r>
+              <a:rPr lang="he-IL" dirty="0"/>
+              <a:t>כניסת מנהלת אתר – צוות ניהולי </a:t>
+            </a:r>
+          </a:p>
+        </p:txBody>
+      </p:sp>
+      <p:sp>
+        <p:nvSpPr>
+          <p:cNvPr id="3" name="מציין מיקום תוכן 2">
+            <a:extLst>
+              <a:ext uri="{FF2B5EF4-FFF2-40B4-BE49-F238E27FC236}">
+                <a16:creationId xmlns:a16="http://schemas.microsoft.com/office/drawing/2014/main" id="{60325346-9797-A151-A805-E4B6F8D7BBAB}"/>
+              </a:ext>
+            </a:extLst>
+          </p:cNvPr>
+          <p:cNvSpPr>
+            <a:spLocks noGrp="1"/>
+          </p:cNvSpPr>
+          <p:nvPr>
+            <p:ph idx="1"/>
+          </p:nvPr>
+        </p:nvSpPr>
+        <p:spPr/>
+        <p:txBody>
+          <a:bodyPr/>
+          <a:lstStyle/>
+          <a:p>
+            <a:r>
+              <a:rPr lang="he-IL" dirty="0"/>
+              <a:t>יתבצע בשלב עתידי </a:t>
+            </a:r>
+          </a:p>
+          <a:p>
+            <a:r>
+              <a:rPr lang="he-IL" dirty="0"/>
+              <a:t>הוקמה תשתית להקמה </a:t>
+            </a:r>
+          </a:p>
+        </p:txBody>
+      </p:sp>
+    </p:spTree>
+    <p:extLst>
+      <p:ext uri="{BB962C8B-B14F-4D97-AF65-F5344CB8AC3E}">
+        <p14:creationId xmlns:p14="http://schemas.microsoft.com/office/powerpoint/2010/main" val="3570078872"/>
+      </p:ext>
+    </p:extLst>
+  </p:cSld>
+  <p:clrMapOvr>
+    <a:masterClrMapping/>
+  </p:clrMapOvr>
+</p:sld>
+</file>
+
+<file path=ppt/slides/slide6.xml><?xml version="1.0" encoding="utf-8"?>
+<p:sld xmlns:a="http://schemas.openxmlformats.org/drawingml/2006/main" xmlns:r="http://schemas.openxmlformats.org/officeDocument/2006/relationships" xmlns:p="http://schemas.openxmlformats.org/presentationml/2006/main">
+  <p:cSld>
+    <p:spTree>
+      <p:nvGrpSpPr>
+        <p:cNvPr id="1" name=""/>
+        <p:cNvGrpSpPr/>
+        <p:nvPr/>
+      </p:nvGrpSpPr>
+      <p:grpSpPr>
+        <a:xfrm>
+          <a:off x="0" y="0"/>
+          <a:ext cx="0" cy="0"/>
+          <a:chOff x="0" y="0"/>
+          <a:chExt cx="0" cy="0"/>
+        </a:xfrm>
+      </p:grpSpPr>
+      <p:sp>
+        <p:nvSpPr>
+          <p:cNvPr id="2" name="כותרת 1">
+            <a:extLst>
+              <a:ext uri="{FF2B5EF4-FFF2-40B4-BE49-F238E27FC236}">
+                <a16:creationId xmlns:a16="http://schemas.microsoft.com/office/drawing/2014/main" id="{FB8C7D03-B858-92EF-B427-41B9AF920CCE}"/>
+              </a:ext>
+            </a:extLst>
+          </p:cNvPr>
+          <p:cNvSpPr>
+            <a:spLocks noGrp="1"/>
+          </p:cNvSpPr>
+          <p:nvPr>
+            <p:ph type="title"/>
+          </p:nvPr>
+        </p:nvSpPr>
+        <p:spPr/>
+        <p:txBody>
+          <a:bodyPr/>
+          <a:lstStyle/>
+          <a:p>
+            <a:r>
+              <a:rPr lang="he-IL" dirty="0"/>
+              <a:t>כניסת תלמידות – מסך מצב אישי</a:t>
+            </a:r>
+          </a:p>
+        </p:txBody>
+      </p:sp>
+      <p:sp>
+        <p:nvSpPr>
+          <p:cNvPr id="3" name="מציין מיקום תוכן 2">
+            <a:extLst>
+              <a:ext uri="{FF2B5EF4-FFF2-40B4-BE49-F238E27FC236}">
+                <a16:creationId xmlns:a16="http://schemas.microsoft.com/office/drawing/2014/main" id="{5247E59C-293D-6310-2988-8E2F632D9F09}"/>
+              </a:ext>
+            </a:extLst>
+          </p:cNvPr>
+          <p:cNvSpPr>
+            <a:spLocks noGrp="1"/>
+          </p:cNvSpPr>
+          <p:nvPr>
+            <p:ph idx="1"/>
+          </p:nvPr>
+        </p:nvSpPr>
+        <p:spPr/>
+        <p:txBody>
+          <a:bodyPr/>
+          <a:lstStyle/>
+          <a:p>
+            <a:r>
+              <a:rPr lang="he-IL" dirty="0"/>
+              <a:t>צפיה במצב האישי של התלמידה ( בהמשך מצב התקדמות גרפים וכו')</a:t>
+            </a:r>
+          </a:p>
+          <a:p>
+            <a:r>
+              <a:rPr lang="he-IL" dirty="0"/>
+              <a:t>צפיה במספר הנקודות, השוברים והבועה </a:t>
+            </a:r>
+          </a:p>
+          <a:p>
+            <a:r>
+              <a:rPr lang="he-IL" dirty="0"/>
+              <a:t>צפיה בהארות שהמורות כתבו</a:t>
+            </a:r>
+          </a:p>
+          <a:p>
+            <a:r>
+              <a:rPr lang="he-IL" dirty="0"/>
+              <a:t>כפתור מעבר לקיוסק </a:t>
+            </a:r>
+          </a:p>
+          <a:p>
+            <a:r>
+              <a:rPr lang="he-IL" dirty="0"/>
+              <a:t>בהמשך מעבר לתגמול החודשי רעיונות לשיפור והוספת מוצרים </a:t>
+            </a:r>
+          </a:p>
+        </p:txBody>
+      </p:sp>
+    </p:spTree>
+    <p:extLst>
+      <p:ext uri="{BB962C8B-B14F-4D97-AF65-F5344CB8AC3E}">
+        <p14:creationId xmlns:p14="http://schemas.microsoft.com/office/powerpoint/2010/main" val="3078501909"/>
+      </p:ext>
+    </p:extLst>
+  </p:cSld>
+  <p:clrMapOvr>
+    <a:masterClrMapping/>
+  </p:clrMapOvr>
+</p:sld>
+</file>
+
+<file path=ppt/slides/slide7.xml><?xml version="1.0" encoding="utf-8"?>
+<p:sld xmlns:a="http://schemas.openxmlformats.org/drawingml/2006/main" xmlns:r="http://schemas.openxmlformats.org/officeDocument/2006/relationships" xmlns:p="http://schemas.openxmlformats.org/presentationml/2006/main">
+  <p:cSld>
+    <p:spTree>
+      <p:nvGrpSpPr>
+        <p:cNvPr id="1" name=""/>
+        <p:cNvGrpSpPr/>
+        <p:nvPr/>
+      </p:nvGrpSpPr>
+      <p:grpSpPr>
+        <a:xfrm>
+          <a:off x="0" y="0"/>
+          <a:ext cx="0" cy="0"/>
+          <a:chOff x="0" y="0"/>
+          <a:chExt cx="0" cy="0"/>
+        </a:xfrm>
+      </p:grpSpPr>
+      <p:sp>
+        <p:nvSpPr>
+          <p:cNvPr id="2" name="כותרת 1">
+            <a:extLst>
+              <a:ext uri="{FF2B5EF4-FFF2-40B4-BE49-F238E27FC236}">
+                <a16:creationId xmlns:a16="http://schemas.microsoft.com/office/drawing/2014/main" id="{2D483F29-B6D7-02F2-1921-797F5A338BB5}"/>
+              </a:ext>
+            </a:extLst>
+          </p:cNvPr>
+          <p:cNvSpPr>
+            <a:spLocks noGrp="1"/>
+          </p:cNvSpPr>
+          <p:nvPr>
+            <p:ph type="title"/>
+          </p:nvPr>
+        </p:nvSpPr>
+        <p:spPr/>
+        <p:txBody>
+          <a:bodyPr/>
+          <a:lstStyle/>
+          <a:p>
+            <a:r>
+              <a:rPr lang="he-IL" dirty="0"/>
+              <a:t>כניסת תלמידות - הקיוסק</a:t>
+            </a:r>
+          </a:p>
+        </p:txBody>
+      </p:sp>
+      <p:sp>
+        <p:nvSpPr>
+          <p:cNvPr id="3" name="מציין מיקום תוכן 2">
+            <a:extLst>
+              <a:ext uri="{FF2B5EF4-FFF2-40B4-BE49-F238E27FC236}">
+                <a16:creationId xmlns:a16="http://schemas.microsoft.com/office/drawing/2014/main" id="{927EFC5C-B47B-DA8D-7FD5-B0C87E4C5790}"/>
+              </a:ext>
+            </a:extLst>
+          </p:cNvPr>
+          <p:cNvSpPr>
+            <a:spLocks noGrp="1"/>
+          </p:cNvSpPr>
+          <p:nvPr>
+            <p:ph idx="1"/>
+          </p:nvPr>
+        </p:nvSpPr>
+        <p:spPr/>
+        <p:txBody>
+          <a:bodyPr/>
+          <a:lstStyle/>
+          <a:p>
+            <a:r>
+              <a:rPr lang="he-IL" dirty="0"/>
+              <a:t>צפיה בכל המוצרים </a:t>
+            </a:r>
+          </a:p>
+          <a:p>
+            <a:r>
+              <a:rPr lang="he-IL" dirty="0"/>
+              <a:t>אפשרויות סינון על פי קטגוריות</a:t>
+            </a:r>
+          </a:p>
+          <a:p>
+            <a:r>
+              <a:rPr lang="he-IL" dirty="0"/>
+              <a:t>אפשרויות סינון על פי המוצרים החדשים ביותר, הנמכרים ביותר ועוד </a:t>
+            </a:r>
+          </a:p>
+          <a:p>
+            <a:r>
+              <a:rPr lang="he-IL" dirty="0"/>
+              <a:t>לחיצה על מוצר עוברת למסך מוצר </a:t>
+            </a:r>
+          </a:p>
+          <a:p>
+            <a:r>
+              <a:rPr lang="he-IL" dirty="0"/>
+              <a:t>אפשרות למעבר לסל הקניות </a:t>
+            </a:r>
+          </a:p>
+          <a:p>
+            <a:r>
+              <a:rPr lang="he-IL" dirty="0"/>
+              <a:t>אפשרות למעבר לתשלום </a:t>
+            </a:r>
+          </a:p>
+          <a:p>
+            <a:r>
+              <a:rPr lang="he-IL" dirty="0"/>
+              <a:t>אפשרות חזרה לפרופיל </a:t>
+            </a:r>
+          </a:p>
+        </p:txBody>
+      </p:sp>
+    </p:spTree>
+    <p:extLst>
+      <p:ext uri="{BB962C8B-B14F-4D97-AF65-F5344CB8AC3E}">
+        <p14:creationId xmlns:p14="http://schemas.microsoft.com/office/powerpoint/2010/main" val="567978253"/>
+      </p:ext>
+    </p:extLst>
+  </p:cSld>
+  <p:clrMapOvr>
+    <a:masterClrMapping/>
+  </p:clrMapOvr>
+</p:sld>
+</file>
+
+<file path=ppt/slides/slide8.xml><?xml version="1.0" encoding="utf-8"?>
+<p:sld xmlns:a="http://schemas.openxmlformats.org/drawingml/2006/main" xmlns:r="http://schemas.openxmlformats.org/officeDocument/2006/relationships" xmlns:p="http://schemas.openxmlformats.org/presentationml/2006/main">
+  <p:cSld>
+    <p:spTree>
+      <p:nvGrpSpPr>
+        <p:cNvPr id="1" name=""/>
+        <p:cNvGrpSpPr/>
+        <p:nvPr/>
+      </p:nvGrpSpPr>
+      <p:grpSpPr>
+        <a:xfrm>
+          <a:off x="0" y="0"/>
+          <a:ext cx="0" cy="0"/>
+          <a:chOff x="0" y="0"/>
+          <a:chExt cx="0" cy="0"/>
+        </a:xfrm>
+      </p:grpSpPr>
+      <p:sp>
+        <p:nvSpPr>
+          <p:cNvPr id="2" name="כותרת 1">
+            <a:extLst>
+              <a:ext uri="{FF2B5EF4-FFF2-40B4-BE49-F238E27FC236}">
+                <a16:creationId xmlns:a16="http://schemas.microsoft.com/office/drawing/2014/main" id="{3D5F06B6-05D2-971C-3551-9BDBBEF4B860}"/>
+              </a:ext>
+            </a:extLst>
+          </p:cNvPr>
+          <p:cNvSpPr>
+            <a:spLocks noGrp="1"/>
+          </p:cNvSpPr>
+          <p:nvPr>
+            <p:ph type="title"/>
+          </p:nvPr>
+        </p:nvSpPr>
+        <p:spPr/>
+        <p:txBody>
+          <a:bodyPr/>
+          <a:lstStyle/>
+          <a:p>
+            <a:r>
+              <a:rPr lang="he-IL" dirty="0"/>
+              <a:t>כניסת תלמידות – עמוד מוצר</a:t>
+            </a:r>
+          </a:p>
+        </p:txBody>
+      </p:sp>
+      <p:sp>
+        <p:nvSpPr>
+          <p:cNvPr id="3" name="מציין מיקום תוכן 2">
+            <a:extLst>
+              <a:ext uri="{FF2B5EF4-FFF2-40B4-BE49-F238E27FC236}">
+                <a16:creationId xmlns:a16="http://schemas.microsoft.com/office/drawing/2014/main" id="{A689539C-3472-9018-7A08-17CC6D7DDEBE}"/>
+              </a:ext>
+            </a:extLst>
+          </p:cNvPr>
+          <p:cNvSpPr>
+            <a:spLocks noGrp="1"/>
+          </p:cNvSpPr>
+          <p:nvPr>
+            <p:ph idx="1"/>
+          </p:nvPr>
+        </p:nvSpPr>
+        <p:spPr/>
+        <p:txBody>
+          <a:bodyPr/>
+          <a:lstStyle/>
+          <a:p>
+            <a:r>
+              <a:rPr lang="he-IL" dirty="0"/>
+              <a:t>פרטי המוצר והתמונה בגדול </a:t>
+            </a:r>
+          </a:p>
+          <a:p>
+            <a:r>
+              <a:rPr lang="he-IL" dirty="0"/>
+              <a:t>אפשרות להוספה לסל הקניות </a:t>
+            </a:r>
+          </a:p>
+          <a:p>
+            <a:r>
+              <a:rPr lang="he-IL" dirty="0"/>
+              <a:t>אפשרות לחזרה לעמוד הקיוסק </a:t>
+            </a:r>
+          </a:p>
+          <a:p>
+            <a:pPr marL="0" indent="0">
+              <a:buNone/>
+            </a:pPr>
+            <a:endParaRPr lang="he-IL" dirty="0"/>
+          </a:p>
+        </p:txBody>
+      </p:sp>
+    </p:spTree>
+    <p:extLst>
+      <p:ext uri="{BB962C8B-B14F-4D97-AF65-F5344CB8AC3E}">
+        <p14:creationId xmlns:p14="http://schemas.microsoft.com/office/powerpoint/2010/main" val="2730816063"/>
+      </p:ext>
+    </p:extLst>
+  </p:cSld>
+  <p:clrMapOvr>
+    <a:masterClrMapping/>
+  </p:clrMapOvr>
+</p:sld>
+</file>
+
+<file path=ppt/slides/slide9.xml><?xml version="1.0" encoding="utf-8"?>
+<p:sld xmlns:a="http://schemas.openxmlformats.org/drawingml/2006/main" xmlns:r="http://schemas.openxmlformats.org/officeDocument/2006/relationships" xmlns:p="http://schemas.openxmlformats.org/presentationml/2006/main">
+  <p:cSld>
+    <p:spTree>
+      <p:nvGrpSpPr>
+        <p:cNvPr id="1" name=""/>
+        <p:cNvGrpSpPr/>
+        <p:nvPr/>
+      </p:nvGrpSpPr>
+      <p:grpSpPr>
+        <a:xfrm>
+          <a:off x="0" y="0"/>
+          <a:ext cx="0" cy="0"/>
+          <a:chOff x="0" y="0"/>
+          <a:chExt cx="0" cy="0"/>
+        </a:xfrm>
+      </p:grpSpPr>
+      <p:sp>
+        <p:nvSpPr>
+          <p:cNvPr id="2" name="כותרת 1">
+            <a:extLst>
+              <a:ext uri="{FF2B5EF4-FFF2-40B4-BE49-F238E27FC236}">
+                <a16:creationId xmlns:a16="http://schemas.microsoft.com/office/drawing/2014/main" id="{1BDCEDCE-6727-1211-5701-FCA2B4538D89}"/>
+              </a:ext>
+            </a:extLst>
+          </p:cNvPr>
+          <p:cNvSpPr>
+            <a:spLocks noGrp="1"/>
+          </p:cNvSpPr>
+          <p:nvPr>
+            <p:ph type="title"/>
+          </p:nvPr>
+        </p:nvSpPr>
+        <p:spPr/>
+        <p:txBody>
+          <a:bodyPr/>
+          <a:lstStyle/>
+          <a:p>
+            <a:r>
+              <a:rPr lang="he-IL" dirty="0"/>
+              <a:t>כניסת תלמידות – סל הקניות </a:t>
+            </a:r>
+          </a:p>
+        </p:txBody>
+      </p:sp>
+      <p:sp>
+        <p:nvSpPr>
+          <p:cNvPr id="3" name="מציין מיקום תוכן 2">
+            <a:extLst>
+              <a:ext uri="{FF2B5EF4-FFF2-40B4-BE49-F238E27FC236}">
+                <a16:creationId xmlns:a16="http://schemas.microsoft.com/office/drawing/2014/main" id="{752A6DB4-0556-934E-B85A-7ED3EBB064A7}"/>
+              </a:ext>
+            </a:extLst>
+          </p:cNvPr>
+          <p:cNvSpPr>
+            <a:spLocks noGrp="1"/>
+          </p:cNvSpPr>
+          <p:nvPr>
+            <p:ph idx="1"/>
+          </p:nvPr>
+        </p:nvSpPr>
+        <p:spPr/>
+        <p:txBody>
+          <a:bodyPr/>
+          <a:lstStyle/>
+          <a:p>
+            <a:r>
+              <a:rPr lang="he-IL" dirty="0"/>
+              <a:t>צפיה בכל הפריטים בסל </a:t>
+            </a:r>
+          </a:p>
+          <a:p>
+            <a:r>
+              <a:rPr lang="he-IL" dirty="0"/>
+              <a:t>על כל פריט אפשרות למחוק אותו מהסל</a:t>
+            </a:r>
+          </a:p>
+          <a:p>
+            <a:r>
+              <a:rPr lang="he-IL" dirty="0"/>
+              <a:t>צפיה בכמות השוברים הכללית של הקניה </a:t>
+            </a:r>
+          </a:p>
+          <a:p>
+            <a:r>
+              <a:rPr lang="he-IL" dirty="0"/>
+              <a:t>כפתור לסיום הזמנה – בעת לחיצה עליו תוצג הודעת הזהרה "אין החלפות והחזרות כלל!" לחיצה על אישור בהודעת ההזהרה תעדכן את כמות השוברים ותשלח מייל לצוות ניהול על ביצוע הזמנה התלמידה תקבל מספר הזמנה לצורך אימות ההזמנה – זמני בשלב עתידי יותר יהיה ממשק ניהול ולשם ישלחו הזמנות שצריכות טיפול</a:t>
+            </a:r>
+          </a:p>
+          <a:p>
+            <a:r>
+              <a:rPr lang="he-IL" dirty="0"/>
+              <a:t>כפתור לחזרה לעמוד הקיוסק </a:t>
+            </a:r>
+          </a:p>
+          <a:p>
+            <a:endParaRPr lang="he-IL" dirty="0"/>
+          </a:p>
+        </p:txBody>
+      </p:sp>
+    </p:spTree>
+    <p:extLst>
+      <p:ext uri="{BB962C8B-B14F-4D97-AF65-F5344CB8AC3E}">
+        <p14:creationId xmlns:p14="http://schemas.microsoft.com/office/powerpoint/2010/main" val="3372685935"/>
       </p:ext>
     </p:extLst>
   </p:cSld>

</xml_diff>

<commit_message>
Chore: sync gitignore, lockfiles and update project structure
</commit_message>
<xml_diff>
--- a/presentation/פרויקט עיצוב התנהגות - מסכים.pptx
+++ b/presentation/פרויקט עיצוב התנהגות - מסכים.pptx
@@ -14,8 +14,8 @@
     <p:sldId id="262" r:id="rId8"/>
     <p:sldId id="263" r:id="rId9"/>
     <p:sldId id="264" r:id="rId10"/>
-    <p:sldId id="265" r:id="rId11"/>
-    <p:sldId id="266" r:id="rId12"/>
+    <p:sldId id="266" r:id="rId11"/>
+    <p:sldId id="265" r:id="rId12"/>
   </p:sldIdLst>
   <p:sldSz cx="12192000" cy="6858000"/>
   <p:notesSz cx="6858000" cy="9144000"/>
@@ -269,7 +269,7 @@
           <a:p>
             <a:fld id="{1FFCD2AE-C8D6-4C5C-8058-C519C73E84B5}" type="datetimeFigureOut">
               <a:rPr lang="he-IL" smtClean="0"/>
-              <a:t>ז'/כסלו/תשפ"ו</a:t>
+              <a:t>כ"א/כסלו/תשפ"ו</a:t>
             </a:fld>
             <a:endParaRPr lang="he-IL"/>
           </a:p>
@@ -467,7 +467,7 @@
           <a:p>
             <a:fld id="{1FFCD2AE-C8D6-4C5C-8058-C519C73E84B5}" type="datetimeFigureOut">
               <a:rPr lang="he-IL" smtClean="0"/>
-              <a:t>ז'/כסלו/תשפ"ו</a:t>
+              <a:t>כ"א/כסלו/תשפ"ו</a:t>
             </a:fld>
             <a:endParaRPr lang="he-IL"/>
           </a:p>
@@ -675,7 +675,7 @@
           <a:p>
             <a:fld id="{1FFCD2AE-C8D6-4C5C-8058-C519C73E84B5}" type="datetimeFigureOut">
               <a:rPr lang="he-IL" smtClean="0"/>
-              <a:t>ז'/כסלו/תשפ"ו</a:t>
+              <a:t>כ"א/כסלו/תשפ"ו</a:t>
             </a:fld>
             <a:endParaRPr lang="he-IL"/>
           </a:p>
@@ -873,7 +873,7 @@
           <a:p>
             <a:fld id="{1FFCD2AE-C8D6-4C5C-8058-C519C73E84B5}" type="datetimeFigureOut">
               <a:rPr lang="he-IL" smtClean="0"/>
-              <a:t>ז'/כסלו/תשפ"ו</a:t>
+              <a:t>כ"א/כסלו/תשפ"ו</a:t>
             </a:fld>
             <a:endParaRPr lang="he-IL"/>
           </a:p>
@@ -1148,7 +1148,7 @@
           <a:p>
             <a:fld id="{1FFCD2AE-C8D6-4C5C-8058-C519C73E84B5}" type="datetimeFigureOut">
               <a:rPr lang="he-IL" smtClean="0"/>
-              <a:t>ז'/כסלו/תשפ"ו</a:t>
+              <a:t>כ"א/כסלו/תשפ"ו</a:t>
             </a:fld>
             <a:endParaRPr lang="he-IL"/>
           </a:p>
@@ -1413,7 +1413,7 @@
           <a:p>
             <a:fld id="{1FFCD2AE-C8D6-4C5C-8058-C519C73E84B5}" type="datetimeFigureOut">
               <a:rPr lang="he-IL" smtClean="0"/>
-              <a:t>ז'/כסלו/תשפ"ו</a:t>
+              <a:t>כ"א/כסלו/תשפ"ו</a:t>
             </a:fld>
             <a:endParaRPr lang="he-IL"/>
           </a:p>
@@ -1825,7 +1825,7 @@
           <a:p>
             <a:fld id="{1FFCD2AE-C8D6-4C5C-8058-C519C73E84B5}" type="datetimeFigureOut">
               <a:rPr lang="he-IL" smtClean="0"/>
-              <a:t>ז'/כסלו/תשפ"ו</a:t>
+              <a:t>כ"א/כסלו/תשפ"ו</a:t>
             </a:fld>
             <a:endParaRPr lang="he-IL"/>
           </a:p>
@@ -1966,7 +1966,7 @@
           <a:p>
             <a:fld id="{1FFCD2AE-C8D6-4C5C-8058-C519C73E84B5}" type="datetimeFigureOut">
               <a:rPr lang="he-IL" smtClean="0"/>
-              <a:t>ז'/כסלו/תשפ"ו</a:t>
+              <a:t>כ"א/כסלו/תשפ"ו</a:t>
             </a:fld>
             <a:endParaRPr lang="he-IL"/>
           </a:p>
@@ -2079,7 +2079,7 @@
           <a:p>
             <a:fld id="{1FFCD2AE-C8D6-4C5C-8058-C519C73E84B5}" type="datetimeFigureOut">
               <a:rPr lang="he-IL" smtClean="0"/>
-              <a:t>ז'/כסלו/תשפ"ו</a:t>
+              <a:t>כ"א/כסלו/תשפ"ו</a:t>
             </a:fld>
             <a:endParaRPr lang="he-IL"/>
           </a:p>
@@ -2390,7 +2390,7 @@
           <a:p>
             <a:fld id="{1FFCD2AE-C8D6-4C5C-8058-C519C73E84B5}" type="datetimeFigureOut">
               <a:rPr lang="he-IL" smtClean="0"/>
-              <a:t>ז'/כסלו/תשפ"ו</a:t>
+              <a:t>כ"א/כסלו/תשפ"ו</a:t>
             </a:fld>
             <a:endParaRPr lang="he-IL"/>
           </a:p>
@@ -2678,7 +2678,7 @@
           <a:p>
             <a:fld id="{1FFCD2AE-C8D6-4C5C-8058-C519C73E84B5}" type="datetimeFigureOut">
               <a:rPr lang="he-IL" smtClean="0"/>
-              <a:t>ז'/כסלו/תשפ"ו</a:t>
+              <a:t>כ"א/כסלו/תשפ"ו</a:t>
             </a:fld>
             <a:endParaRPr lang="he-IL"/>
           </a:p>
@@ -2919,7 +2919,7 @@
           <a:p>
             <a:fld id="{1FFCD2AE-C8D6-4C5C-8058-C519C73E84B5}" type="datetimeFigureOut">
               <a:rPr lang="he-IL" smtClean="0"/>
-              <a:t>ז'/כסלו/תשפ"ו</a:t>
+              <a:t>כ"א/כסלו/תשפ"ו</a:t>
             </a:fld>
             <a:endParaRPr lang="he-IL"/>
           </a:p>
@@ -3428,6 +3428,121 @@
           </a:prstGeom>
         </p:spPr>
       </p:pic>
+      <p:sp>
+        <p:nvSpPr>
+          <p:cNvPr id="4" name="מלבן 3">
+            <a:extLst>
+              <a:ext uri="{FF2B5EF4-FFF2-40B4-BE49-F238E27FC236}">
+                <a16:creationId xmlns:a16="http://schemas.microsoft.com/office/drawing/2014/main" id="{B7599ACF-1A24-59F0-FE20-01E1E555C682}"/>
+              </a:ext>
+            </a:extLst>
+          </p:cNvPr>
+          <p:cNvSpPr/>
+          <p:nvPr/>
+        </p:nvSpPr>
+        <p:spPr>
+          <a:xfrm>
+            <a:off x="7393646" y="4475623"/>
+            <a:ext cx="3946914" cy="1969770"/>
+          </a:xfrm>
+          <a:prstGeom prst="rect">
+            <a:avLst/>
+          </a:prstGeom>
+          <a:noFill/>
+        </p:spPr>
+        <p:txBody>
+          <a:bodyPr wrap="none" lIns="91440" tIns="45720" rIns="91440" bIns="45720">
+            <a:spAutoFit/>
+          </a:bodyPr>
+          <a:lstStyle/>
+          <a:p>
+            <a:pPr algn="ctr"/>
+            <a:r>
+              <a:rPr lang="en-US" sz="5400" b="1" cap="none" spc="0" dirty="0">
+                <a:ln w="0"/>
+                <a:solidFill>
+                  <a:schemeClr val="tx1"/>
+                </a:solidFill>
+                <a:effectLst>
+                  <a:outerShdw blurRad="38100" dist="19050" dir="2700000" algn="tl" rotWithShape="0">
+                    <a:schemeClr val="dk1">
+                      <a:alpha val="40000"/>
+                    </a:schemeClr>
+                  </a:outerShdw>
+                </a:effectLst>
+                <a:latin typeface="Bradley Hand ITC" panose="03070402050302030203" pitchFamily="66" charset="0"/>
+                <a:cs typeface="Guttman Yad-Brush" panose="02010401010101010101" pitchFamily="2" charset="-79"/>
+              </a:rPr>
+              <a:t>Sara Hartuv</a:t>
+            </a:r>
+          </a:p>
+          <a:p>
+            <a:pPr algn="ctr"/>
+            <a:r>
+              <a:rPr lang="en-US" sz="2400" dirty="0">
+                <a:ln w="0"/>
+                <a:effectLst>
+                  <a:outerShdw blurRad="38100" dist="19050" dir="2700000" algn="tl" rotWithShape="0">
+                    <a:schemeClr val="dk1">
+                      <a:alpha val="40000"/>
+                    </a:schemeClr>
+                  </a:outerShdw>
+                </a:effectLst>
+                <a:latin typeface="Bradley Hand ITC" panose="03070402050302030203" pitchFamily="66" charset="0"/>
+              </a:rPr>
+              <a:t>sarahartuv1@gmail.com</a:t>
+            </a:r>
+            <a:r>
+              <a:rPr lang="en-US" sz="2400" b="1" cap="none" spc="0" dirty="0">
+                <a:ln w="0"/>
+                <a:solidFill>
+                  <a:schemeClr val="tx1"/>
+                </a:solidFill>
+                <a:effectLst>
+                  <a:outerShdw blurRad="38100" dist="19050" dir="2700000" algn="tl" rotWithShape="0">
+                    <a:schemeClr val="dk1">
+                      <a:alpha val="40000"/>
+                    </a:schemeClr>
+                  </a:outerShdw>
+                </a:effectLst>
+                <a:latin typeface="Bradley Hand ITC" panose="03070402050302030203" pitchFamily="66" charset="0"/>
+                <a:cs typeface="Guttman Yad-Brush" panose="02010401010101010101" pitchFamily="2" charset="-79"/>
+              </a:rPr>
+              <a:t> </a:t>
+            </a:r>
+          </a:p>
+          <a:p>
+            <a:pPr algn="ctr"/>
+            <a:r>
+              <a:rPr lang="en-US" sz="4000" dirty="0">
+                <a:ln w="0"/>
+                <a:effectLst>
+                  <a:outerShdw blurRad="38100" dist="19050" dir="2700000" algn="tl" rotWithShape="0">
+                    <a:schemeClr val="dk1">
+                      <a:alpha val="40000"/>
+                    </a:schemeClr>
+                  </a:outerShdw>
+                </a:effectLst>
+                <a:latin typeface="Bradley Hand ITC" panose="03070402050302030203" pitchFamily="66" charset="0"/>
+                <a:cs typeface="Guttman Yad-Brush" panose="02010401010101010101" pitchFamily="2" charset="-79"/>
+              </a:rPr>
+              <a:t>10/12/25</a:t>
+            </a:r>
+            <a:endParaRPr lang="he-IL" sz="4000" dirty="0">
+              <a:ln w="0"/>
+              <a:effectLst>
+                <a:outerShdw blurRad="38100" dist="19050" dir="2700000" algn="tl" rotWithShape="0">
+                  <a:schemeClr val="dk1">
+                    <a:alpha val="40000"/>
+                  </a:schemeClr>
+                </a:outerShdw>
+              </a:effectLst>
+              <a:latin typeface="Bradley Hand ITC" panose="03070402050302030203" pitchFamily="66" charset="0"/>
+              <a:cs typeface="Guttman Yad-Brush" panose="02010401010101010101" pitchFamily="2" charset="-79"/>
+            </a:endParaRPr>
+          </a:p>
+        </p:txBody>
+      </p:sp>
     </p:spTree>
     <p:extLst>
       <p:ext uri="{BB962C8B-B14F-4D97-AF65-F5344CB8AC3E}">
@@ -3442,108 +3557,6 @@
 </file>
 
 <file path=ppt/slides/slide10.xml><?xml version="1.0" encoding="utf-8"?>
-<p:sld xmlns:a="http://schemas.openxmlformats.org/drawingml/2006/main" xmlns:r="http://schemas.openxmlformats.org/officeDocument/2006/relationships" xmlns:p="http://schemas.openxmlformats.org/presentationml/2006/main">
-  <p:cSld>
-    <p:spTree>
-      <p:nvGrpSpPr>
-        <p:cNvPr id="1" name=""/>
-        <p:cNvGrpSpPr/>
-        <p:nvPr/>
-      </p:nvGrpSpPr>
-      <p:grpSpPr>
-        <a:xfrm>
-          <a:off x="0" y="0"/>
-          <a:ext cx="0" cy="0"/>
-          <a:chOff x="0" y="0"/>
-          <a:chExt cx="0" cy="0"/>
-        </a:xfrm>
-      </p:grpSpPr>
-      <p:sp>
-        <p:nvSpPr>
-          <p:cNvPr id="2" name="כותרת 1">
-            <a:extLst>
-              <a:ext uri="{FF2B5EF4-FFF2-40B4-BE49-F238E27FC236}">
-                <a16:creationId xmlns:a16="http://schemas.microsoft.com/office/drawing/2014/main" id="{20506D07-20CE-0926-DCCB-18C9312D022E}"/>
-              </a:ext>
-            </a:extLst>
-          </p:cNvPr>
-          <p:cNvSpPr>
-            <a:spLocks noGrp="1"/>
-          </p:cNvSpPr>
-          <p:nvPr>
-            <p:ph type="title"/>
-          </p:nvPr>
-        </p:nvSpPr>
-        <p:spPr>
-          <a:xfrm>
-            <a:off x="838200" y="3032910"/>
-            <a:ext cx="10515600" cy="1325563"/>
-          </a:xfrm>
-        </p:spPr>
-        <p:txBody>
-          <a:bodyPr>
-            <a:normAutofit/>
-          </a:bodyPr>
-          <a:lstStyle/>
-          <a:p>
-            <a:pPr algn="ctr"/>
-            <a:r>
-              <a:rPr lang="he-IL" sz="4800" dirty="0"/>
-              <a:t>תודה רבה !</a:t>
-            </a:r>
-          </a:p>
-        </p:txBody>
-      </p:sp>
-      <p:pic>
-        <p:nvPicPr>
-          <p:cNvPr id="4" name="תמונה 3">
-            <a:extLst>
-              <a:ext uri="{FF2B5EF4-FFF2-40B4-BE49-F238E27FC236}">
-                <a16:creationId xmlns:a16="http://schemas.microsoft.com/office/drawing/2014/main" id="{4F9EF8B7-6A9F-B447-B80C-15D9F1A2BB58}"/>
-              </a:ext>
-            </a:extLst>
-          </p:cNvPr>
-          <p:cNvPicPr>
-            <a:picLocks noChangeAspect="1"/>
-          </p:cNvPicPr>
-          <p:nvPr/>
-        </p:nvPicPr>
-        <p:blipFill>
-          <a:blip r:embed="rId2">
-            <a:extLst>
-              <a:ext uri="{28A0092B-C50C-407E-A947-70E740481C1C}">
-                <a14:useLocalDpi xmlns:a14="http://schemas.microsoft.com/office/drawing/2010/main" val="0"/>
-              </a:ext>
-            </a:extLst>
-          </a:blip>
-          <a:stretch>
-            <a:fillRect/>
-          </a:stretch>
-        </p:blipFill>
-        <p:spPr>
-          <a:xfrm>
-            <a:off x="0" y="-873558"/>
-            <a:ext cx="3656804" cy="3899767"/>
-          </a:xfrm>
-          <a:prstGeom prst="rect">
-            <a:avLst/>
-          </a:prstGeom>
-        </p:spPr>
-      </p:pic>
-    </p:spTree>
-    <p:extLst>
-      <p:ext uri="{BB962C8B-B14F-4D97-AF65-F5344CB8AC3E}">
-        <p14:creationId xmlns:p14="http://schemas.microsoft.com/office/powerpoint/2010/main" val="1204733904"/>
-      </p:ext>
-    </p:extLst>
-  </p:cSld>
-  <p:clrMapOvr>
-    <a:masterClrMapping/>
-  </p:clrMapOvr>
-</p:sld>
-</file>
-
-<file path=ppt/slides/slide11.xml><?xml version="1.0" encoding="utf-8"?>
 <p:sld xmlns:a="http://schemas.openxmlformats.org/drawingml/2006/main" xmlns:r="http://schemas.openxmlformats.org/officeDocument/2006/relationships" xmlns:p="http://schemas.openxmlformats.org/presentationml/2006/main">
   <p:cSld>
     <p:spTree>
@@ -5187,10 +5200,683 @@
           </a:fontRef>
         </p:style>
       </p:cxnSp>
+      <p:sp>
+        <p:nvSpPr>
+          <p:cNvPr id="4" name="מלבן 3">
+            <a:extLst>
+              <a:ext uri="{FF2B5EF4-FFF2-40B4-BE49-F238E27FC236}">
+                <a16:creationId xmlns:a16="http://schemas.microsoft.com/office/drawing/2014/main" id="{51EF4D5A-071A-A90B-5E17-C879DE8B796F}"/>
+              </a:ext>
+            </a:extLst>
+          </p:cNvPr>
+          <p:cNvSpPr/>
+          <p:nvPr/>
+        </p:nvSpPr>
+        <p:spPr>
+          <a:xfrm>
+            <a:off x="10653010" y="4637834"/>
+            <a:ext cx="607367" cy="1206631"/>
+          </a:xfrm>
+          <a:prstGeom prst="rect">
+            <a:avLst/>
+          </a:prstGeom>
+          <a:solidFill>
+            <a:schemeClr val="accent6">
+              <a:lumMod val="60000"/>
+              <a:lumOff val="40000"/>
+            </a:schemeClr>
+          </a:solidFill>
+        </p:spPr>
+        <p:style>
+          <a:lnRef idx="2">
+            <a:schemeClr val="accent1">
+              <a:shade val="15000"/>
+            </a:schemeClr>
+          </a:lnRef>
+          <a:fillRef idx="1">
+            <a:schemeClr val="accent1"/>
+          </a:fillRef>
+          <a:effectRef idx="0">
+            <a:schemeClr val="accent1"/>
+          </a:effectRef>
+          <a:fontRef idx="minor">
+            <a:schemeClr val="lt1"/>
+          </a:fontRef>
+        </p:style>
+        <p:txBody>
+          <a:bodyPr rtlCol="1" anchor="ctr"/>
+          <a:lstStyle/>
+          <a:p>
+            <a:pPr algn="ctr"/>
+            <a:endParaRPr lang="he-IL" dirty="0"/>
+          </a:p>
+        </p:txBody>
+      </p:sp>
+      <p:sp>
+        <p:nvSpPr>
+          <p:cNvPr id="11" name="מלבן 10">
+            <a:extLst>
+              <a:ext uri="{FF2B5EF4-FFF2-40B4-BE49-F238E27FC236}">
+                <a16:creationId xmlns:a16="http://schemas.microsoft.com/office/drawing/2014/main" id="{26EB523D-539F-4DBE-3155-F6D3CF486E8B}"/>
+              </a:ext>
+            </a:extLst>
+          </p:cNvPr>
+          <p:cNvSpPr/>
+          <p:nvPr/>
+        </p:nvSpPr>
+        <p:spPr>
+          <a:xfrm>
+            <a:off x="11374556" y="4637834"/>
+            <a:ext cx="607367" cy="1206631"/>
+          </a:xfrm>
+          <a:prstGeom prst="rect">
+            <a:avLst/>
+          </a:prstGeom>
+          <a:solidFill>
+            <a:schemeClr val="accent6">
+              <a:lumMod val="60000"/>
+              <a:lumOff val="40000"/>
+            </a:schemeClr>
+          </a:solidFill>
+        </p:spPr>
+        <p:style>
+          <a:lnRef idx="2">
+            <a:schemeClr val="accent1">
+              <a:shade val="15000"/>
+            </a:schemeClr>
+          </a:lnRef>
+          <a:fillRef idx="1">
+            <a:schemeClr val="accent1"/>
+          </a:fillRef>
+          <a:effectRef idx="0">
+            <a:schemeClr val="accent1"/>
+          </a:effectRef>
+          <a:fontRef idx="minor">
+            <a:schemeClr val="lt1"/>
+          </a:fontRef>
+        </p:style>
+        <p:txBody>
+          <a:bodyPr rtlCol="1" anchor="ctr"/>
+          <a:lstStyle/>
+          <a:p>
+            <a:pPr algn="ctr"/>
+            <a:endParaRPr lang="he-IL"/>
+          </a:p>
+        </p:txBody>
+      </p:sp>
+      <p:sp>
+        <p:nvSpPr>
+          <p:cNvPr id="8" name="מלבן 7">
+            <a:extLst>
+              <a:ext uri="{FF2B5EF4-FFF2-40B4-BE49-F238E27FC236}">
+                <a16:creationId xmlns:a16="http://schemas.microsoft.com/office/drawing/2014/main" id="{3550F8B5-3958-C298-4152-1A376A9ABADE}"/>
+              </a:ext>
+            </a:extLst>
+          </p:cNvPr>
+          <p:cNvSpPr/>
+          <p:nvPr/>
+        </p:nvSpPr>
+        <p:spPr>
+          <a:xfrm>
+            <a:off x="11164477" y="4694546"/>
+            <a:ext cx="1027523" cy="1077218"/>
+          </a:xfrm>
+          <a:prstGeom prst="rect">
+            <a:avLst/>
+          </a:prstGeom>
+          <a:noFill/>
+        </p:spPr>
+        <p:txBody>
+          <a:bodyPr wrap="square" lIns="91440" tIns="45720" rIns="91440" bIns="45720">
+            <a:spAutoFit/>
+          </a:bodyPr>
+          <a:lstStyle/>
+          <a:p>
+            <a:pPr algn="ctr"/>
+            <a:r>
+              <a:rPr lang="he-IL" sz="1600" b="0" cap="none" spc="0" dirty="0">
+                <a:ln w="0"/>
+                <a:solidFill>
+                  <a:schemeClr val="tx1"/>
+                </a:solidFill>
+                <a:effectLst>
+                  <a:outerShdw blurRad="38100" dist="19050" dir="2700000" algn="tl" rotWithShape="0">
+                    <a:schemeClr val="dk1">
+                      <a:alpha val="40000"/>
+                    </a:schemeClr>
+                  </a:outerShdw>
+                </a:effectLst>
+              </a:rPr>
+              <a:t>עדכון מספר נקודות שבועי</a:t>
+            </a:r>
+          </a:p>
+        </p:txBody>
+      </p:sp>
+      <p:sp>
+        <p:nvSpPr>
+          <p:cNvPr id="12" name="מלבן 11">
+            <a:extLst>
+              <a:ext uri="{FF2B5EF4-FFF2-40B4-BE49-F238E27FC236}">
+                <a16:creationId xmlns:a16="http://schemas.microsoft.com/office/drawing/2014/main" id="{E66F68F3-D7E0-5611-D666-B5ACD7D77B52}"/>
+              </a:ext>
+            </a:extLst>
+          </p:cNvPr>
+          <p:cNvSpPr/>
+          <p:nvPr/>
+        </p:nvSpPr>
+        <p:spPr>
+          <a:xfrm>
+            <a:off x="10442931" y="4680406"/>
+            <a:ext cx="1027523" cy="1077218"/>
+          </a:xfrm>
+          <a:prstGeom prst="rect">
+            <a:avLst/>
+          </a:prstGeom>
+          <a:noFill/>
+        </p:spPr>
+        <p:txBody>
+          <a:bodyPr wrap="square" lIns="91440" tIns="45720" rIns="91440" bIns="45720">
+            <a:spAutoFit/>
+          </a:bodyPr>
+          <a:lstStyle/>
+          <a:p>
+            <a:pPr algn="ctr"/>
+            <a:r>
+              <a:rPr lang="he-IL" sz="1600" b="0" cap="none" spc="0" dirty="0">
+                <a:ln w="0"/>
+                <a:solidFill>
+                  <a:schemeClr val="tx1"/>
+                </a:solidFill>
+                <a:effectLst>
+                  <a:outerShdw blurRad="38100" dist="19050" dir="2700000" algn="tl" rotWithShape="0">
+                    <a:schemeClr val="dk1">
+                      <a:alpha val="40000"/>
+                    </a:schemeClr>
+                  </a:outerShdw>
+                </a:effectLst>
+              </a:rPr>
+              <a:t>עדכון אישור שובר או ביטול</a:t>
+            </a:r>
+          </a:p>
+        </p:txBody>
+      </p:sp>
+      <p:cxnSp>
+        <p:nvCxnSpPr>
+          <p:cNvPr id="13" name="מחבר חץ ישר 12">
+            <a:extLst>
+              <a:ext uri="{FF2B5EF4-FFF2-40B4-BE49-F238E27FC236}">
+                <a16:creationId xmlns:a16="http://schemas.microsoft.com/office/drawing/2014/main" id="{3E2827CF-FAF1-31D3-8DFF-7EEF1F1589F6}"/>
+              </a:ext>
+            </a:extLst>
+          </p:cNvPr>
+          <p:cNvCxnSpPr>
+            <a:cxnSpLocks/>
+          </p:cNvCxnSpPr>
+          <p:nvPr/>
+        </p:nvCxnSpPr>
+        <p:spPr>
+          <a:xfrm>
+            <a:off x="10807437" y="4449450"/>
+            <a:ext cx="0" cy="245096"/>
+          </a:xfrm>
+          <a:prstGeom prst="straightConnector1">
+            <a:avLst/>
+          </a:prstGeom>
+          <a:ln>
+            <a:solidFill>
+              <a:schemeClr val="tx1"/>
+            </a:solidFill>
+            <a:headEnd type="triangle"/>
+            <a:tailEnd type="triangle"/>
+          </a:ln>
+        </p:spPr>
+        <p:style>
+          <a:lnRef idx="1">
+            <a:schemeClr val="accent1"/>
+          </a:lnRef>
+          <a:fillRef idx="0">
+            <a:schemeClr val="accent1"/>
+          </a:fillRef>
+          <a:effectRef idx="0">
+            <a:schemeClr val="accent1"/>
+          </a:effectRef>
+          <a:fontRef idx="minor">
+            <a:schemeClr val="tx1"/>
+          </a:fontRef>
+        </p:style>
+      </p:cxnSp>
+      <p:cxnSp>
+        <p:nvCxnSpPr>
+          <p:cNvPr id="14" name="מחבר חץ ישר 13">
+            <a:extLst>
+              <a:ext uri="{FF2B5EF4-FFF2-40B4-BE49-F238E27FC236}">
+                <a16:creationId xmlns:a16="http://schemas.microsoft.com/office/drawing/2014/main" id="{DA55897D-0E3E-5587-C6A9-CDED88F8A0AB}"/>
+              </a:ext>
+            </a:extLst>
+          </p:cNvPr>
+          <p:cNvCxnSpPr>
+            <a:cxnSpLocks/>
+          </p:cNvCxnSpPr>
+          <p:nvPr/>
+        </p:nvCxnSpPr>
+        <p:spPr>
+          <a:xfrm>
+            <a:off x="10979083" y="4477731"/>
+            <a:ext cx="616799" cy="216815"/>
+          </a:xfrm>
+          <a:prstGeom prst="straightConnector1">
+            <a:avLst/>
+          </a:prstGeom>
+          <a:ln>
+            <a:solidFill>
+              <a:schemeClr val="tx1"/>
+            </a:solidFill>
+            <a:headEnd type="triangle"/>
+            <a:tailEnd type="triangle"/>
+          </a:ln>
+        </p:spPr>
+        <p:style>
+          <a:lnRef idx="1">
+            <a:schemeClr val="accent1"/>
+          </a:lnRef>
+          <a:fillRef idx="0">
+            <a:schemeClr val="accent1"/>
+          </a:fillRef>
+          <a:effectRef idx="0">
+            <a:schemeClr val="accent1"/>
+          </a:effectRef>
+          <a:fontRef idx="minor">
+            <a:schemeClr val="tx1"/>
+          </a:fontRef>
+        </p:style>
+      </p:cxnSp>
+      <p:sp>
+        <p:nvSpPr>
+          <p:cNvPr id="17" name="מלבן 16">
+            <a:extLst>
+              <a:ext uri="{FF2B5EF4-FFF2-40B4-BE49-F238E27FC236}">
+                <a16:creationId xmlns:a16="http://schemas.microsoft.com/office/drawing/2014/main" id="{F3655F1B-2B88-56D9-B6CC-2479172768FD}"/>
+              </a:ext>
+            </a:extLst>
+          </p:cNvPr>
+          <p:cNvSpPr/>
+          <p:nvPr/>
+        </p:nvSpPr>
+        <p:spPr>
+          <a:xfrm>
+            <a:off x="9893036" y="4629839"/>
+            <a:ext cx="607367" cy="1206631"/>
+          </a:xfrm>
+          <a:prstGeom prst="rect">
+            <a:avLst/>
+          </a:prstGeom>
+          <a:solidFill>
+            <a:schemeClr val="accent6">
+              <a:lumMod val="60000"/>
+              <a:lumOff val="40000"/>
+            </a:schemeClr>
+          </a:solidFill>
+        </p:spPr>
+        <p:style>
+          <a:lnRef idx="2">
+            <a:schemeClr val="accent1">
+              <a:shade val="15000"/>
+            </a:schemeClr>
+          </a:lnRef>
+          <a:fillRef idx="1">
+            <a:schemeClr val="accent1"/>
+          </a:fillRef>
+          <a:effectRef idx="0">
+            <a:schemeClr val="accent1"/>
+          </a:effectRef>
+          <a:fontRef idx="minor">
+            <a:schemeClr val="lt1"/>
+          </a:fontRef>
+        </p:style>
+        <p:txBody>
+          <a:bodyPr rtlCol="1" anchor="ctr"/>
+          <a:lstStyle/>
+          <a:p>
+            <a:pPr algn="ctr"/>
+            <a:endParaRPr lang="he-IL" dirty="0"/>
+          </a:p>
+        </p:txBody>
+      </p:sp>
+      <p:sp>
+        <p:nvSpPr>
+          <p:cNvPr id="21" name="מלבן 20">
+            <a:extLst>
+              <a:ext uri="{FF2B5EF4-FFF2-40B4-BE49-F238E27FC236}">
+                <a16:creationId xmlns:a16="http://schemas.microsoft.com/office/drawing/2014/main" id="{BF471252-BA02-AD73-5409-084635F5BEF2}"/>
+              </a:ext>
+            </a:extLst>
+          </p:cNvPr>
+          <p:cNvSpPr/>
+          <p:nvPr/>
+        </p:nvSpPr>
+        <p:spPr>
+          <a:xfrm>
+            <a:off x="9696252" y="4778200"/>
+            <a:ext cx="1027523" cy="830997"/>
+          </a:xfrm>
+          <a:prstGeom prst="rect">
+            <a:avLst/>
+          </a:prstGeom>
+          <a:noFill/>
+        </p:spPr>
+        <p:txBody>
+          <a:bodyPr wrap="square" lIns="91440" tIns="45720" rIns="91440" bIns="45720">
+            <a:spAutoFit/>
+          </a:bodyPr>
+          <a:lstStyle/>
+          <a:p>
+            <a:pPr algn="ctr"/>
+            <a:r>
+              <a:rPr lang="he-IL" sz="1600" b="0" cap="none" spc="0" dirty="0">
+                <a:ln w="0"/>
+                <a:solidFill>
+                  <a:schemeClr val="tx1"/>
+                </a:solidFill>
+                <a:effectLst>
+                  <a:outerShdw blurRad="38100" dist="19050" dir="2700000" algn="tl" rotWithShape="0">
+                    <a:schemeClr val="dk1">
+                      <a:alpha val="40000"/>
+                    </a:schemeClr>
+                  </a:outerShdw>
+                </a:effectLst>
+              </a:rPr>
+              <a:t>הוספת הערה לתלמידה </a:t>
+            </a:r>
+          </a:p>
+        </p:txBody>
+      </p:sp>
+      <p:cxnSp>
+        <p:nvCxnSpPr>
+          <p:cNvPr id="26" name="מחבר חץ ישר 25">
+            <a:extLst>
+              <a:ext uri="{FF2B5EF4-FFF2-40B4-BE49-F238E27FC236}">
+                <a16:creationId xmlns:a16="http://schemas.microsoft.com/office/drawing/2014/main" id="{4D472921-A6C0-E139-3991-D45F45AB9D5E}"/>
+              </a:ext>
+            </a:extLst>
+          </p:cNvPr>
+          <p:cNvCxnSpPr>
+            <a:cxnSpLocks/>
+            <a:endCxn id="17" idx="0"/>
+          </p:cNvCxnSpPr>
+          <p:nvPr/>
+        </p:nvCxnSpPr>
+        <p:spPr>
+          <a:xfrm flipH="1">
+            <a:off x="10196720" y="4477730"/>
+            <a:ext cx="174996" cy="152109"/>
+          </a:xfrm>
+          <a:prstGeom prst="straightConnector1">
+            <a:avLst/>
+          </a:prstGeom>
+          <a:ln>
+            <a:solidFill>
+              <a:schemeClr val="tx1"/>
+            </a:solidFill>
+            <a:headEnd type="triangle"/>
+            <a:tailEnd type="triangle"/>
+          </a:ln>
+        </p:spPr>
+        <p:style>
+          <a:lnRef idx="1">
+            <a:schemeClr val="accent1"/>
+          </a:lnRef>
+          <a:fillRef idx="0">
+            <a:schemeClr val="accent1"/>
+          </a:fillRef>
+          <a:effectRef idx="0">
+            <a:schemeClr val="accent1"/>
+          </a:effectRef>
+          <a:fontRef idx="minor">
+            <a:schemeClr val="tx1"/>
+          </a:fontRef>
+        </p:style>
+      </p:cxnSp>
     </p:spTree>
     <p:extLst>
       <p:ext uri="{BB962C8B-B14F-4D97-AF65-F5344CB8AC3E}">
         <p14:creationId xmlns:p14="http://schemas.microsoft.com/office/powerpoint/2010/main" val="3653243272"/>
+      </p:ext>
+    </p:extLst>
+  </p:cSld>
+  <p:clrMapOvr>
+    <a:masterClrMapping/>
+  </p:clrMapOvr>
+</p:sld>
+</file>
+
+<file path=ppt/slides/slide11.xml><?xml version="1.0" encoding="utf-8"?>
+<p:sld xmlns:a="http://schemas.openxmlformats.org/drawingml/2006/main" xmlns:r="http://schemas.openxmlformats.org/officeDocument/2006/relationships" xmlns:p="http://schemas.openxmlformats.org/presentationml/2006/main">
+  <p:cSld>
+    <p:spTree>
+      <p:nvGrpSpPr>
+        <p:cNvPr id="1" name=""/>
+        <p:cNvGrpSpPr/>
+        <p:nvPr/>
+      </p:nvGrpSpPr>
+      <p:grpSpPr>
+        <a:xfrm>
+          <a:off x="0" y="0"/>
+          <a:ext cx="0" cy="0"/>
+          <a:chOff x="0" y="0"/>
+          <a:chExt cx="0" cy="0"/>
+        </a:xfrm>
+      </p:grpSpPr>
+      <p:pic>
+        <p:nvPicPr>
+          <p:cNvPr id="4" name="תמונה 3">
+            <a:extLst>
+              <a:ext uri="{FF2B5EF4-FFF2-40B4-BE49-F238E27FC236}">
+                <a16:creationId xmlns:a16="http://schemas.microsoft.com/office/drawing/2014/main" id="{4F9EF8B7-6A9F-B447-B80C-15D9F1A2BB58}"/>
+              </a:ext>
+            </a:extLst>
+          </p:cNvPr>
+          <p:cNvPicPr>
+            <a:picLocks noChangeAspect="1"/>
+          </p:cNvPicPr>
+          <p:nvPr/>
+        </p:nvPicPr>
+        <p:blipFill>
+          <a:blip r:embed="rId2">
+            <a:extLst>
+              <a:ext uri="{28A0092B-C50C-407E-A947-70E740481C1C}">
+                <a14:useLocalDpi xmlns:a14="http://schemas.microsoft.com/office/drawing/2010/main" val="0"/>
+              </a:ext>
+            </a:extLst>
+          </a:blip>
+          <a:stretch>
+            <a:fillRect/>
+          </a:stretch>
+        </p:blipFill>
+        <p:spPr>
+          <a:xfrm>
+            <a:off x="0" y="-873558"/>
+            <a:ext cx="3656804" cy="3899767"/>
+          </a:xfrm>
+          <a:prstGeom prst="rect">
+            <a:avLst/>
+          </a:prstGeom>
+        </p:spPr>
+      </p:pic>
+      <p:sp>
+        <p:nvSpPr>
+          <p:cNvPr id="7" name="כותרת 1">
+            <a:extLst>
+              <a:ext uri="{FF2B5EF4-FFF2-40B4-BE49-F238E27FC236}">
+                <a16:creationId xmlns:a16="http://schemas.microsoft.com/office/drawing/2014/main" id="{2DE4E65B-E66F-980F-68B8-B3EF13164A74}"/>
+              </a:ext>
+            </a:extLst>
+          </p:cNvPr>
+          <p:cNvSpPr txBox="1">
+            <a:spLocks/>
+          </p:cNvSpPr>
+          <p:nvPr/>
+        </p:nvSpPr>
+        <p:spPr>
+          <a:xfrm>
+            <a:off x="838200" y="2429595"/>
+            <a:ext cx="10515600" cy="1325563"/>
+          </a:xfrm>
+          <a:prstGeom prst="rect">
+            <a:avLst/>
+          </a:prstGeom>
+        </p:spPr>
+        <p:txBody>
+          <a:bodyPr vert="horz" lIns="91440" tIns="45720" rIns="91440" bIns="45720" rtlCol="1" anchor="ctr">
+            <a:normAutofit/>
+          </a:bodyPr>
+          <a:lstStyle>
+            <a:lvl1pPr algn="r" defTabSz="914400" rtl="1" eaLnBrk="1" latinLnBrk="0" hangingPunct="1">
+              <a:lnSpc>
+                <a:spcPct val="90000"/>
+              </a:lnSpc>
+              <a:spcBef>
+                <a:spcPct val="0"/>
+              </a:spcBef>
+              <a:buNone/>
+              <a:defRPr sz="4400" kern="1200">
+                <a:solidFill>
+                  <a:schemeClr val="tx1"/>
+                </a:solidFill>
+                <a:latin typeface="+mj-lt"/>
+                <a:ea typeface="+mj-ea"/>
+                <a:cs typeface="+mj-cs"/>
+              </a:defRPr>
+            </a:lvl1pPr>
+          </a:lstStyle>
+          <a:p>
+            <a:pPr algn="ctr"/>
+            <a:r>
+              <a:rPr lang="en-US" sz="7200" b="1"/>
+              <a:t>Thank you! </a:t>
+            </a:r>
+            <a:endParaRPr lang="he-IL" sz="7200" b="1" dirty="0"/>
+          </a:p>
+        </p:txBody>
+      </p:sp>
+      <p:sp>
+        <p:nvSpPr>
+          <p:cNvPr id="8" name="מלבן 7">
+            <a:extLst>
+              <a:ext uri="{FF2B5EF4-FFF2-40B4-BE49-F238E27FC236}">
+                <a16:creationId xmlns:a16="http://schemas.microsoft.com/office/drawing/2014/main" id="{A56E48FE-7820-D19B-A634-DCCBAB70C97D}"/>
+              </a:ext>
+            </a:extLst>
+          </p:cNvPr>
+          <p:cNvSpPr/>
+          <p:nvPr/>
+        </p:nvSpPr>
+        <p:spPr>
+          <a:xfrm>
+            <a:off x="7393646" y="4475623"/>
+            <a:ext cx="3946914" cy="1969770"/>
+          </a:xfrm>
+          <a:prstGeom prst="rect">
+            <a:avLst/>
+          </a:prstGeom>
+          <a:noFill/>
+        </p:spPr>
+        <p:txBody>
+          <a:bodyPr wrap="none" lIns="91440" tIns="45720" rIns="91440" bIns="45720">
+            <a:spAutoFit/>
+          </a:bodyPr>
+          <a:lstStyle/>
+          <a:p>
+            <a:pPr algn="ctr"/>
+            <a:r>
+              <a:rPr lang="en-US" sz="5400" b="1" cap="none" spc="0" dirty="0">
+                <a:ln w="0"/>
+                <a:solidFill>
+                  <a:schemeClr val="tx1"/>
+                </a:solidFill>
+                <a:effectLst>
+                  <a:outerShdw blurRad="38100" dist="19050" dir="2700000" algn="tl" rotWithShape="0">
+                    <a:schemeClr val="dk1">
+                      <a:alpha val="40000"/>
+                    </a:schemeClr>
+                  </a:outerShdw>
+                </a:effectLst>
+                <a:latin typeface="Bradley Hand ITC" panose="03070402050302030203" pitchFamily="66" charset="0"/>
+                <a:cs typeface="Guttman Yad-Brush" panose="02010401010101010101" pitchFamily="2" charset="-79"/>
+              </a:rPr>
+              <a:t>Sara Hartuv</a:t>
+            </a:r>
+          </a:p>
+          <a:p>
+            <a:pPr algn="ctr"/>
+            <a:r>
+              <a:rPr lang="en-US" sz="2400" dirty="0">
+                <a:ln w="0"/>
+                <a:effectLst>
+                  <a:outerShdw blurRad="38100" dist="19050" dir="2700000" algn="tl" rotWithShape="0">
+                    <a:schemeClr val="dk1">
+                      <a:alpha val="40000"/>
+                    </a:schemeClr>
+                  </a:outerShdw>
+                </a:effectLst>
+                <a:latin typeface="Bradley Hand ITC" panose="03070402050302030203" pitchFamily="66" charset="0"/>
+              </a:rPr>
+              <a:t>sarahartuv1@gmail.com</a:t>
+            </a:r>
+            <a:r>
+              <a:rPr lang="en-US" sz="2400" b="1" cap="none" spc="0" dirty="0">
+                <a:ln w="0"/>
+                <a:solidFill>
+                  <a:schemeClr val="tx1"/>
+                </a:solidFill>
+                <a:effectLst>
+                  <a:outerShdw blurRad="38100" dist="19050" dir="2700000" algn="tl" rotWithShape="0">
+                    <a:schemeClr val="dk1">
+                      <a:alpha val="40000"/>
+                    </a:schemeClr>
+                  </a:outerShdw>
+                </a:effectLst>
+                <a:latin typeface="Bradley Hand ITC" panose="03070402050302030203" pitchFamily="66" charset="0"/>
+                <a:cs typeface="Guttman Yad-Brush" panose="02010401010101010101" pitchFamily="2" charset="-79"/>
+              </a:rPr>
+              <a:t> </a:t>
+            </a:r>
+          </a:p>
+          <a:p>
+            <a:pPr algn="ctr"/>
+            <a:r>
+              <a:rPr lang="en-US" sz="4000" dirty="0">
+                <a:ln w="0"/>
+                <a:effectLst>
+                  <a:outerShdw blurRad="38100" dist="19050" dir="2700000" algn="tl" rotWithShape="0">
+                    <a:schemeClr val="dk1">
+                      <a:alpha val="40000"/>
+                    </a:schemeClr>
+                  </a:outerShdw>
+                </a:effectLst>
+                <a:latin typeface="Bradley Hand ITC" panose="03070402050302030203" pitchFamily="66" charset="0"/>
+                <a:cs typeface="Guttman Yad-Brush" panose="02010401010101010101" pitchFamily="2" charset="-79"/>
+              </a:rPr>
+              <a:t>10/12/25</a:t>
+            </a:r>
+            <a:endParaRPr lang="he-IL" sz="4000" dirty="0">
+              <a:ln w="0"/>
+              <a:effectLst>
+                <a:outerShdw blurRad="38100" dist="19050" dir="2700000" algn="tl" rotWithShape="0">
+                  <a:schemeClr val="dk1">
+                    <a:alpha val="40000"/>
+                  </a:schemeClr>
+                </a:outerShdw>
+              </a:effectLst>
+              <a:latin typeface="Bradley Hand ITC" panose="03070402050302030203" pitchFamily="66" charset="0"/>
+              <a:cs typeface="Guttman Yad-Brush" panose="02010401010101010101" pitchFamily="2" charset="-79"/>
+            </a:endParaRPr>
+          </a:p>
+        </p:txBody>
+      </p:sp>
+    </p:spTree>
+    <p:extLst>
+      <p:ext uri="{BB962C8B-B14F-4D97-AF65-F5344CB8AC3E}">
+        <p14:creationId xmlns:p14="http://schemas.microsoft.com/office/powerpoint/2010/main" val="1204733904"/>
       </p:ext>
     </p:extLst>
   </p:cSld>
@@ -6229,19 +6915,31 @@
           <a:p>
             <a:r>
               <a:rPr lang="he-IL" dirty="0"/>
+              <a:t>סיכום לפי תקופות</a:t>
+            </a:r>
+          </a:p>
+          <a:p>
+            <a:r>
+              <a:rPr lang="he-IL" dirty="0"/>
               <a:t>ניתן לשנות את מספר השוברים </a:t>
             </a:r>
           </a:p>
           <a:p>
             <a:r>
               <a:rPr lang="he-IL" dirty="0"/>
-              <a:t>ניתן לשנות את מספר שוברי הבועה </a:t>
+              <a:t>ניתן לשנות את מספר שוברי הבועה – בת שבע ומירי</a:t>
             </a:r>
           </a:p>
           <a:p>
             <a:r>
               <a:rPr lang="he-IL" dirty="0"/>
-              <a:t>מוצג מספר השוברים שאמור להיות לה לפי הנקודות </a:t>
+              <a:t>מוצג מספר השוברים שאמור להיות לה לפי הנקודות</a:t>
+            </a:r>
+          </a:p>
+          <a:p>
+            <a:r>
+              <a:rPr lang="he-IL" dirty="0"/>
+              <a:t>הוספת הערה לתלמידה </a:t>
             </a:r>
           </a:p>
           <a:p>
@@ -6345,7 +7043,7 @@
           <a:p>
             <a:r>
               <a:rPr lang="he-IL" dirty="0"/>
-              <a:t>הוקמה תשתית להקמה </a:t>
+              <a:t>הוקמה תשתית לפיתוח עתידני </a:t>
             </a:r>
           </a:p>
         </p:txBody>
@@ -6456,6 +7154,20 @@
             <a:r>
               <a:rPr lang="he-IL" dirty="0"/>
               <a:t>בהמשך מעבר לתגמול החודשי רעיונות לשיפור והוספת מוצרים </a:t>
+            </a:r>
+          </a:p>
+          <a:p>
+            <a:r>
+              <a:rPr lang="he-IL" dirty="0"/>
+              <a:t>צפיה במצב אישי לפי חודש </a:t>
+            </a:r>
+            <a:r>
+              <a:rPr lang="en-US" dirty="0"/>
+              <a:t>/</a:t>
+            </a:r>
+            <a:r>
+              <a:rPr lang="he-IL" dirty="0"/>
+              <a:t> שנה וכו'</a:t>
             </a:r>
           </a:p>
         </p:txBody>

</xml_diff>

<commit_message>
feat: implement student dashboard and integrate with store
</commit_message>
<xml_diff>
--- a/presentation/פרויקט עיצוב התנהגות - מסכים.pptx
+++ b/presentation/פרויקט עיצוב התנהגות - מסכים.pptx
@@ -269,7 +269,7 @@
           <a:p>
             <a:fld id="{1FFCD2AE-C8D6-4C5C-8058-C519C73E84B5}" type="datetimeFigureOut">
               <a:rPr lang="he-IL" smtClean="0"/>
-              <a:t>כ"א/כסלו/תשפ"ו</a:t>
+              <a:t>כ"ט/כסלו/תשפ"ו</a:t>
             </a:fld>
             <a:endParaRPr lang="he-IL"/>
           </a:p>
@@ -467,7 +467,7 @@
           <a:p>
             <a:fld id="{1FFCD2AE-C8D6-4C5C-8058-C519C73E84B5}" type="datetimeFigureOut">
               <a:rPr lang="he-IL" smtClean="0"/>
-              <a:t>כ"א/כסלו/תשפ"ו</a:t>
+              <a:t>כ"ט/כסלו/תשפ"ו</a:t>
             </a:fld>
             <a:endParaRPr lang="he-IL"/>
           </a:p>
@@ -675,7 +675,7 @@
           <a:p>
             <a:fld id="{1FFCD2AE-C8D6-4C5C-8058-C519C73E84B5}" type="datetimeFigureOut">
               <a:rPr lang="he-IL" smtClean="0"/>
-              <a:t>כ"א/כסלו/תשפ"ו</a:t>
+              <a:t>כ"ט/כסלו/תשפ"ו</a:t>
             </a:fld>
             <a:endParaRPr lang="he-IL"/>
           </a:p>
@@ -873,7 +873,7 @@
           <a:p>
             <a:fld id="{1FFCD2AE-C8D6-4C5C-8058-C519C73E84B5}" type="datetimeFigureOut">
               <a:rPr lang="he-IL" smtClean="0"/>
-              <a:t>כ"א/כסלו/תשפ"ו</a:t>
+              <a:t>כ"ט/כסלו/תשפ"ו</a:t>
             </a:fld>
             <a:endParaRPr lang="he-IL"/>
           </a:p>
@@ -1148,7 +1148,7 @@
           <a:p>
             <a:fld id="{1FFCD2AE-C8D6-4C5C-8058-C519C73E84B5}" type="datetimeFigureOut">
               <a:rPr lang="he-IL" smtClean="0"/>
-              <a:t>כ"א/כסלו/תשפ"ו</a:t>
+              <a:t>כ"ט/כסלו/תשפ"ו</a:t>
             </a:fld>
             <a:endParaRPr lang="he-IL"/>
           </a:p>
@@ -1413,7 +1413,7 @@
           <a:p>
             <a:fld id="{1FFCD2AE-C8D6-4C5C-8058-C519C73E84B5}" type="datetimeFigureOut">
               <a:rPr lang="he-IL" smtClean="0"/>
-              <a:t>כ"א/כסלו/תשפ"ו</a:t>
+              <a:t>כ"ט/כסלו/תשפ"ו</a:t>
             </a:fld>
             <a:endParaRPr lang="he-IL"/>
           </a:p>
@@ -1825,7 +1825,7 @@
           <a:p>
             <a:fld id="{1FFCD2AE-C8D6-4C5C-8058-C519C73E84B5}" type="datetimeFigureOut">
               <a:rPr lang="he-IL" smtClean="0"/>
-              <a:t>כ"א/כסלו/תשפ"ו</a:t>
+              <a:t>כ"ט/כסלו/תשפ"ו</a:t>
             </a:fld>
             <a:endParaRPr lang="he-IL"/>
           </a:p>
@@ -1966,7 +1966,7 @@
           <a:p>
             <a:fld id="{1FFCD2AE-C8D6-4C5C-8058-C519C73E84B5}" type="datetimeFigureOut">
               <a:rPr lang="he-IL" smtClean="0"/>
-              <a:t>כ"א/כסלו/תשפ"ו</a:t>
+              <a:t>כ"ט/כסלו/תשפ"ו</a:t>
             </a:fld>
             <a:endParaRPr lang="he-IL"/>
           </a:p>
@@ -2079,7 +2079,7 @@
           <a:p>
             <a:fld id="{1FFCD2AE-C8D6-4C5C-8058-C519C73E84B5}" type="datetimeFigureOut">
               <a:rPr lang="he-IL" smtClean="0"/>
-              <a:t>כ"א/כסלו/תשפ"ו</a:t>
+              <a:t>כ"ט/כסלו/תשפ"ו</a:t>
             </a:fld>
             <a:endParaRPr lang="he-IL"/>
           </a:p>
@@ -2390,7 +2390,7 @@
           <a:p>
             <a:fld id="{1FFCD2AE-C8D6-4C5C-8058-C519C73E84B5}" type="datetimeFigureOut">
               <a:rPr lang="he-IL" smtClean="0"/>
-              <a:t>כ"א/כסלו/תשפ"ו</a:t>
+              <a:t>כ"ט/כסלו/תשפ"ו</a:t>
             </a:fld>
             <a:endParaRPr lang="he-IL"/>
           </a:p>
@@ -2678,7 +2678,7 @@
           <a:p>
             <a:fld id="{1FFCD2AE-C8D6-4C5C-8058-C519C73E84B5}" type="datetimeFigureOut">
               <a:rPr lang="he-IL" smtClean="0"/>
-              <a:t>כ"א/כסלו/תשפ"ו</a:t>
+              <a:t>כ"ט/כסלו/תשפ"ו</a:t>
             </a:fld>
             <a:endParaRPr lang="he-IL"/>
           </a:p>
@@ -2919,7 +2919,7 @@
           <a:p>
             <a:fld id="{1FFCD2AE-C8D6-4C5C-8058-C519C73E84B5}" type="datetimeFigureOut">
               <a:rPr lang="he-IL" smtClean="0"/>
-              <a:t>כ"א/כסלו/תשפ"ו</a:t>
+              <a:t>כ"ט/כסלו/תשפ"ו</a:t>
             </a:fld>
             <a:endParaRPr lang="he-IL"/>
           </a:p>
@@ -3587,8 +3587,8 @@
         </p:nvSpPr>
         <p:spPr>
           <a:xfrm>
-            <a:off x="5486400" y="84841"/>
-            <a:ext cx="1857080" cy="678730"/>
+            <a:off x="5438087" y="461913"/>
+            <a:ext cx="1857080" cy="300242"/>
           </a:xfrm>
           <a:prstGeom prst="rect">
             <a:avLst/>
@@ -3644,7 +3644,7 @@
         </p:nvSpPr>
         <p:spPr>
           <a:xfrm>
-            <a:off x="5577210" y="254929"/>
+            <a:off x="5498574" y="436098"/>
             <a:ext cx="1675459" cy="338554"/>
           </a:xfrm>
           <a:prstGeom prst="rect">
@@ -3694,7 +3694,7 @@
         </p:nvCxnSpPr>
         <p:spPr>
           <a:xfrm flipH="1">
-            <a:off x="2403835" y="763571"/>
+            <a:off x="2366127" y="801278"/>
             <a:ext cx="3692165" cy="367645"/>
           </a:xfrm>
           <a:prstGeom prst="straightConnector1">
@@ -3739,7 +3739,7 @@
         </p:nvCxnSpPr>
         <p:spPr>
           <a:xfrm>
-            <a:off x="6429079" y="763571"/>
+            <a:off x="6391371" y="801278"/>
             <a:ext cx="0" cy="367645"/>
           </a:xfrm>
           <a:prstGeom prst="straightConnector1">
@@ -3784,7 +3784,7 @@
         </p:nvCxnSpPr>
         <p:spPr>
           <a:xfrm flipH="1" flipV="1">
-            <a:off x="6698529" y="784577"/>
+            <a:off x="6660821" y="822284"/>
             <a:ext cx="3557440" cy="346639"/>
           </a:xfrm>
           <a:prstGeom prst="straightConnector1">
@@ -3827,7 +3827,7 @@
         </p:nvSpPr>
         <p:spPr>
           <a:xfrm>
-            <a:off x="9954705" y="1131216"/>
+            <a:off x="9916997" y="1168923"/>
             <a:ext cx="1538140" cy="471341"/>
           </a:xfrm>
           <a:prstGeom prst="rect">
@@ -3884,7 +3884,7 @@
         </p:nvSpPr>
         <p:spPr>
           <a:xfrm>
-            <a:off x="1710934" y="1141984"/>
+            <a:off x="1673226" y="1179691"/>
             <a:ext cx="1538140" cy="471341"/>
           </a:xfrm>
           <a:prstGeom prst="rect">
@@ -3941,7 +3941,7 @@
         </p:nvSpPr>
         <p:spPr>
           <a:xfrm>
-            <a:off x="5794735" y="1132557"/>
+            <a:off x="5757027" y="1170264"/>
             <a:ext cx="1538140" cy="471341"/>
           </a:xfrm>
           <a:prstGeom prst="rect">
@@ -3998,7 +3998,7 @@
         </p:nvSpPr>
         <p:spPr>
           <a:xfrm>
-            <a:off x="10270767" y="1161649"/>
+            <a:off x="10233059" y="1199356"/>
             <a:ext cx="906018" cy="338554"/>
           </a:xfrm>
           <a:prstGeom prst="rect">
@@ -4046,7 +4046,7 @@
         </p:nvSpPr>
         <p:spPr>
           <a:xfrm>
-            <a:off x="5974478" y="1188359"/>
+            <a:off x="5936770" y="1226066"/>
             <a:ext cx="1132041" cy="338554"/>
           </a:xfrm>
           <a:prstGeom prst="rect">
@@ -4094,7 +4094,7 @@
         </p:nvSpPr>
         <p:spPr>
           <a:xfrm>
-            <a:off x="1656971" y="1191500"/>
+            <a:off x="1619263" y="1229207"/>
             <a:ext cx="1592103" cy="338554"/>
           </a:xfrm>
           <a:prstGeom prst="rect">
@@ -4142,7 +4142,7 @@
         </p:nvSpPr>
         <p:spPr>
           <a:xfrm>
-            <a:off x="10159999" y="1847654"/>
+            <a:off x="10122291" y="1885361"/>
             <a:ext cx="1027523" cy="1206631"/>
           </a:xfrm>
           <a:prstGeom prst="rect">
@@ -4194,7 +4194,7 @@
         </p:nvSpPr>
         <p:spPr>
           <a:xfrm>
-            <a:off x="10157905" y="3271100"/>
+            <a:off x="10120197" y="3308807"/>
             <a:ext cx="1027523" cy="1206631"/>
           </a:xfrm>
           <a:prstGeom prst="rect">
@@ -4248,7 +4248,7 @@
         </p:nvCxnSpPr>
         <p:spPr>
           <a:xfrm>
-            <a:off x="10683187" y="1602558"/>
+            <a:off x="10645479" y="1640265"/>
             <a:ext cx="0" cy="245096"/>
           </a:xfrm>
           <a:prstGeom prst="straightConnector1">
@@ -4291,8 +4291,8 @@
         </p:nvSpPr>
         <p:spPr>
           <a:xfrm>
-            <a:off x="10169425" y="2073898"/>
-            <a:ext cx="1027523" cy="584775"/>
+            <a:off x="10121437" y="1909875"/>
+            <a:ext cx="1027523" cy="1200329"/>
           </a:xfrm>
           <a:prstGeom prst="rect">
             <a:avLst/>
@@ -4307,7 +4307,7 @@
           <a:p>
             <a:pPr algn="ctr"/>
             <a:r>
-              <a:rPr lang="he-IL" sz="1600" b="0" cap="none" spc="0" dirty="0">
+              <a:rPr lang="he-IL" sz="1200" b="0" cap="none" spc="0" dirty="0">
                 <a:ln w="0"/>
                 <a:solidFill>
                   <a:schemeClr val="tx1"/>
@@ -4320,8 +4320,37 @@
                   </a:outerShdw>
                 </a:effectLst>
               </a:rPr>
-              <a:t>מצב כלל התלמידות</a:t>
-            </a:r>
+              <a:t>מצב כלל התלמידות (שבועי) + אפשרויות עדכון שבועיות </a:t>
+            </a:r>
+            <a:r>
+              <a:rPr lang="he-IL" sz="1200" b="0" cap="none" spc="0" dirty="0" err="1">
+                <a:ln w="0"/>
+                <a:solidFill>
+                  <a:schemeClr val="tx1"/>
+                </a:solidFill>
+                <a:effectLst>
+                  <a:outerShdw blurRad="38100" dist="19050" dir="2700000" algn="tl" rotWithShape="0">
+                    <a:schemeClr val="dk1">
+                      <a:alpha val="40000"/>
+                    </a:schemeClr>
+                  </a:outerShdw>
+                </a:effectLst>
+              </a:rPr>
+              <a:t>מהירןת</a:t>
+            </a:r>
+            <a:endParaRPr lang="he-IL" sz="1200" b="0" cap="none" spc="0" dirty="0">
+              <a:ln w="0"/>
+              <a:solidFill>
+                <a:schemeClr val="tx1"/>
+              </a:solidFill>
+              <a:effectLst>
+                <a:outerShdw blurRad="38100" dist="19050" dir="2700000" algn="tl" rotWithShape="0">
+                  <a:schemeClr val="dk1">
+                    <a:alpha val="40000"/>
+                  </a:schemeClr>
+                </a:outerShdw>
+              </a:effectLst>
+            </a:endParaRPr>
           </a:p>
         </p:txBody>
       </p:sp>
@@ -4339,7 +4368,7 @@
         </p:nvSpPr>
         <p:spPr>
           <a:xfrm>
-            <a:off x="10157905" y="3335806"/>
+            <a:off x="10120197" y="3373513"/>
             <a:ext cx="1027523" cy="1077218"/>
           </a:xfrm>
           <a:prstGeom prst="rect">
@@ -4389,7 +4418,7 @@
         </p:nvCxnSpPr>
         <p:spPr>
           <a:xfrm>
-            <a:off x="10683187" y="3054285"/>
+            <a:off x="10645479" y="3091992"/>
             <a:ext cx="0" cy="245096"/>
           </a:xfrm>
           <a:prstGeom prst="straightConnector1">
@@ -4432,7 +4461,7 @@
         </p:nvSpPr>
         <p:spPr>
           <a:xfrm>
-            <a:off x="6096000" y="1847654"/>
+            <a:off x="6058292" y="1885361"/>
             <a:ext cx="1027523" cy="1206631"/>
           </a:xfrm>
           <a:prstGeom prst="rect">
@@ -4484,7 +4513,7 @@
         </p:nvSpPr>
         <p:spPr>
           <a:xfrm>
-            <a:off x="6130302" y="2073898"/>
+            <a:off x="6092594" y="2111605"/>
             <a:ext cx="1027523" cy="584775"/>
           </a:xfrm>
           <a:prstGeom prst="rect">
@@ -4532,7 +4561,7 @@
         </p:nvSpPr>
         <p:spPr>
           <a:xfrm>
-            <a:off x="5577210" y="3298413"/>
+            <a:off x="5539502" y="3336120"/>
             <a:ext cx="2228184" cy="900915"/>
           </a:xfrm>
           <a:prstGeom prst="rect">
@@ -4584,7 +4613,7 @@
         </p:nvSpPr>
         <p:spPr>
           <a:xfrm>
-            <a:off x="6177540" y="3524285"/>
+            <a:off x="6139832" y="3561992"/>
             <a:ext cx="1027523" cy="338554"/>
           </a:xfrm>
           <a:prstGeom prst="rect">
@@ -4632,7 +4661,7 @@
         </p:nvSpPr>
         <p:spPr>
           <a:xfrm>
-            <a:off x="6787298" y="4394485"/>
+            <a:off x="6749590" y="4432192"/>
             <a:ext cx="1027523" cy="1206631"/>
           </a:xfrm>
           <a:prstGeom prst="rect">
@@ -4684,7 +4713,7 @@
         </p:nvSpPr>
         <p:spPr>
           <a:xfrm>
-            <a:off x="6777870" y="4748800"/>
+            <a:off x="6740162" y="4786507"/>
             <a:ext cx="1027523" cy="338554"/>
           </a:xfrm>
           <a:prstGeom prst="rect">
@@ -4734,7 +4763,7 @@
         </p:nvCxnSpPr>
         <p:spPr>
           <a:xfrm>
-            <a:off x="6433791" y="1500203"/>
+            <a:off x="6396083" y="1537910"/>
             <a:ext cx="0" cy="367645"/>
           </a:xfrm>
           <a:prstGeom prst="straightConnector1">
@@ -4779,7 +4808,7 @@
         </p:nvCxnSpPr>
         <p:spPr>
           <a:xfrm>
-            <a:off x="6526355" y="2993010"/>
+            <a:off x="6488647" y="3030717"/>
             <a:ext cx="0" cy="367645"/>
           </a:xfrm>
           <a:prstGeom prst="straightConnector1">
@@ -4824,7 +4853,7 @@
         </p:nvCxnSpPr>
         <p:spPr>
           <a:xfrm>
-            <a:off x="7291631" y="4110086"/>
+            <a:off x="7253923" y="4147793"/>
             <a:ext cx="0" cy="367645"/>
           </a:xfrm>
           <a:prstGeom prst="straightConnector1">
@@ -4867,7 +4896,7 @@
         </p:nvSpPr>
         <p:spPr>
           <a:xfrm>
-            <a:off x="7058712" y="5793222"/>
+            <a:off x="7021004" y="5830929"/>
             <a:ext cx="548326" cy="750979"/>
           </a:xfrm>
           <a:prstGeom prst="rect">
@@ -4919,7 +4948,7 @@
         </p:nvSpPr>
         <p:spPr>
           <a:xfrm>
-            <a:off x="6829718" y="5872185"/>
+            <a:off x="6792010" y="5909892"/>
             <a:ext cx="1027523" cy="584775"/>
           </a:xfrm>
           <a:prstGeom prst="rect">
@@ -4979,7 +5008,7 @@
         </p:nvCxnSpPr>
         <p:spPr>
           <a:xfrm>
-            <a:off x="7291631" y="5504540"/>
+            <a:off x="7253923" y="5542247"/>
             <a:ext cx="0" cy="367645"/>
           </a:xfrm>
           <a:prstGeom prst="straightConnector1">
@@ -5022,7 +5051,7 @@
         </p:nvSpPr>
         <p:spPr>
           <a:xfrm>
-            <a:off x="5582238" y="4401288"/>
+            <a:off x="5544530" y="4438995"/>
             <a:ext cx="1027523" cy="1206631"/>
           </a:xfrm>
           <a:prstGeom prst="rect">
@@ -5074,7 +5103,7 @@
         </p:nvSpPr>
         <p:spPr>
           <a:xfrm>
-            <a:off x="5536282" y="4748800"/>
+            <a:off x="5498574" y="4786507"/>
             <a:ext cx="1027523" cy="338554"/>
           </a:xfrm>
           <a:prstGeom prst="rect">
@@ -5124,7 +5153,7 @@
         </p:nvCxnSpPr>
         <p:spPr>
           <a:xfrm>
-            <a:off x="5990187" y="4110086"/>
+            <a:off x="5952479" y="4147793"/>
             <a:ext cx="0" cy="367645"/>
           </a:xfrm>
           <a:prstGeom prst="straightConnector1">
@@ -5171,7 +5200,7 @@
         </p:nvCxnSpPr>
         <p:spPr>
           <a:xfrm flipV="1">
-            <a:off x="6609761" y="4997801"/>
+            <a:off x="6572053" y="5035508"/>
             <a:ext cx="177537" cy="6803"/>
           </a:xfrm>
           <a:prstGeom prst="straightConnector1">
@@ -5214,8 +5243,8 @@
         </p:nvSpPr>
         <p:spPr>
           <a:xfrm>
-            <a:off x="10653010" y="4637834"/>
-            <a:ext cx="607367" cy="1206631"/>
+            <a:off x="10615302" y="4675542"/>
+            <a:ext cx="607367" cy="773152"/>
           </a:xfrm>
           <a:prstGeom prst="rect">
             <a:avLst/>
@@ -5266,8 +5295,8 @@
         </p:nvSpPr>
         <p:spPr>
           <a:xfrm>
-            <a:off x="11374556" y="4637834"/>
-            <a:ext cx="607367" cy="1206631"/>
+            <a:off x="11336848" y="4675542"/>
+            <a:ext cx="607367" cy="773152"/>
           </a:xfrm>
           <a:prstGeom prst="rect">
             <a:avLst/>
@@ -5318,8 +5347,8 @@
         </p:nvSpPr>
         <p:spPr>
           <a:xfrm>
-            <a:off x="11164477" y="4694546"/>
-            <a:ext cx="1027523" cy="1077218"/>
+            <a:off x="11250333" y="4626811"/>
+            <a:ext cx="855872" cy="830997"/>
           </a:xfrm>
           <a:prstGeom prst="rect">
             <a:avLst/>
@@ -5328,6 +5357,726 @@
         </p:spPr>
         <p:txBody>
           <a:bodyPr wrap="square" lIns="91440" tIns="45720" rIns="91440" bIns="45720">
+            <a:spAutoFit/>
+          </a:bodyPr>
+          <a:lstStyle/>
+          <a:p>
+            <a:pPr algn="ctr"/>
+            <a:r>
+              <a:rPr lang="he-IL" sz="1200" b="0" cap="none" spc="0" dirty="0">
+                <a:ln w="0"/>
+                <a:solidFill>
+                  <a:schemeClr val="tx1"/>
+                </a:solidFill>
+                <a:effectLst>
+                  <a:outerShdw blurRad="38100" dist="19050" dir="2700000" algn="tl" rotWithShape="0">
+                    <a:schemeClr val="dk1">
+                      <a:alpha val="40000"/>
+                    </a:schemeClr>
+                  </a:outerShdw>
+                </a:effectLst>
+              </a:rPr>
+              <a:t>עדכון מספר נקודות שבועי</a:t>
+            </a:r>
+          </a:p>
+        </p:txBody>
+      </p:sp>
+      <p:sp>
+        <p:nvSpPr>
+          <p:cNvPr id="12" name="מלבן 11">
+            <a:extLst>
+              <a:ext uri="{FF2B5EF4-FFF2-40B4-BE49-F238E27FC236}">
+                <a16:creationId xmlns:a16="http://schemas.microsoft.com/office/drawing/2014/main" id="{E66F68F3-D7E0-5611-D666-B5ACD7D77B52}"/>
+              </a:ext>
+            </a:extLst>
+          </p:cNvPr>
+          <p:cNvSpPr/>
+          <p:nvPr/>
+        </p:nvSpPr>
+        <p:spPr>
+          <a:xfrm>
+            <a:off x="10491749" y="4617697"/>
+            <a:ext cx="855872" cy="830997"/>
+          </a:xfrm>
+          <a:prstGeom prst="rect">
+            <a:avLst/>
+          </a:prstGeom>
+          <a:noFill/>
+        </p:spPr>
+        <p:txBody>
+          <a:bodyPr wrap="square" lIns="91440" tIns="45720" rIns="91440" bIns="45720">
+            <a:spAutoFit/>
+          </a:bodyPr>
+          <a:lstStyle/>
+          <a:p>
+            <a:pPr algn="ctr"/>
+            <a:r>
+              <a:rPr lang="he-IL" sz="1200" b="0" cap="none" spc="0" dirty="0">
+                <a:ln w="0"/>
+                <a:solidFill>
+                  <a:schemeClr val="tx1"/>
+                </a:solidFill>
+                <a:effectLst>
+                  <a:outerShdw blurRad="38100" dist="19050" dir="2700000" algn="tl" rotWithShape="0">
+                    <a:schemeClr val="dk1">
+                      <a:alpha val="40000"/>
+                    </a:schemeClr>
+                  </a:outerShdw>
+                </a:effectLst>
+              </a:rPr>
+              <a:t>עדכון אישור שובר או ביטולו</a:t>
+            </a:r>
+          </a:p>
+        </p:txBody>
+      </p:sp>
+      <p:cxnSp>
+        <p:nvCxnSpPr>
+          <p:cNvPr id="13" name="מחבר חץ ישר 12">
+            <a:extLst>
+              <a:ext uri="{FF2B5EF4-FFF2-40B4-BE49-F238E27FC236}">
+                <a16:creationId xmlns:a16="http://schemas.microsoft.com/office/drawing/2014/main" id="{3E2827CF-FAF1-31D3-8DFF-7EEF1F1589F6}"/>
+              </a:ext>
+            </a:extLst>
+          </p:cNvPr>
+          <p:cNvCxnSpPr>
+            <a:cxnSpLocks/>
+          </p:cNvCxnSpPr>
+          <p:nvPr/>
+        </p:nvCxnSpPr>
+        <p:spPr>
+          <a:xfrm>
+            <a:off x="10769729" y="4487157"/>
+            <a:ext cx="0" cy="188384"/>
+          </a:xfrm>
+          <a:prstGeom prst="straightConnector1">
+            <a:avLst/>
+          </a:prstGeom>
+          <a:ln>
+            <a:solidFill>
+              <a:schemeClr val="tx1"/>
+            </a:solidFill>
+            <a:headEnd type="triangle"/>
+            <a:tailEnd type="triangle"/>
+          </a:ln>
+        </p:spPr>
+        <p:style>
+          <a:lnRef idx="1">
+            <a:schemeClr val="accent1"/>
+          </a:lnRef>
+          <a:fillRef idx="0">
+            <a:schemeClr val="accent1"/>
+          </a:fillRef>
+          <a:effectRef idx="0">
+            <a:schemeClr val="accent1"/>
+          </a:effectRef>
+          <a:fontRef idx="minor">
+            <a:schemeClr val="tx1"/>
+          </a:fontRef>
+        </p:style>
+      </p:cxnSp>
+      <p:cxnSp>
+        <p:nvCxnSpPr>
+          <p:cNvPr id="14" name="מחבר חץ ישר 13">
+            <a:extLst>
+              <a:ext uri="{FF2B5EF4-FFF2-40B4-BE49-F238E27FC236}">
+                <a16:creationId xmlns:a16="http://schemas.microsoft.com/office/drawing/2014/main" id="{DA55897D-0E3E-5587-C6A9-CDED88F8A0AB}"/>
+              </a:ext>
+            </a:extLst>
+          </p:cNvPr>
+          <p:cNvCxnSpPr>
+            <a:cxnSpLocks/>
+          </p:cNvCxnSpPr>
+          <p:nvPr/>
+        </p:nvCxnSpPr>
+        <p:spPr>
+          <a:xfrm>
+            <a:off x="11021501" y="4529578"/>
+            <a:ext cx="507033" cy="145963"/>
+          </a:xfrm>
+          <a:prstGeom prst="straightConnector1">
+            <a:avLst/>
+          </a:prstGeom>
+          <a:ln>
+            <a:solidFill>
+              <a:schemeClr val="tx1"/>
+            </a:solidFill>
+            <a:headEnd type="triangle"/>
+            <a:tailEnd type="triangle"/>
+          </a:ln>
+        </p:spPr>
+        <p:style>
+          <a:lnRef idx="1">
+            <a:schemeClr val="accent1"/>
+          </a:lnRef>
+          <a:fillRef idx="0">
+            <a:schemeClr val="accent1"/>
+          </a:fillRef>
+          <a:effectRef idx="0">
+            <a:schemeClr val="accent1"/>
+          </a:effectRef>
+          <a:fontRef idx="minor">
+            <a:schemeClr val="tx1"/>
+          </a:fontRef>
+        </p:style>
+      </p:cxnSp>
+      <p:sp>
+        <p:nvSpPr>
+          <p:cNvPr id="17" name="מלבן 16">
+            <a:extLst>
+              <a:ext uri="{FF2B5EF4-FFF2-40B4-BE49-F238E27FC236}">
+                <a16:creationId xmlns:a16="http://schemas.microsoft.com/office/drawing/2014/main" id="{F3655F1B-2B88-56D9-B6CC-2479172768FD}"/>
+              </a:ext>
+            </a:extLst>
+          </p:cNvPr>
+          <p:cNvSpPr/>
+          <p:nvPr/>
+        </p:nvSpPr>
+        <p:spPr>
+          <a:xfrm>
+            <a:off x="9855328" y="4667547"/>
+            <a:ext cx="607367" cy="781148"/>
+          </a:xfrm>
+          <a:prstGeom prst="rect">
+            <a:avLst/>
+          </a:prstGeom>
+          <a:solidFill>
+            <a:schemeClr val="accent6">
+              <a:lumMod val="60000"/>
+              <a:lumOff val="40000"/>
+            </a:schemeClr>
+          </a:solidFill>
+        </p:spPr>
+        <p:style>
+          <a:lnRef idx="2">
+            <a:schemeClr val="accent1">
+              <a:shade val="15000"/>
+            </a:schemeClr>
+          </a:lnRef>
+          <a:fillRef idx="1">
+            <a:schemeClr val="accent1"/>
+          </a:fillRef>
+          <a:effectRef idx="0">
+            <a:schemeClr val="accent1"/>
+          </a:effectRef>
+          <a:fontRef idx="minor">
+            <a:schemeClr val="lt1"/>
+          </a:fontRef>
+        </p:style>
+        <p:txBody>
+          <a:bodyPr rtlCol="1" anchor="ctr"/>
+          <a:lstStyle/>
+          <a:p>
+            <a:pPr algn="ctr"/>
+            <a:endParaRPr lang="he-IL" dirty="0"/>
+          </a:p>
+        </p:txBody>
+      </p:sp>
+      <p:sp>
+        <p:nvSpPr>
+          <p:cNvPr id="21" name="מלבן 20">
+            <a:extLst>
+              <a:ext uri="{FF2B5EF4-FFF2-40B4-BE49-F238E27FC236}">
+                <a16:creationId xmlns:a16="http://schemas.microsoft.com/office/drawing/2014/main" id="{BF471252-BA02-AD73-5409-084635F5BEF2}"/>
+              </a:ext>
+            </a:extLst>
+          </p:cNvPr>
+          <p:cNvSpPr/>
+          <p:nvPr/>
+        </p:nvSpPr>
+        <p:spPr>
+          <a:xfrm>
+            <a:off x="9750052" y="4704603"/>
+            <a:ext cx="850723" cy="646331"/>
+          </a:xfrm>
+          <a:prstGeom prst="rect">
+            <a:avLst/>
+          </a:prstGeom>
+          <a:noFill/>
+        </p:spPr>
+        <p:txBody>
+          <a:bodyPr wrap="square" lIns="91440" tIns="45720" rIns="91440" bIns="45720">
+            <a:spAutoFit/>
+          </a:bodyPr>
+          <a:lstStyle/>
+          <a:p>
+            <a:pPr algn="ctr"/>
+            <a:r>
+              <a:rPr lang="he-IL" sz="1200" b="0" cap="none" spc="0" dirty="0">
+                <a:ln w="0"/>
+                <a:solidFill>
+                  <a:schemeClr val="tx1"/>
+                </a:solidFill>
+                <a:effectLst>
+                  <a:outerShdw blurRad="38100" dist="19050" dir="2700000" algn="tl" rotWithShape="0">
+                    <a:schemeClr val="dk1">
+                      <a:alpha val="40000"/>
+                    </a:schemeClr>
+                  </a:outerShdw>
+                </a:effectLst>
+              </a:rPr>
+              <a:t>הוספת הערה לתלמידה </a:t>
+            </a:r>
+          </a:p>
+        </p:txBody>
+      </p:sp>
+      <p:cxnSp>
+        <p:nvCxnSpPr>
+          <p:cNvPr id="26" name="מחבר חץ ישר 25">
+            <a:extLst>
+              <a:ext uri="{FF2B5EF4-FFF2-40B4-BE49-F238E27FC236}">
+                <a16:creationId xmlns:a16="http://schemas.microsoft.com/office/drawing/2014/main" id="{4D472921-A6C0-E139-3991-D45F45AB9D5E}"/>
+              </a:ext>
+            </a:extLst>
+          </p:cNvPr>
+          <p:cNvCxnSpPr>
+            <a:cxnSpLocks/>
+            <a:endCxn id="17" idx="0"/>
+          </p:cNvCxnSpPr>
+          <p:nvPr/>
+        </p:nvCxnSpPr>
+        <p:spPr>
+          <a:xfrm flipH="1">
+            <a:off x="10159012" y="4515437"/>
+            <a:ext cx="174996" cy="152110"/>
+          </a:xfrm>
+          <a:prstGeom prst="straightConnector1">
+            <a:avLst/>
+          </a:prstGeom>
+          <a:ln>
+            <a:solidFill>
+              <a:schemeClr val="tx1"/>
+            </a:solidFill>
+            <a:headEnd type="triangle"/>
+            <a:tailEnd type="triangle"/>
+          </a:ln>
+        </p:spPr>
+        <p:style>
+          <a:lnRef idx="1">
+            <a:schemeClr val="accent1"/>
+          </a:lnRef>
+          <a:fillRef idx="0">
+            <a:schemeClr val="accent1"/>
+          </a:fillRef>
+          <a:effectRef idx="0">
+            <a:schemeClr val="accent1"/>
+          </a:effectRef>
+          <a:fontRef idx="minor">
+            <a:schemeClr val="tx1"/>
+          </a:fontRef>
+        </p:style>
+      </p:cxnSp>
+      <p:cxnSp>
+        <p:nvCxnSpPr>
+          <p:cNvPr id="2" name="מחבר חץ ישר 1">
+            <a:extLst>
+              <a:ext uri="{FF2B5EF4-FFF2-40B4-BE49-F238E27FC236}">
+                <a16:creationId xmlns:a16="http://schemas.microsoft.com/office/drawing/2014/main" id="{0821E5F6-9D8B-E692-5C25-307B8CB7DB33}"/>
+              </a:ext>
+            </a:extLst>
+          </p:cNvPr>
+          <p:cNvCxnSpPr>
+            <a:cxnSpLocks/>
+          </p:cNvCxnSpPr>
+          <p:nvPr/>
+        </p:nvCxnSpPr>
+        <p:spPr>
+          <a:xfrm>
+            <a:off x="10414134" y="3083995"/>
+            <a:ext cx="269413" cy="1591546"/>
+          </a:xfrm>
+          <a:prstGeom prst="straightConnector1">
+            <a:avLst/>
+          </a:prstGeom>
+          <a:ln>
+            <a:solidFill>
+              <a:schemeClr val="tx1"/>
+            </a:solidFill>
+            <a:headEnd type="triangle"/>
+            <a:tailEnd type="triangle"/>
+          </a:ln>
+        </p:spPr>
+        <p:style>
+          <a:lnRef idx="1">
+            <a:schemeClr val="accent1"/>
+          </a:lnRef>
+          <a:fillRef idx="0">
+            <a:schemeClr val="accent1"/>
+          </a:fillRef>
+          <a:effectRef idx="0">
+            <a:schemeClr val="accent1"/>
+          </a:effectRef>
+          <a:fontRef idx="minor">
+            <a:schemeClr val="tx1"/>
+          </a:fontRef>
+        </p:style>
+      </p:cxnSp>
+      <p:cxnSp>
+        <p:nvCxnSpPr>
+          <p:cNvPr id="3" name="מחבר חץ ישר 2">
+            <a:extLst>
+              <a:ext uri="{FF2B5EF4-FFF2-40B4-BE49-F238E27FC236}">
+                <a16:creationId xmlns:a16="http://schemas.microsoft.com/office/drawing/2014/main" id="{2E62C2B8-DB59-57F3-1701-2BC462BC1517}"/>
+              </a:ext>
+            </a:extLst>
+          </p:cNvPr>
+          <p:cNvCxnSpPr>
+            <a:cxnSpLocks/>
+            <a:endCxn id="11" idx="0"/>
+          </p:cNvCxnSpPr>
+          <p:nvPr/>
+        </p:nvCxnSpPr>
+        <p:spPr>
+          <a:xfrm>
+            <a:off x="10860134" y="3063710"/>
+            <a:ext cx="780398" cy="1611832"/>
+          </a:xfrm>
+          <a:prstGeom prst="straightConnector1">
+            <a:avLst/>
+          </a:prstGeom>
+          <a:ln>
+            <a:solidFill>
+              <a:schemeClr val="tx1"/>
+            </a:solidFill>
+            <a:headEnd type="triangle"/>
+            <a:tailEnd type="triangle"/>
+          </a:ln>
+        </p:spPr>
+        <p:style>
+          <a:lnRef idx="1">
+            <a:schemeClr val="accent1"/>
+          </a:lnRef>
+          <a:fillRef idx="0">
+            <a:schemeClr val="accent1"/>
+          </a:fillRef>
+          <a:effectRef idx="0">
+            <a:schemeClr val="accent1"/>
+          </a:effectRef>
+          <a:fontRef idx="minor">
+            <a:schemeClr val="tx1"/>
+          </a:fontRef>
+        </p:style>
+      </p:cxnSp>
+      <p:sp>
+        <p:nvSpPr>
+          <p:cNvPr id="56" name="מלבן 55">
+            <a:extLst>
+              <a:ext uri="{FF2B5EF4-FFF2-40B4-BE49-F238E27FC236}">
+                <a16:creationId xmlns:a16="http://schemas.microsoft.com/office/drawing/2014/main" id="{D1B3642A-B34A-7EAA-7259-2806B1671E9D}"/>
+              </a:ext>
+            </a:extLst>
+          </p:cNvPr>
+          <p:cNvSpPr/>
+          <p:nvPr/>
+        </p:nvSpPr>
+        <p:spPr>
+          <a:xfrm>
+            <a:off x="8800977" y="3123417"/>
+            <a:ext cx="1027523" cy="467331"/>
+          </a:xfrm>
+          <a:prstGeom prst="rect">
+            <a:avLst/>
+          </a:prstGeom>
+          <a:solidFill>
+            <a:schemeClr val="accent6">
+              <a:lumMod val="60000"/>
+              <a:lumOff val="40000"/>
+            </a:schemeClr>
+          </a:solidFill>
+        </p:spPr>
+        <p:style>
+          <a:lnRef idx="2">
+            <a:schemeClr val="accent1">
+              <a:shade val="15000"/>
+            </a:schemeClr>
+          </a:lnRef>
+          <a:fillRef idx="1">
+            <a:schemeClr val="accent1"/>
+          </a:fillRef>
+          <a:effectRef idx="0">
+            <a:schemeClr val="accent1"/>
+          </a:effectRef>
+          <a:fontRef idx="minor">
+            <a:schemeClr val="lt1"/>
+          </a:fontRef>
+        </p:style>
+        <p:txBody>
+          <a:bodyPr rtlCol="1" anchor="ctr"/>
+          <a:lstStyle/>
+          <a:p>
+            <a:pPr algn="ctr"/>
+            <a:endParaRPr lang="he-IL"/>
+          </a:p>
+        </p:txBody>
+      </p:sp>
+      <p:sp>
+        <p:nvSpPr>
+          <p:cNvPr id="58" name="מלבן 57">
+            <a:extLst>
+              <a:ext uri="{FF2B5EF4-FFF2-40B4-BE49-F238E27FC236}">
+                <a16:creationId xmlns:a16="http://schemas.microsoft.com/office/drawing/2014/main" id="{8B8C23A1-CBA6-F5A9-628A-6E79B44FD1CD}"/>
+              </a:ext>
+            </a:extLst>
+          </p:cNvPr>
+          <p:cNvSpPr/>
+          <p:nvPr/>
+        </p:nvSpPr>
+        <p:spPr>
+          <a:xfrm>
+            <a:off x="8799857" y="3695081"/>
+            <a:ext cx="1027523" cy="467331"/>
+          </a:xfrm>
+          <a:prstGeom prst="rect">
+            <a:avLst/>
+          </a:prstGeom>
+          <a:solidFill>
+            <a:schemeClr val="accent6">
+              <a:lumMod val="60000"/>
+              <a:lumOff val="40000"/>
+            </a:schemeClr>
+          </a:solidFill>
+        </p:spPr>
+        <p:style>
+          <a:lnRef idx="2">
+            <a:schemeClr val="accent1">
+              <a:shade val="15000"/>
+            </a:schemeClr>
+          </a:lnRef>
+          <a:fillRef idx="1">
+            <a:schemeClr val="accent1"/>
+          </a:fillRef>
+          <a:effectRef idx="0">
+            <a:schemeClr val="accent1"/>
+          </a:effectRef>
+          <a:fontRef idx="minor">
+            <a:schemeClr val="lt1"/>
+          </a:fontRef>
+        </p:style>
+        <p:txBody>
+          <a:bodyPr rtlCol="1" anchor="ctr"/>
+          <a:lstStyle/>
+          <a:p>
+            <a:pPr algn="ctr"/>
+            <a:endParaRPr lang="he-IL"/>
+          </a:p>
+        </p:txBody>
+      </p:sp>
+      <p:sp>
+        <p:nvSpPr>
+          <p:cNvPr id="59" name="מלבן 58">
+            <a:extLst>
+              <a:ext uri="{FF2B5EF4-FFF2-40B4-BE49-F238E27FC236}">
+                <a16:creationId xmlns:a16="http://schemas.microsoft.com/office/drawing/2014/main" id="{0073B0F3-13E2-E5A3-6959-15482DF2D3DA}"/>
+              </a:ext>
+            </a:extLst>
+          </p:cNvPr>
+          <p:cNvSpPr/>
+          <p:nvPr/>
+        </p:nvSpPr>
+        <p:spPr>
+          <a:xfrm>
+            <a:off x="8799856" y="4255494"/>
+            <a:ext cx="1027523" cy="467331"/>
+          </a:xfrm>
+          <a:prstGeom prst="rect">
+            <a:avLst/>
+          </a:prstGeom>
+          <a:solidFill>
+            <a:schemeClr val="accent6">
+              <a:lumMod val="60000"/>
+              <a:lumOff val="40000"/>
+            </a:schemeClr>
+          </a:solidFill>
+        </p:spPr>
+        <p:style>
+          <a:lnRef idx="2">
+            <a:schemeClr val="accent1">
+              <a:shade val="15000"/>
+            </a:schemeClr>
+          </a:lnRef>
+          <a:fillRef idx="1">
+            <a:schemeClr val="accent1"/>
+          </a:fillRef>
+          <a:effectRef idx="0">
+            <a:schemeClr val="accent1"/>
+          </a:effectRef>
+          <a:fontRef idx="minor">
+            <a:schemeClr val="lt1"/>
+          </a:fontRef>
+        </p:style>
+        <p:txBody>
+          <a:bodyPr rtlCol="1" anchor="ctr"/>
+          <a:lstStyle/>
+          <a:p>
+            <a:pPr algn="ctr"/>
+            <a:endParaRPr lang="he-IL"/>
+          </a:p>
+        </p:txBody>
+      </p:sp>
+      <p:cxnSp>
+        <p:nvCxnSpPr>
+          <p:cNvPr id="60" name="מחבר חץ ישר 59">
+            <a:extLst>
+              <a:ext uri="{FF2B5EF4-FFF2-40B4-BE49-F238E27FC236}">
+                <a16:creationId xmlns:a16="http://schemas.microsoft.com/office/drawing/2014/main" id="{BBAA92BC-4AD1-9A7A-102B-E76B90A69533}"/>
+              </a:ext>
+            </a:extLst>
+          </p:cNvPr>
+          <p:cNvCxnSpPr>
+            <a:cxnSpLocks/>
+            <a:stCxn id="56" idx="3"/>
+            <a:endCxn id="33" idx="1"/>
+          </p:cNvCxnSpPr>
+          <p:nvPr/>
+        </p:nvCxnSpPr>
+        <p:spPr>
+          <a:xfrm>
+            <a:off x="9828500" y="3357083"/>
+            <a:ext cx="291697" cy="555039"/>
+          </a:xfrm>
+          <a:prstGeom prst="straightConnector1">
+            <a:avLst/>
+          </a:prstGeom>
+          <a:ln>
+            <a:solidFill>
+              <a:schemeClr val="tx1"/>
+            </a:solidFill>
+            <a:headEnd type="triangle"/>
+            <a:tailEnd type="triangle"/>
+          </a:ln>
+        </p:spPr>
+        <p:style>
+          <a:lnRef idx="1">
+            <a:schemeClr val="accent1"/>
+          </a:lnRef>
+          <a:fillRef idx="0">
+            <a:schemeClr val="accent1"/>
+          </a:fillRef>
+          <a:effectRef idx="0">
+            <a:schemeClr val="accent1"/>
+          </a:effectRef>
+          <a:fontRef idx="minor">
+            <a:schemeClr val="tx1"/>
+          </a:fontRef>
+        </p:style>
+      </p:cxnSp>
+      <p:cxnSp>
+        <p:nvCxnSpPr>
+          <p:cNvPr id="61" name="מחבר חץ ישר 60">
+            <a:extLst>
+              <a:ext uri="{FF2B5EF4-FFF2-40B4-BE49-F238E27FC236}">
+                <a16:creationId xmlns:a16="http://schemas.microsoft.com/office/drawing/2014/main" id="{8C157359-7515-C7B4-CF6B-51F0AA255B4F}"/>
+              </a:ext>
+            </a:extLst>
+          </p:cNvPr>
+          <p:cNvCxnSpPr>
+            <a:cxnSpLocks/>
+            <a:stCxn id="58" idx="3"/>
+            <a:endCxn id="33" idx="1"/>
+          </p:cNvCxnSpPr>
+          <p:nvPr/>
+        </p:nvCxnSpPr>
+        <p:spPr>
+          <a:xfrm flipV="1">
+            <a:off x="9827380" y="3912122"/>
+            <a:ext cx="292817" cy="16625"/>
+          </a:xfrm>
+          <a:prstGeom prst="straightConnector1">
+            <a:avLst/>
+          </a:prstGeom>
+          <a:ln>
+            <a:solidFill>
+              <a:schemeClr val="tx1"/>
+            </a:solidFill>
+            <a:headEnd type="triangle"/>
+            <a:tailEnd type="triangle"/>
+          </a:ln>
+        </p:spPr>
+        <p:style>
+          <a:lnRef idx="1">
+            <a:schemeClr val="accent1"/>
+          </a:lnRef>
+          <a:fillRef idx="0">
+            <a:schemeClr val="accent1"/>
+          </a:fillRef>
+          <a:effectRef idx="0">
+            <a:schemeClr val="accent1"/>
+          </a:effectRef>
+          <a:fontRef idx="minor">
+            <a:schemeClr val="tx1"/>
+          </a:fontRef>
+        </p:style>
+      </p:cxnSp>
+      <p:cxnSp>
+        <p:nvCxnSpPr>
+          <p:cNvPr id="62" name="מחבר חץ ישר 61">
+            <a:extLst>
+              <a:ext uri="{FF2B5EF4-FFF2-40B4-BE49-F238E27FC236}">
+                <a16:creationId xmlns:a16="http://schemas.microsoft.com/office/drawing/2014/main" id="{C2D46632-88A9-0C53-EDBD-4CDF1921A3D0}"/>
+              </a:ext>
+            </a:extLst>
+          </p:cNvPr>
+          <p:cNvCxnSpPr>
+            <a:cxnSpLocks/>
+            <a:stCxn id="59" idx="3"/>
+            <a:endCxn id="33" idx="1"/>
+          </p:cNvCxnSpPr>
+          <p:nvPr/>
+        </p:nvCxnSpPr>
+        <p:spPr>
+          <a:xfrm flipV="1">
+            <a:off x="9827379" y="3912122"/>
+            <a:ext cx="292818" cy="577038"/>
+          </a:xfrm>
+          <a:prstGeom prst="straightConnector1">
+            <a:avLst/>
+          </a:prstGeom>
+          <a:ln>
+            <a:solidFill>
+              <a:schemeClr val="tx1"/>
+            </a:solidFill>
+            <a:headEnd type="triangle"/>
+            <a:tailEnd type="triangle"/>
+          </a:ln>
+        </p:spPr>
+        <p:style>
+          <a:lnRef idx="1">
+            <a:schemeClr val="accent1"/>
+          </a:lnRef>
+          <a:fillRef idx="0">
+            <a:schemeClr val="accent1"/>
+          </a:fillRef>
+          <a:effectRef idx="0">
+            <a:schemeClr val="accent1"/>
+          </a:effectRef>
+          <a:fontRef idx="minor">
+            <a:schemeClr val="tx1"/>
+          </a:fontRef>
+        </p:style>
+      </p:cxnSp>
+      <p:sp>
+        <p:nvSpPr>
+          <p:cNvPr id="69" name="מלבן 68">
+            <a:extLst>
+              <a:ext uri="{FF2B5EF4-FFF2-40B4-BE49-F238E27FC236}">
+                <a16:creationId xmlns:a16="http://schemas.microsoft.com/office/drawing/2014/main" id="{DBA0BEB1-65FC-E291-A047-D355680595A7}"/>
+              </a:ext>
+            </a:extLst>
+          </p:cNvPr>
+          <p:cNvSpPr/>
+          <p:nvPr/>
+        </p:nvSpPr>
+        <p:spPr>
+          <a:xfrm>
+            <a:off x="8810191" y="4281454"/>
+            <a:ext cx="984565" cy="338554"/>
+          </a:xfrm>
+          <a:prstGeom prst="rect">
+            <a:avLst/>
+          </a:prstGeom>
+          <a:noFill/>
+        </p:spPr>
+        <p:txBody>
+          <a:bodyPr wrap="none" lIns="91440" tIns="45720" rIns="91440" bIns="45720">
             <a:spAutoFit/>
           </a:bodyPr>
           <a:lstStyle/>
@@ -5347,17 +6096,17 @@
                   </a:outerShdw>
                 </a:effectLst>
               </a:rPr>
-              <a:t>עדכון מספר נקודות שבועי</a:t>
-            </a:r>
-          </a:p>
-        </p:txBody>
-      </p:sp>
-      <p:sp>
-        <p:nvSpPr>
-          <p:cNvPr id="12" name="מלבן 11">
-            <a:extLst>
-              <a:ext uri="{FF2B5EF4-FFF2-40B4-BE49-F238E27FC236}">
-                <a16:creationId xmlns:a16="http://schemas.microsoft.com/office/drawing/2014/main" id="{E66F68F3-D7E0-5611-D666-B5ACD7D77B52}"/>
+              <a:t>סינון שנתי</a:t>
+            </a:r>
+          </a:p>
+        </p:txBody>
+      </p:sp>
+      <p:sp>
+        <p:nvSpPr>
+          <p:cNvPr id="70" name="מלבן 69">
+            <a:extLst>
+              <a:ext uri="{FF2B5EF4-FFF2-40B4-BE49-F238E27FC236}">
+                <a16:creationId xmlns:a16="http://schemas.microsoft.com/office/drawing/2014/main" id="{C9882102-6B58-B69E-E058-AA88A5100BF2}"/>
               </a:ext>
             </a:extLst>
           </p:cNvPr>
@@ -5366,8 +6115,8 @@
         </p:nvSpPr>
         <p:spPr>
           <a:xfrm>
-            <a:off x="10442931" y="4680406"/>
-            <a:ext cx="1027523" cy="1077218"/>
+            <a:off x="8682364" y="3730559"/>
+            <a:ext cx="1234633" cy="338554"/>
           </a:xfrm>
           <a:prstGeom prst="rect">
             <a:avLst/>
@@ -5375,7 +6124,7 @@
           <a:noFill/>
         </p:spPr>
         <p:txBody>
-          <a:bodyPr wrap="square" lIns="91440" tIns="45720" rIns="91440" bIns="45720">
+          <a:bodyPr wrap="none" lIns="91440" tIns="45720" rIns="91440" bIns="45720">
             <a:spAutoFit/>
           </a:bodyPr>
           <a:lstStyle/>
@@ -5395,107 +6144,75 @@
                   </a:outerShdw>
                 </a:effectLst>
               </a:rPr>
-              <a:t>עדכון אישור שובר או ביטול</a:t>
-            </a:r>
-          </a:p>
-        </p:txBody>
-      </p:sp>
-      <p:cxnSp>
-        <p:nvCxnSpPr>
-          <p:cNvPr id="13" name="מחבר חץ ישר 12">
-            <a:extLst>
-              <a:ext uri="{FF2B5EF4-FFF2-40B4-BE49-F238E27FC236}">
-                <a16:creationId xmlns:a16="http://schemas.microsoft.com/office/drawing/2014/main" id="{3E2827CF-FAF1-31D3-8DFF-7EEF1F1589F6}"/>
-              </a:ext>
-            </a:extLst>
-          </p:cNvPr>
-          <p:cNvCxnSpPr>
-            <a:cxnSpLocks/>
-          </p:cNvCxnSpPr>
+              <a:t>סינון תקופתי </a:t>
+            </a:r>
+          </a:p>
+        </p:txBody>
+      </p:sp>
+      <p:sp>
+        <p:nvSpPr>
+          <p:cNvPr id="71" name="מלבן 70">
+            <a:extLst>
+              <a:ext uri="{FF2B5EF4-FFF2-40B4-BE49-F238E27FC236}">
+                <a16:creationId xmlns:a16="http://schemas.microsoft.com/office/drawing/2014/main" id="{E8EDD54D-C96A-BA8E-7994-AC06E6A39CBF}"/>
+              </a:ext>
+            </a:extLst>
+          </p:cNvPr>
+          <p:cNvSpPr/>
           <p:nvPr/>
-        </p:nvCxnSpPr>
+        </p:nvSpPr>
         <p:spPr>
           <a:xfrm>
-            <a:off x="10807437" y="4449450"/>
-            <a:ext cx="0" cy="245096"/>
-          </a:xfrm>
-          <a:prstGeom prst="straightConnector1">
+            <a:off x="8804344" y="3187805"/>
+            <a:ext cx="1051891" cy="338554"/>
+          </a:xfrm>
+          <a:prstGeom prst="rect">
             <a:avLst/>
           </a:prstGeom>
-          <a:ln>
-            <a:solidFill>
-              <a:schemeClr val="tx1"/>
-            </a:solidFill>
-            <a:headEnd type="triangle"/>
-            <a:tailEnd type="triangle"/>
-          </a:ln>
-        </p:spPr>
-        <p:style>
-          <a:lnRef idx="1">
-            <a:schemeClr val="accent1"/>
-          </a:lnRef>
-          <a:fillRef idx="0">
-            <a:schemeClr val="accent1"/>
-          </a:fillRef>
-          <a:effectRef idx="0">
-            <a:schemeClr val="accent1"/>
-          </a:effectRef>
-          <a:fontRef idx="minor">
-            <a:schemeClr val="tx1"/>
-          </a:fontRef>
-        </p:style>
-      </p:cxnSp>
-      <p:cxnSp>
-        <p:nvCxnSpPr>
-          <p:cNvPr id="14" name="מחבר חץ ישר 13">
-            <a:extLst>
-              <a:ext uri="{FF2B5EF4-FFF2-40B4-BE49-F238E27FC236}">
-                <a16:creationId xmlns:a16="http://schemas.microsoft.com/office/drawing/2014/main" id="{DA55897D-0E3E-5587-C6A9-CDED88F8A0AB}"/>
-              </a:ext>
-            </a:extLst>
-          </p:cNvPr>
-          <p:cNvCxnSpPr>
-            <a:cxnSpLocks/>
-          </p:cNvCxnSpPr>
-          <p:nvPr/>
-        </p:nvCxnSpPr>
-        <p:spPr>
-          <a:xfrm>
-            <a:off x="10979083" y="4477731"/>
-            <a:ext cx="616799" cy="216815"/>
-          </a:xfrm>
-          <a:prstGeom prst="straightConnector1">
-            <a:avLst/>
-          </a:prstGeom>
-          <a:ln>
-            <a:solidFill>
-              <a:schemeClr val="tx1"/>
-            </a:solidFill>
-            <a:headEnd type="triangle"/>
-            <a:tailEnd type="triangle"/>
-          </a:ln>
-        </p:spPr>
-        <p:style>
-          <a:lnRef idx="1">
-            <a:schemeClr val="accent1"/>
-          </a:lnRef>
-          <a:fillRef idx="0">
-            <a:schemeClr val="accent1"/>
-          </a:fillRef>
-          <a:effectRef idx="0">
-            <a:schemeClr val="accent1"/>
-          </a:effectRef>
-          <a:fontRef idx="minor">
-            <a:schemeClr val="tx1"/>
-          </a:fontRef>
-        </p:style>
-      </p:cxnSp>
-      <p:sp>
-        <p:nvSpPr>
-          <p:cNvPr id="17" name="מלבן 16">
-            <a:extLst>
-              <a:ext uri="{FF2B5EF4-FFF2-40B4-BE49-F238E27FC236}">
-                <a16:creationId xmlns:a16="http://schemas.microsoft.com/office/drawing/2014/main" id="{F3655F1B-2B88-56D9-B6CC-2479172768FD}"/>
+          <a:noFill/>
+        </p:spPr>
+        <p:txBody>
+          <a:bodyPr wrap="none" lIns="91440" tIns="45720" rIns="91440" bIns="45720">
+            <a:spAutoFit/>
+          </a:bodyPr>
+          <a:lstStyle/>
+          <a:p>
+            <a:pPr algn="ctr"/>
+            <a:r>
+              <a:rPr lang="he-IL" sz="1600" dirty="0">
+                <a:ln w="0"/>
+                <a:effectLst>
+                  <a:outerShdw blurRad="38100" dist="19050" dir="2700000" algn="tl" rotWithShape="0">
+                    <a:schemeClr val="dk1">
+                      <a:alpha val="40000"/>
+                    </a:schemeClr>
+                  </a:outerShdw>
+                </a:effectLst>
+              </a:rPr>
+              <a:t>סינון שבועי</a:t>
+            </a:r>
+            <a:endParaRPr lang="he-IL" sz="1600" b="0" cap="none" spc="0" dirty="0">
+              <a:ln w="0"/>
+              <a:solidFill>
+                <a:schemeClr val="tx1"/>
+              </a:solidFill>
+              <a:effectLst>
+                <a:outerShdw blurRad="38100" dist="19050" dir="2700000" algn="tl" rotWithShape="0">
+                  <a:schemeClr val="dk1">
+                    <a:alpha val="40000"/>
+                  </a:schemeClr>
+                </a:outerShdw>
+              </a:effectLst>
+            </a:endParaRPr>
+          </a:p>
+        </p:txBody>
+      </p:sp>
+      <p:sp>
+        <p:nvSpPr>
+          <p:cNvPr id="75" name="מלבן 74">
+            <a:extLst>
+              <a:ext uri="{FF2B5EF4-FFF2-40B4-BE49-F238E27FC236}">
+                <a16:creationId xmlns:a16="http://schemas.microsoft.com/office/drawing/2014/main" id="{24EF3DD8-A0E4-8811-1A47-7EFE358690D3}"/>
               </a:ext>
             </a:extLst>
           </p:cNvPr>
@@ -5504,8 +6221,8 @@
         </p:nvSpPr>
         <p:spPr>
           <a:xfrm>
-            <a:off x="9893036" y="4629839"/>
-            <a:ext cx="607367" cy="1206631"/>
+            <a:off x="9844970" y="5570689"/>
+            <a:ext cx="1027523" cy="1206631"/>
           </a:xfrm>
           <a:prstGeom prst="rect">
             <a:avLst/>
@@ -5538,16 +6255,16 @@
           <a:lstStyle/>
           <a:p>
             <a:pPr algn="ctr"/>
-            <a:endParaRPr lang="he-IL" dirty="0"/>
-          </a:p>
-        </p:txBody>
-      </p:sp>
-      <p:sp>
-        <p:nvSpPr>
-          <p:cNvPr id="21" name="מלבן 20">
-            <a:extLst>
-              <a:ext uri="{FF2B5EF4-FFF2-40B4-BE49-F238E27FC236}">
-                <a16:creationId xmlns:a16="http://schemas.microsoft.com/office/drawing/2014/main" id="{BF471252-BA02-AD73-5409-084635F5BEF2}"/>
+            <a:endParaRPr lang="he-IL"/>
+          </a:p>
+        </p:txBody>
+      </p:sp>
+      <p:sp>
+        <p:nvSpPr>
+          <p:cNvPr id="76" name="מלבן 75">
+            <a:extLst>
+              <a:ext uri="{FF2B5EF4-FFF2-40B4-BE49-F238E27FC236}">
+                <a16:creationId xmlns:a16="http://schemas.microsoft.com/office/drawing/2014/main" id="{1789993C-B4E0-6B58-A25D-0E2130D20025}"/>
               </a:ext>
             </a:extLst>
           </p:cNvPr>
@@ -5556,8 +6273,60 @@
         </p:nvSpPr>
         <p:spPr>
           <a:xfrm>
-            <a:off x="9696252" y="4778200"/>
-            <a:ext cx="1027523" cy="830997"/>
+            <a:off x="11021501" y="5565095"/>
+            <a:ext cx="1027523" cy="1206631"/>
+          </a:xfrm>
+          <a:prstGeom prst="rect">
+            <a:avLst/>
+          </a:prstGeom>
+          <a:solidFill>
+            <a:schemeClr val="accent6">
+              <a:lumMod val="60000"/>
+              <a:lumOff val="40000"/>
+            </a:schemeClr>
+          </a:solidFill>
+        </p:spPr>
+        <p:style>
+          <a:lnRef idx="2">
+            <a:schemeClr val="accent1">
+              <a:shade val="15000"/>
+            </a:schemeClr>
+          </a:lnRef>
+          <a:fillRef idx="1">
+            <a:schemeClr val="accent1"/>
+          </a:fillRef>
+          <a:effectRef idx="0">
+            <a:schemeClr val="accent1"/>
+          </a:effectRef>
+          <a:fontRef idx="minor">
+            <a:schemeClr val="lt1"/>
+          </a:fontRef>
+        </p:style>
+        <p:txBody>
+          <a:bodyPr rtlCol="1" anchor="ctr"/>
+          <a:lstStyle/>
+          <a:p>
+            <a:pPr algn="ctr"/>
+            <a:endParaRPr lang="he-IL"/>
+          </a:p>
+        </p:txBody>
+      </p:sp>
+      <p:sp>
+        <p:nvSpPr>
+          <p:cNvPr id="77" name="מלבן 76">
+            <a:extLst>
+              <a:ext uri="{FF2B5EF4-FFF2-40B4-BE49-F238E27FC236}">
+                <a16:creationId xmlns:a16="http://schemas.microsoft.com/office/drawing/2014/main" id="{B01C46E6-CD4A-7CE4-EC1D-F4E3561B6EA0}"/>
+              </a:ext>
+            </a:extLst>
+          </p:cNvPr>
+          <p:cNvSpPr/>
+          <p:nvPr/>
+        </p:nvSpPr>
+        <p:spPr>
+          <a:xfrm>
+            <a:off x="9881013" y="5941853"/>
+            <a:ext cx="930063" cy="338554"/>
           </a:xfrm>
           <a:prstGeom prst="rect">
             <a:avLst/>
@@ -5565,7 +6334,65 @@
           <a:noFill/>
         </p:spPr>
         <p:txBody>
-          <a:bodyPr wrap="square" lIns="91440" tIns="45720" rIns="91440" bIns="45720">
+          <a:bodyPr wrap="none" lIns="91440" tIns="45720" rIns="91440" bIns="45720">
+            <a:spAutoFit/>
+          </a:bodyPr>
+          <a:lstStyle/>
+          <a:p>
+            <a:pPr algn="ctr"/>
+            <a:r>
+              <a:rPr lang="he-IL" sz="1600" dirty="0">
+                <a:ln w="0"/>
+                <a:effectLst>
+                  <a:outerShdw blurRad="38100" dist="19050" dir="2700000" algn="tl" rotWithShape="0">
+                    <a:schemeClr val="dk1">
+                      <a:alpha val="40000"/>
+                    </a:schemeClr>
+                  </a:outerShdw>
+                </a:effectLst>
+              </a:rPr>
+              <a:t>היסטוריה</a:t>
+            </a:r>
+            <a:endParaRPr lang="he-IL" sz="1600" b="0" cap="none" spc="0" dirty="0">
+              <a:ln w="0"/>
+              <a:solidFill>
+                <a:schemeClr val="tx1"/>
+              </a:solidFill>
+              <a:effectLst>
+                <a:outerShdw blurRad="38100" dist="19050" dir="2700000" algn="tl" rotWithShape="0">
+                  <a:schemeClr val="dk1">
+                    <a:alpha val="40000"/>
+                  </a:schemeClr>
+                </a:outerShdw>
+              </a:effectLst>
+            </a:endParaRPr>
+          </a:p>
+        </p:txBody>
+      </p:sp>
+      <p:sp>
+        <p:nvSpPr>
+          <p:cNvPr id="78" name="מלבן 77">
+            <a:extLst>
+              <a:ext uri="{FF2B5EF4-FFF2-40B4-BE49-F238E27FC236}">
+                <a16:creationId xmlns:a16="http://schemas.microsoft.com/office/drawing/2014/main" id="{AD12C710-17C6-958B-9592-3A0D3C1BD423}"/>
+              </a:ext>
+            </a:extLst>
+          </p:cNvPr>
+          <p:cNvSpPr/>
+          <p:nvPr/>
+        </p:nvSpPr>
+        <p:spPr>
+          <a:xfrm>
+            <a:off x="11206486" y="5943850"/>
+            <a:ext cx="657552" cy="338554"/>
+          </a:xfrm>
+          <a:prstGeom prst="rect">
+            <a:avLst/>
+          </a:prstGeom>
+          <a:noFill/>
+        </p:spPr>
+        <p:txBody>
+          <a:bodyPr wrap="none" lIns="91440" tIns="45720" rIns="91440" bIns="45720">
             <a:spAutoFit/>
           </a:bodyPr>
           <a:lstStyle/>
@@ -5585,30 +6412,272 @@
                   </a:outerShdw>
                 </a:effectLst>
               </a:rPr>
-              <a:t>הוספת הערה לתלמידה </a:t>
+              <a:t>גרפים</a:t>
             </a:r>
           </a:p>
         </p:txBody>
       </p:sp>
       <p:cxnSp>
         <p:nvCxnSpPr>
-          <p:cNvPr id="26" name="מחבר חץ ישר 25">
-            <a:extLst>
-              <a:ext uri="{FF2B5EF4-FFF2-40B4-BE49-F238E27FC236}">
-                <a16:creationId xmlns:a16="http://schemas.microsoft.com/office/drawing/2014/main" id="{4D472921-A6C0-E139-3991-D45F45AB9D5E}"/>
+          <p:cNvPr id="79" name="מחבר חץ ישר 78">
+            <a:extLst>
+              <a:ext uri="{FF2B5EF4-FFF2-40B4-BE49-F238E27FC236}">
+                <a16:creationId xmlns:a16="http://schemas.microsoft.com/office/drawing/2014/main" id="{3C79DE92-D7DF-1196-8D2C-DB365E3C0819}"/>
               </a:ext>
             </a:extLst>
           </p:cNvPr>
           <p:cNvCxnSpPr>
             <a:cxnSpLocks/>
-            <a:endCxn id="17" idx="0"/>
           </p:cNvCxnSpPr>
           <p:nvPr/>
         </p:nvCxnSpPr>
         <p:spPr>
+          <a:xfrm>
+            <a:off x="10698144" y="4529578"/>
+            <a:ext cx="677141" cy="1021375"/>
+          </a:xfrm>
+          <a:prstGeom prst="straightConnector1">
+            <a:avLst/>
+          </a:prstGeom>
+          <a:ln>
+            <a:solidFill>
+              <a:schemeClr val="tx1"/>
+            </a:solidFill>
+            <a:headEnd type="triangle"/>
+            <a:tailEnd type="triangle"/>
+          </a:ln>
+        </p:spPr>
+        <p:style>
+          <a:lnRef idx="1">
+            <a:schemeClr val="accent1"/>
+          </a:lnRef>
+          <a:fillRef idx="0">
+            <a:schemeClr val="accent1"/>
+          </a:fillRef>
+          <a:effectRef idx="0">
+            <a:schemeClr val="accent1"/>
+          </a:effectRef>
+          <a:fontRef idx="minor">
+            <a:schemeClr val="tx1"/>
+          </a:fontRef>
+        </p:style>
+      </p:cxnSp>
+      <p:cxnSp>
+        <p:nvCxnSpPr>
+          <p:cNvPr id="80" name="מחבר חץ ישר 79">
+            <a:extLst>
+              <a:ext uri="{FF2B5EF4-FFF2-40B4-BE49-F238E27FC236}">
+                <a16:creationId xmlns:a16="http://schemas.microsoft.com/office/drawing/2014/main" id="{195B2AE3-B938-6807-F9DC-4B9DAA998534}"/>
+              </a:ext>
+            </a:extLst>
+          </p:cNvPr>
+          <p:cNvCxnSpPr>
+            <a:cxnSpLocks/>
+            <a:stCxn id="32" idx="2"/>
+            <a:endCxn id="76" idx="0"/>
+          </p:cNvCxnSpPr>
+          <p:nvPr/>
+        </p:nvCxnSpPr>
+        <p:spPr>
+          <a:xfrm>
+            <a:off x="10635199" y="3110204"/>
+            <a:ext cx="900064" cy="2454891"/>
+          </a:xfrm>
+          <a:prstGeom prst="straightConnector1">
+            <a:avLst/>
+          </a:prstGeom>
+          <a:ln>
+            <a:solidFill>
+              <a:schemeClr val="tx1"/>
+            </a:solidFill>
+            <a:headEnd type="triangle"/>
+            <a:tailEnd type="triangle"/>
+          </a:ln>
+        </p:spPr>
+        <p:style>
+          <a:lnRef idx="1">
+            <a:schemeClr val="accent1"/>
+          </a:lnRef>
+          <a:fillRef idx="0">
+            <a:schemeClr val="accent1"/>
+          </a:fillRef>
+          <a:effectRef idx="0">
+            <a:schemeClr val="accent1"/>
+          </a:effectRef>
+          <a:fontRef idx="minor">
+            <a:schemeClr val="tx1"/>
+          </a:fontRef>
+        </p:style>
+      </p:cxnSp>
+      <p:cxnSp>
+        <p:nvCxnSpPr>
+          <p:cNvPr id="85" name="מחבר חץ ישר 84">
+            <a:extLst>
+              <a:ext uri="{FF2B5EF4-FFF2-40B4-BE49-F238E27FC236}">
+                <a16:creationId xmlns:a16="http://schemas.microsoft.com/office/drawing/2014/main" id="{4753EF98-0315-F602-F5C1-8ECABBC53197}"/>
+              </a:ext>
+            </a:extLst>
+          </p:cNvPr>
+          <p:cNvCxnSpPr>
+            <a:cxnSpLocks/>
+            <a:endCxn id="75" idx="0"/>
+          </p:cNvCxnSpPr>
+          <p:nvPr/>
+        </p:nvCxnSpPr>
+        <p:spPr>
           <a:xfrm flipH="1">
-            <a:off x="10196720" y="4477730"/>
-            <a:ext cx="174996" cy="152109"/>
+            <a:off x="10358732" y="4539245"/>
+            <a:ext cx="332559" cy="1031444"/>
+          </a:xfrm>
+          <a:prstGeom prst="straightConnector1">
+            <a:avLst/>
+          </a:prstGeom>
+          <a:ln>
+            <a:solidFill>
+              <a:schemeClr val="tx1"/>
+            </a:solidFill>
+            <a:headEnd type="triangle"/>
+            <a:tailEnd type="triangle"/>
+          </a:ln>
+        </p:spPr>
+        <p:style>
+          <a:lnRef idx="1">
+            <a:schemeClr val="accent1"/>
+          </a:lnRef>
+          <a:fillRef idx="0">
+            <a:schemeClr val="accent1"/>
+          </a:fillRef>
+          <a:effectRef idx="0">
+            <a:schemeClr val="accent1"/>
+          </a:effectRef>
+          <a:fontRef idx="minor">
+            <a:schemeClr val="tx1"/>
+          </a:fontRef>
+        </p:style>
+      </p:cxnSp>
+      <p:sp>
+        <p:nvSpPr>
+          <p:cNvPr id="88" name="מלבן 87">
+            <a:extLst>
+              <a:ext uri="{FF2B5EF4-FFF2-40B4-BE49-F238E27FC236}">
+                <a16:creationId xmlns:a16="http://schemas.microsoft.com/office/drawing/2014/main" id="{5769C063-C4C1-D71E-A18D-7E73CBCD43FF}"/>
+              </a:ext>
+            </a:extLst>
+          </p:cNvPr>
+          <p:cNvSpPr/>
+          <p:nvPr/>
+        </p:nvSpPr>
+        <p:spPr>
+          <a:xfrm>
+            <a:off x="3930978" y="58646"/>
+            <a:ext cx="4958498" cy="271291"/>
+          </a:xfrm>
+          <a:prstGeom prst="rect">
+            <a:avLst/>
+          </a:prstGeom>
+          <a:solidFill>
+            <a:schemeClr val="accent5">
+              <a:lumMod val="20000"/>
+              <a:lumOff val="80000"/>
+            </a:schemeClr>
+          </a:solidFill>
+          <a:ln>
+            <a:solidFill>
+              <a:schemeClr val="tx1"/>
+            </a:solidFill>
+          </a:ln>
+        </p:spPr>
+        <p:style>
+          <a:lnRef idx="2">
+            <a:schemeClr val="accent1">
+              <a:shade val="15000"/>
+            </a:schemeClr>
+          </a:lnRef>
+          <a:fillRef idx="1">
+            <a:schemeClr val="accent1"/>
+          </a:fillRef>
+          <a:effectRef idx="0">
+            <a:schemeClr val="accent1"/>
+          </a:effectRef>
+          <a:fontRef idx="minor">
+            <a:schemeClr val="lt1"/>
+          </a:fontRef>
+        </p:style>
+        <p:txBody>
+          <a:bodyPr rtlCol="1" anchor="ctr"/>
+          <a:lstStyle/>
+          <a:p>
+            <a:pPr algn="ctr"/>
+            <a:endParaRPr lang="he-IL"/>
+          </a:p>
+        </p:txBody>
+      </p:sp>
+      <p:sp>
+        <p:nvSpPr>
+          <p:cNvPr id="89" name="מלבן 88">
+            <a:extLst>
+              <a:ext uri="{FF2B5EF4-FFF2-40B4-BE49-F238E27FC236}">
+                <a16:creationId xmlns:a16="http://schemas.microsoft.com/office/drawing/2014/main" id="{DB259ED9-A1C1-781B-A951-7F5C79A56E4D}"/>
+              </a:ext>
+            </a:extLst>
+          </p:cNvPr>
+          <p:cNvSpPr/>
+          <p:nvPr/>
+        </p:nvSpPr>
+        <p:spPr>
+          <a:xfrm>
+            <a:off x="6017254" y="20334"/>
+            <a:ext cx="880370" cy="338554"/>
+          </a:xfrm>
+          <a:prstGeom prst="rect">
+            <a:avLst/>
+          </a:prstGeom>
+          <a:noFill/>
+        </p:spPr>
+        <p:txBody>
+          <a:bodyPr wrap="none" lIns="91440" tIns="45720" rIns="91440" bIns="45720">
+            <a:spAutoFit/>
+          </a:bodyPr>
+          <a:lstStyle/>
+          <a:p>
+            <a:pPr algn="ctr"/>
+            <a:r>
+              <a:rPr lang="he-IL" sz="1600" b="0" cap="none" spc="0" dirty="0">
+                <a:ln w="0"/>
+                <a:solidFill>
+                  <a:schemeClr val="tx1"/>
+                </a:solidFill>
+                <a:effectLst>
+                  <a:outerShdw blurRad="38100" dist="19050" dir="2700000" algn="tl" rotWithShape="0">
+                    <a:schemeClr val="dk1">
+                      <a:alpha val="40000"/>
+                    </a:schemeClr>
+                  </a:outerShdw>
+                </a:effectLst>
+              </a:rPr>
+              <a:t>דף הבית</a:t>
+            </a:r>
+          </a:p>
+        </p:txBody>
+      </p:sp>
+      <p:cxnSp>
+        <p:nvCxnSpPr>
+          <p:cNvPr id="90" name="מחבר חץ ישר 89">
+            <a:extLst>
+              <a:ext uri="{FF2B5EF4-FFF2-40B4-BE49-F238E27FC236}">
+                <a16:creationId xmlns:a16="http://schemas.microsoft.com/office/drawing/2014/main" id="{383BAE4E-031E-07F0-62D1-3869C0E83475}"/>
+              </a:ext>
+            </a:extLst>
+          </p:cNvPr>
+          <p:cNvCxnSpPr>
+            <a:cxnSpLocks/>
+          </p:cNvCxnSpPr>
+          <p:nvPr/>
+        </p:nvCxnSpPr>
+        <p:spPr>
+          <a:xfrm>
+            <a:off x="6391371" y="292229"/>
+            <a:ext cx="0" cy="200587"/>
           </a:xfrm>
           <a:prstGeom prst="straightConnector1">
             <a:avLst/>
@@ -6805,19 +7874,19 @@
           <a:p>
             <a:r>
               <a:rPr lang="he-IL" dirty="0"/>
-              <a:t>צפיה בנתוני התלמידות של המורה</a:t>
+              <a:t>צפיה בכל התלמידות של המורה.</a:t>
             </a:r>
           </a:p>
           <a:p>
             <a:r>
               <a:rPr lang="he-IL" dirty="0"/>
-              <a:t>ניתן לראות שם תלמידה מס' נקודות מס' שוברים ושוברי בועה </a:t>
+              <a:t>ניתן לראות שם תלמידה, מס' נקודות ומס' שוברים שבועי, ניתן להכניס נתונים של השבוע הנוכחי בלבד (כמות נקודות והאם ניתן שובר), לצורך עדכון מהיר.</a:t>
             </a:r>
           </a:p>
           <a:p>
             <a:r>
               <a:rPr lang="he-IL" dirty="0"/>
-              <a:t>בלחיצה על תלמידה מגיעים לכרטיס האישי שלה </a:t>
+              <a:t>בלחיצה על תלמידה מגיעים לכרטיס האישי שלה.</a:t>
             </a:r>
           </a:p>
         </p:txBody>
@@ -6875,7 +7944,7 @@
           <a:p>
             <a:r>
               <a:rPr lang="he-IL" dirty="0"/>
-              <a:t>פרטי תלמידה </a:t>
+              <a:t>מסך פרופיל תלמידה</a:t>
             </a:r>
           </a:p>
         </p:txBody>
@@ -6898,55 +7967,87 @@
         </p:nvSpPr>
         <p:spPr/>
         <p:txBody>
-          <a:bodyPr/>
+          <a:bodyPr>
+            <a:normAutofit fontScale="77500" lnSpcReduction="20000"/>
+          </a:bodyPr>
           <a:lstStyle/>
           <a:p>
             <a:r>
               <a:rPr lang="he-IL" dirty="0"/>
-              <a:t>הפרטים של התלמידה בגדול </a:t>
+              <a:t>פרטי התלמידה בגדול (שם, </a:t>
             </a:r>
           </a:p>
           <a:p>
             <a:r>
               <a:rPr lang="he-IL" dirty="0"/>
-              <a:t>ניתן לשנות את מספר הנקודות </a:t>
-            </a:r>
-          </a:p>
-          <a:p>
+              <a:t>סרגל סינונים לפי תקופות (שבועי, תקופתי, שנתי)</a:t>
+            </a:r>
+          </a:p>
+          <a:p>
+            <a:pPr lvl="1"/>
             <a:r>
               <a:rPr lang="he-IL" dirty="0"/>
-              <a:t>סיכום לפי תקופות</a:t>
-            </a:r>
-          </a:p>
-          <a:p>
+              <a:t>שבועי – ניתן לראות את מספר הנקודות של השבוע, האם היא קיבלה שובר, והאם היא מקבלת תעודת הצטיינות – רק כשנמצאים בסוף תקופת ההצטיינות ואפשרות לעריכת פרטים אלו </a:t>
+            </a:r>
+          </a:p>
+          <a:p>
+            <a:pPr lvl="1"/>
             <a:r>
               <a:rPr lang="he-IL" dirty="0"/>
-              <a:t>ניתן לשנות את מספר השוברים </a:t>
-            </a:r>
-          </a:p>
-          <a:p>
+              <a:t>תקופתי – ניתן לראות מחולק על פי שבועות בדיוק מה קרה כמה נקודות צברה כל שבוע וכמה שוברים ניתן לראות גם בצורה ויזואלית ע"י מסלול את כמות השוברים וכמה נשאר כדי לקבל תעודת הצטיינות </a:t>
+            </a:r>
+          </a:p>
+          <a:p>
+            <a:pPr lvl="1"/>
             <a:r>
               <a:rPr lang="he-IL" dirty="0"/>
-              <a:t>ניתן לשנות את מספר שוברי הבועה – בת שבע ומירי</a:t>
+              <a:t>שנתי – מסלול המציג את כמות התעודות שהתלמידה צברה</a:t>
             </a:r>
           </a:p>
           <a:p>
             <a:r>
               <a:rPr lang="he-IL" dirty="0"/>
-              <a:t>מוצג מספר השוברים שאמור להיות לה לפי הנקודות</a:t>
-            </a:r>
-          </a:p>
-          <a:p>
+              <a:t>אפשרות </a:t>
+            </a:r>
+            <a:r>
+              <a:rPr lang="he-IL" dirty="0" err="1"/>
+              <a:t>לצפיה</a:t>
+            </a:r>
             <a:r>
               <a:rPr lang="he-IL" dirty="0"/>
-              <a:t>הוספת הערה לתלמידה </a:t>
+              <a:t> בכל ההערות/הארות שהמורה נתנה לתלמידה והוספת הערה חדשה </a:t>
             </a:r>
           </a:p>
           <a:p>
             <a:r>
               <a:rPr lang="he-IL" dirty="0"/>
-              <a:t>כפתור שמירה שינויים </a:t>
-            </a:r>
+              <a:t>צפיה בסף הכיתה לצורך קבלת שובר שבועי ואפשרות לשינוי הסף – (האם הסף הוא משהו קבוע שקובעים בתחילת שנה ואז יש צורך לציין את זה למורה כדי שתבדוק מי הן התלמידות שמגיע להן שובר (יש חריגות) או שהסף נקבע כל שבוע מחדש לפי רמת הכיתה באותו שבוע ע"י המורה ואז אין צורך לציין את הסף אלא המורה מחליטה למי מגיע שובר ולמי לא </a:t>
+            </a:r>
+          </a:p>
+          <a:p>
+            <a:r>
+              <a:rPr lang="he-IL" dirty="0"/>
+              <a:t>בהמשך ניתוח גרפי התנהגות תלמידה לפי שבוע, תקופתי, שנתי וכו' </a:t>
+            </a:r>
+          </a:p>
+          <a:p>
+            <a:r>
+              <a:rPr lang="he-IL" dirty="0"/>
+              <a:t>כפתור היסטוריה וניתן לראות כל שבוע בדיוק כמה נקודות ניתנו האם ניתן שובר האם ניתן תעודת הצטיינות והערות והארות שנכתבו</a:t>
+            </a:r>
+          </a:p>
+          <a:p>
+            <a:endParaRPr lang="he-IL" dirty="0"/>
+          </a:p>
+          <a:p>
+            <a:endParaRPr lang="he-IL" dirty="0"/>
+          </a:p>
+          <a:p>
+            <a:endParaRPr lang="he-IL" dirty="0"/>
+          </a:p>
+          <a:p>
+            <a:pPr lvl="1"/>
+            <a:endParaRPr lang="he-IL" dirty="0"/>
           </a:p>
           <a:p>
             <a:pPr marL="0" indent="0">

</xml_diff>

<commit_message>
weekly voucher flow with points logs and student dashboard
</commit_message>
<xml_diff>
--- a/presentation/פרויקט עיצוב התנהגות - מסכים.pptx
+++ b/presentation/פרויקט עיצוב התנהגות - מסכים.pptx
@@ -269,7 +269,7 @@
           <a:p>
             <a:fld id="{1FFCD2AE-C8D6-4C5C-8058-C519C73E84B5}" type="datetimeFigureOut">
               <a:rPr lang="he-IL" smtClean="0"/>
-              <a:t>כ"ט/כסלו/תשפ"ו</a:t>
+              <a:t>א'/טבת/תשפ"ו</a:t>
             </a:fld>
             <a:endParaRPr lang="he-IL"/>
           </a:p>
@@ -467,7 +467,7 @@
           <a:p>
             <a:fld id="{1FFCD2AE-C8D6-4C5C-8058-C519C73E84B5}" type="datetimeFigureOut">
               <a:rPr lang="he-IL" smtClean="0"/>
-              <a:t>כ"ט/כסלו/תשפ"ו</a:t>
+              <a:t>א'/טבת/תשפ"ו</a:t>
             </a:fld>
             <a:endParaRPr lang="he-IL"/>
           </a:p>
@@ -675,7 +675,7 @@
           <a:p>
             <a:fld id="{1FFCD2AE-C8D6-4C5C-8058-C519C73E84B5}" type="datetimeFigureOut">
               <a:rPr lang="he-IL" smtClean="0"/>
-              <a:t>כ"ט/כסלו/תשפ"ו</a:t>
+              <a:t>א'/טבת/תשפ"ו</a:t>
             </a:fld>
             <a:endParaRPr lang="he-IL"/>
           </a:p>
@@ -873,7 +873,7 @@
           <a:p>
             <a:fld id="{1FFCD2AE-C8D6-4C5C-8058-C519C73E84B5}" type="datetimeFigureOut">
               <a:rPr lang="he-IL" smtClean="0"/>
-              <a:t>כ"ט/כסלו/תשפ"ו</a:t>
+              <a:t>א'/טבת/תשפ"ו</a:t>
             </a:fld>
             <a:endParaRPr lang="he-IL"/>
           </a:p>
@@ -1148,7 +1148,7 @@
           <a:p>
             <a:fld id="{1FFCD2AE-C8D6-4C5C-8058-C519C73E84B5}" type="datetimeFigureOut">
               <a:rPr lang="he-IL" smtClean="0"/>
-              <a:t>כ"ט/כסלו/תשפ"ו</a:t>
+              <a:t>א'/טבת/תשפ"ו</a:t>
             </a:fld>
             <a:endParaRPr lang="he-IL"/>
           </a:p>
@@ -1413,7 +1413,7 @@
           <a:p>
             <a:fld id="{1FFCD2AE-C8D6-4C5C-8058-C519C73E84B5}" type="datetimeFigureOut">
               <a:rPr lang="he-IL" smtClean="0"/>
-              <a:t>כ"ט/כסלו/תשפ"ו</a:t>
+              <a:t>א'/טבת/תשפ"ו</a:t>
             </a:fld>
             <a:endParaRPr lang="he-IL"/>
           </a:p>
@@ -1825,7 +1825,7 @@
           <a:p>
             <a:fld id="{1FFCD2AE-C8D6-4C5C-8058-C519C73E84B5}" type="datetimeFigureOut">
               <a:rPr lang="he-IL" smtClean="0"/>
-              <a:t>כ"ט/כסלו/תשפ"ו</a:t>
+              <a:t>א'/טבת/תשפ"ו</a:t>
             </a:fld>
             <a:endParaRPr lang="he-IL"/>
           </a:p>
@@ -1966,7 +1966,7 @@
           <a:p>
             <a:fld id="{1FFCD2AE-C8D6-4C5C-8058-C519C73E84B5}" type="datetimeFigureOut">
               <a:rPr lang="he-IL" smtClean="0"/>
-              <a:t>כ"ט/כסלו/תשפ"ו</a:t>
+              <a:t>א'/טבת/תשפ"ו</a:t>
             </a:fld>
             <a:endParaRPr lang="he-IL"/>
           </a:p>
@@ -2079,7 +2079,7 @@
           <a:p>
             <a:fld id="{1FFCD2AE-C8D6-4C5C-8058-C519C73E84B5}" type="datetimeFigureOut">
               <a:rPr lang="he-IL" smtClean="0"/>
-              <a:t>כ"ט/כסלו/תשפ"ו</a:t>
+              <a:t>א'/טבת/תשפ"ו</a:t>
             </a:fld>
             <a:endParaRPr lang="he-IL"/>
           </a:p>
@@ -2390,7 +2390,7 @@
           <a:p>
             <a:fld id="{1FFCD2AE-C8D6-4C5C-8058-C519C73E84B5}" type="datetimeFigureOut">
               <a:rPr lang="he-IL" smtClean="0"/>
-              <a:t>כ"ט/כסלו/תשפ"ו</a:t>
+              <a:t>א'/טבת/תשפ"ו</a:t>
             </a:fld>
             <a:endParaRPr lang="he-IL"/>
           </a:p>
@@ -2678,7 +2678,7 @@
           <a:p>
             <a:fld id="{1FFCD2AE-C8D6-4C5C-8058-C519C73E84B5}" type="datetimeFigureOut">
               <a:rPr lang="he-IL" smtClean="0"/>
-              <a:t>כ"ט/כסלו/תשפ"ו</a:t>
+              <a:t>א'/טבת/תשפ"ו</a:t>
             </a:fld>
             <a:endParaRPr lang="he-IL"/>
           </a:p>
@@ -2919,7 +2919,7 @@
           <a:p>
             <a:fld id="{1FFCD2AE-C8D6-4C5C-8058-C519C73E84B5}" type="datetimeFigureOut">
               <a:rPr lang="he-IL" smtClean="0"/>
-              <a:t>כ"ט/כסלו/תשפ"ו</a:t>
+              <a:t>א'/טבת/תשפ"ו</a:t>
             </a:fld>
             <a:endParaRPr lang="he-IL"/>
           </a:p>
@@ -6705,6 +6705,153 @@
           </a:fontRef>
         </p:style>
       </p:cxnSp>
+      <p:sp>
+        <p:nvSpPr>
+          <p:cNvPr id="5" name="מלבן 4">
+            <a:extLst>
+              <a:ext uri="{FF2B5EF4-FFF2-40B4-BE49-F238E27FC236}">
+                <a16:creationId xmlns:a16="http://schemas.microsoft.com/office/drawing/2014/main" id="{DC15F40F-55BC-3FCE-9C97-A3A96F7371E5}"/>
+              </a:ext>
+            </a:extLst>
+          </p:cNvPr>
+          <p:cNvSpPr/>
+          <p:nvPr/>
+        </p:nvSpPr>
+        <p:spPr>
+          <a:xfrm>
+            <a:off x="4793072" y="1885385"/>
+            <a:ext cx="1027523" cy="1206631"/>
+          </a:xfrm>
+          <a:prstGeom prst="rect">
+            <a:avLst/>
+          </a:prstGeom>
+          <a:solidFill>
+            <a:schemeClr val="accent2">
+              <a:lumMod val="40000"/>
+              <a:lumOff val="60000"/>
+            </a:schemeClr>
+          </a:solidFill>
+        </p:spPr>
+        <p:style>
+          <a:lnRef idx="2">
+            <a:schemeClr val="accent1">
+              <a:shade val="15000"/>
+            </a:schemeClr>
+          </a:lnRef>
+          <a:fillRef idx="1">
+            <a:schemeClr val="accent1"/>
+          </a:fillRef>
+          <a:effectRef idx="0">
+            <a:schemeClr val="accent1"/>
+          </a:effectRef>
+          <a:fontRef idx="minor">
+            <a:schemeClr val="lt1"/>
+          </a:fontRef>
+        </p:style>
+        <p:txBody>
+          <a:bodyPr rtlCol="1" anchor="ctr"/>
+          <a:lstStyle/>
+          <a:p>
+            <a:pPr algn="ctr"/>
+            <a:endParaRPr lang="he-IL" dirty="0"/>
+          </a:p>
+        </p:txBody>
+      </p:sp>
+      <p:cxnSp>
+        <p:nvCxnSpPr>
+          <p:cNvPr id="16" name="מחבר חץ ישר 15">
+            <a:extLst>
+              <a:ext uri="{FF2B5EF4-FFF2-40B4-BE49-F238E27FC236}">
+                <a16:creationId xmlns:a16="http://schemas.microsoft.com/office/drawing/2014/main" id="{0EB3B557-BD6A-FE6F-1C5B-D95BB43B07D0}"/>
+              </a:ext>
+            </a:extLst>
+          </p:cNvPr>
+          <p:cNvCxnSpPr>
+            <a:cxnSpLocks/>
+            <a:stCxn id="5" idx="3"/>
+            <a:endCxn id="35" idx="1"/>
+          </p:cNvCxnSpPr>
+          <p:nvPr/>
+        </p:nvCxnSpPr>
+        <p:spPr>
+          <a:xfrm flipV="1">
+            <a:off x="5820595" y="2488677"/>
+            <a:ext cx="237697" cy="24"/>
+          </a:xfrm>
+          <a:prstGeom prst="straightConnector1">
+            <a:avLst/>
+          </a:prstGeom>
+          <a:ln>
+            <a:solidFill>
+              <a:schemeClr val="tx1"/>
+            </a:solidFill>
+            <a:headEnd type="triangle"/>
+            <a:tailEnd type="triangle"/>
+          </a:ln>
+        </p:spPr>
+        <p:style>
+          <a:lnRef idx="1">
+            <a:schemeClr val="accent1"/>
+          </a:lnRef>
+          <a:fillRef idx="0">
+            <a:schemeClr val="accent1"/>
+          </a:fillRef>
+          <a:effectRef idx="0">
+            <a:schemeClr val="accent1"/>
+          </a:effectRef>
+          <a:fontRef idx="minor">
+            <a:schemeClr val="tx1"/>
+          </a:fontRef>
+        </p:style>
+      </p:cxnSp>
+      <p:sp>
+        <p:nvSpPr>
+          <p:cNvPr id="31" name="מלבן 30">
+            <a:extLst>
+              <a:ext uri="{FF2B5EF4-FFF2-40B4-BE49-F238E27FC236}">
+                <a16:creationId xmlns:a16="http://schemas.microsoft.com/office/drawing/2014/main" id="{09294D4A-7447-C56B-7233-2042EB3C8266}"/>
+              </a:ext>
+            </a:extLst>
+          </p:cNvPr>
+          <p:cNvSpPr/>
+          <p:nvPr/>
+        </p:nvSpPr>
+        <p:spPr>
+          <a:xfrm>
+            <a:off x="4781869" y="1836086"/>
+            <a:ext cx="1027523" cy="1323439"/>
+          </a:xfrm>
+          <a:prstGeom prst="rect">
+            <a:avLst/>
+          </a:prstGeom>
+          <a:noFill/>
+        </p:spPr>
+        <p:txBody>
+          <a:bodyPr wrap="square" lIns="91440" tIns="45720" rIns="91440" bIns="45720">
+            <a:spAutoFit/>
+          </a:bodyPr>
+          <a:lstStyle/>
+          <a:p>
+            <a:pPr algn="ctr"/>
+            <a:r>
+              <a:rPr lang="he-IL" sz="1600" b="0" cap="none" spc="0" dirty="0">
+                <a:ln w="0"/>
+                <a:solidFill>
+                  <a:schemeClr val="tx1"/>
+                </a:solidFill>
+                <a:effectLst>
+                  <a:outerShdw blurRad="38100" dist="19050" dir="2700000" algn="tl" rotWithShape="0">
+                    <a:schemeClr val="dk1">
+                      <a:alpha val="40000"/>
+                    </a:schemeClr>
+                  </a:outerShdw>
+                </a:effectLst>
+              </a:rPr>
+              <a:t>כל ההודעות מהמורות מחולקות לפי נתינתן</a:t>
+            </a:r>
+          </a:p>
+        </p:txBody>
+      </p:sp>
     </p:spTree>
     <p:extLst>
       <p:ext uri="{BB962C8B-B14F-4D97-AF65-F5344CB8AC3E}">

</xml_diff>

<commit_message>
Update UI & specification presentations
</commit_message>
<xml_diff>
--- a/presentation/פרויקט עיצוב התנהגות - מסכים.pptx
+++ b/presentation/פרויקט עיצוב התנהגות - מסכים.pptx
@@ -7,15 +7,16 @@
   <p:sldIdLst>
     <p:sldId id="256" r:id="rId2"/>
     <p:sldId id="257" r:id="rId3"/>
-    <p:sldId id="258" r:id="rId4"/>
-    <p:sldId id="259" r:id="rId5"/>
-    <p:sldId id="260" r:id="rId6"/>
-    <p:sldId id="261" r:id="rId7"/>
-    <p:sldId id="262" r:id="rId8"/>
-    <p:sldId id="263" r:id="rId9"/>
-    <p:sldId id="264" r:id="rId10"/>
-    <p:sldId id="266" r:id="rId11"/>
-    <p:sldId id="265" r:id="rId12"/>
+    <p:sldId id="267" r:id="rId4"/>
+    <p:sldId id="268" r:id="rId5"/>
+    <p:sldId id="269" r:id="rId6"/>
+    <p:sldId id="270" r:id="rId7"/>
+    <p:sldId id="271" r:id="rId8"/>
+    <p:sldId id="260" r:id="rId9"/>
+    <p:sldId id="262" r:id="rId10"/>
+    <p:sldId id="264" r:id="rId11"/>
+    <p:sldId id="266" r:id="rId12"/>
+    <p:sldId id="265" r:id="rId13"/>
   </p:sldIdLst>
   <p:sldSz cx="12192000" cy="6858000"/>
   <p:notesSz cx="6858000" cy="9144000"/>
@@ -269,7 +270,7 @@
           <a:p>
             <a:fld id="{1FFCD2AE-C8D6-4C5C-8058-C519C73E84B5}" type="datetimeFigureOut">
               <a:rPr lang="he-IL" smtClean="0"/>
-              <a:t>א'/טבת/תשפ"ו</a:t>
+              <a:t>כ"ג/טבת/תשפ"ו</a:t>
             </a:fld>
             <a:endParaRPr lang="he-IL"/>
           </a:p>
@@ -467,7 +468,7 @@
           <a:p>
             <a:fld id="{1FFCD2AE-C8D6-4C5C-8058-C519C73E84B5}" type="datetimeFigureOut">
               <a:rPr lang="he-IL" smtClean="0"/>
-              <a:t>א'/טבת/תשפ"ו</a:t>
+              <a:t>כ"ג/טבת/תשפ"ו</a:t>
             </a:fld>
             <a:endParaRPr lang="he-IL"/>
           </a:p>
@@ -675,7 +676,7 @@
           <a:p>
             <a:fld id="{1FFCD2AE-C8D6-4C5C-8058-C519C73E84B5}" type="datetimeFigureOut">
               <a:rPr lang="he-IL" smtClean="0"/>
-              <a:t>א'/טבת/תשפ"ו</a:t>
+              <a:t>כ"ג/טבת/תשפ"ו</a:t>
             </a:fld>
             <a:endParaRPr lang="he-IL"/>
           </a:p>
@@ -873,7 +874,7 @@
           <a:p>
             <a:fld id="{1FFCD2AE-C8D6-4C5C-8058-C519C73E84B5}" type="datetimeFigureOut">
               <a:rPr lang="he-IL" smtClean="0"/>
-              <a:t>א'/טבת/תשפ"ו</a:t>
+              <a:t>כ"ג/טבת/תשפ"ו</a:t>
             </a:fld>
             <a:endParaRPr lang="he-IL"/>
           </a:p>
@@ -1148,7 +1149,7 @@
           <a:p>
             <a:fld id="{1FFCD2AE-C8D6-4C5C-8058-C519C73E84B5}" type="datetimeFigureOut">
               <a:rPr lang="he-IL" smtClean="0"/>
-              <a:t>א'/טבת/תשפ"ו</a:t>
+              <a:t>כ"ג/טבת/תשפ"ו</a:t>
             </a:fld>
             <a:endParaRPr lang="he-IL"/>
           </a:p>
@@ -1413,7 +1414,7 @@
           <a:p>
             <a:fld id="{1FFCD2AE-C8D6-4C5C-8058-C519C73E84B5}" type="datetimeFigureOut">
               <a:rPr lang="he-IL" smtClean="0"/>
-              <a:t>א'/טבת/תשפ"ו</a:t>
+              <a:t>כ"ג/טבת/תשפ"ו</a:t>
             </a:fld>
             <a:endParaRPr lang="he-IL"/>
           </a:p>
@@ -1825,7 +1826,7 @@
           <a:p>
             <a:fld id="{1FFCD2AE-C8D6-4C5C-8058-C519C73E84B5}" type="datetimeFigureOut">
               <a:rPr lang="he-IL" smtClean="0"/>
-              <a:t>א'/טבת/תשפ"ו</a:t>
+              <a:t>כ"ג/טבת/תשפ"ו</a:t>
             </a:fld>
             <a:endParaRPr lang="he-IL"/>
           </a:p>
@@ -1966,7 +1967,7 @@
           <a:p>
             <a:fld id="{1FFCD2AE-C8D6-4C5C-8058-C519C73E84B5}" type="datetimeFigureOut">
               <a:rPr lang="he-IL" smtClean="0"/>
-              <a:t>א'/טבת/תשפ"ו</a:t>
+              <a:t>כ"ג/טבת/תשפ"ו</a:t>
             </a:fld>
             <a:endParaRPr lang="he-IL"/>
           </a:p>
@@ -2079,7 +2080,7 @@
           <a:p>
             <a:fld id="{1FFCD2AE-C8D6-4C5C-8058-C519C73E84B5}" type="datetimeFigureOut">
               <a:rPr lang="he-IL" smtClean="0"/>
-              <a:t>א'/טבת/תשפ"ו</a:t>
+              <a:t>כ"ג/טבת/תשפ"ו</a:t>
             </a:fld>
             <a:endParaRPr lang="he-IL"/>
           </a:p>
@@ -2390,7 +2391,7 @@
           <a:p>
             <a:fld id="{1FFCD2AE-C8D6-4C5C-8058-C519C73E84B5}" type="datetimeFigureOut">
               <a:rPr lang="he-IL" smtClean="0"/>
-              <a:t>א'/טבת/תשפ"ו</a:t>
+              <a:t>כ"ג/טבת/תשפ"ו</a:t>
             </a:fld>
             <a:endParaRPr lang="he-IL"/>
           </a:p>
@@ -2678,7 +2679,7 @@
           <a:p>
             <a:fld id="{1FFCD2AE-C8D6-4C5C-8058-C519C73E84B5}" type="datetimeFigureOut">
               <a:rPr lang="he-IL" smtClean="0"/>
-              <a:t>א'/טבת/תשפ"ו</a:t>
+              <a:t>כ"ג/טבת/תשפ"ו</a:t>
             </a:fld>
             <a:endParaRPr lang="he-IL"/>
           </a:p>
@@ -2919,7 +2920,7 @@
           <a:p>
             <a:fld id="{1FFCD2AE-C8D6-4C5C-8058-C519C73E84B5}" type="datetimeFigureOut">
               <a:rPr lang="he-IL" smtClean="0"/>
-              <a:t>א'/טבת/תשפ"ו</a:t>
+              <a:t>כ"ג/טבת/תשפ"ו</a:t>
             </a:fld>
             <a:endParaRPr lang="he-IL"/>
           </a:p>
@@ -3575,6 +3576,129 @@
       </p:grpSpPr>
       <p:sp>
         <p:nvSpPr>
+          <p:cNvPr id="2" name="כותרת 1">
+            <a:extLst>
+              <a:ext uri="{FF2B5EF4-FFF2-40B4-BE49-F238E27FC236}">
+                <a16:creationId xmlns:a16="http://schemas.microsoft.com/office/drawing/2014/main" id="{1BDCEDCE-6727-1211-5701-FCA2B4538D89}"/>
+              </a:ext>
+            </a:extLst>
+          </p:cNvPr>
+          <p:cNvSpPr>
+            <a:spLocks noGrp="1"/>
+          </p:cNvSpPr>
+          <p:nvPr>
+            <p:ph type="title"/>
+          </p:nvPr>
+        </p:nvSpPr>
+        <p:spPr/>
+        <p:txBody>
+          <a:bodyPr/>
+          <a:lstStyle/>
+          <a:p>
+            <a:r>
+              <a:rPr lang="he-IL" dirty="0"/>
+              <a:t>כניסת תלמידות – סל הקניות </a:t>
+            </a:r>
+          </a:p>
+        </p:txBody>
+      </p:sp>
+      <p:sp>
+        <p:nvSpPr>
+          <p:cNvPr id="3" name="מציין מיקום תוכן 2">
+            <a:extLst>
+              <a:ext uri="{FF2B5EF4-FFF2-40B4-BE49-F238E27FC236}">
+                <a16:creationId xmlns:a16="http://schemas.microsoft.com/office/drawing/2014/main" id="{752A6DB4-0556-934E-B85A-7ED3EBB064A7}"/>
+              </a:ext>
+            </a:extLst>
+          </p:cNvPr>
+          <p:cNvSpPr>
+            <a:spLocks noGrp="1"/>
+          </p:cNvSpPr>
+          <p:nvPr>
+            <p:ph idx="1"/>
+          </p:nvPr>
+        </p:nvSpPr>
+        <p:spPr/>
+        <p:txBody>
+          <a:bodyPr>
+            <a:normAutofit lnSpcReduction="10000"/>
+          </a:bodyPr>
+          <a:lstStyle/>
+          <a:p>
+            <a:r>
+              <a:rPr lang="he-IL" dirty="0"/>
+              <a:t>צפיה בכל הפריטים בסל </a:t>
+            </a:r>
+          </a:p>
+          <a:p>
+            <a:r>
+              <a:rPr lang="he-IL" dirty="0"/>
+              <a:t>על כל פריט אפשרות למחוק אותו מהסל, </a:t>
+            </a:r>
+            <a:r>
+              <a:rPr lang="he-IL" dirty="0" err="1"/>
+              <a:t>צראות</a:t>
+            </a:r>
+            <a:r>
+              <a:rPr lang="he-IL" dirty="0"/>
+              <a:t> תמונה, שם, תיאור, מחיר, קטגוריה, אפשרות לעדכון כמות להזמנה </a:t>
+            </a:r>
+          </a:p>
+          <a:p>
+            <a:r>
+              <a:rPr lang="he-IL" dirty="0"/>
+              <a:t>צפיה בעלות על הקניה </a:t>
+            </a:r>
+          </a:p>
+          <a:p>
+            <a:r>
+              <a:rPr lang="he-IL" dirty="0"/>
+              <a:t>כפתור לסיום הזמנה – בעת לחיצה עליו תוצג הודעת הזהרה "אין החלפות והחזרות כלל!" לחיצה על אישור בהודעת ההזהרה תעדכן את כמות השוברים ותשלח מייל לצוות ניהול על ביצוע הזמנה התלמידה תקבל מספר הזמנה לצורך אימות ההזמנה – זמני בשלב עתידי יותר יהיה ממשק ניהול ולשם ישלחו הזמנות שצריכות טיפול </a:t>
+            </a:r>
+          </a:p>
+          <a:p>
+            <a:r>
+              <a:rPr lang="he-IL" dirty="0"/>
+              <a:t>כפתור לחזרה לעמוד הקיוסק </a:t>
+            </a:r>
+          </a:p>
+          <a:p>
+            <a:endParaRPr lang="he-IL" dirty="0"/>
+          </a:p>
+        </p:txBody>
+      </p:sp>
+    </p:spTree>
+    <p:extLst>
+      <p:ext uri="{BB962C8B-B14F-4D97-AF65-F5344CB8AC3E}">
+        <p14:creationId xmlns:p14="http://schemas.microsoft.com/office/powerpoint/2010/main" val="3372685935"/>
+      </p:ext>
+    </p:extLst>
+  </p:cSld>
+  <p:clrMapOvr>
+    <a:masterClrMapping/>
+  </p:clrMapOvr>
+</p:sld>
+</file>
+
+<file path=ppt/slides/slide11.xml><?xml version="1.0" encoding="utf-8"?>
+<p:sld xmlns:a="http://schemas.openxmlformats.org/drawingml/2006/main" xmlns:r="http://schemas.openxmlformats.org/officeDocument/2006/relationships" xmlns:p="http://schemas.openxmlformats.org/presentationml/2006/main">
+  <p:cSld>
+    <p:spTree>
+      <p:nvGrpSpPr>
+        <p:cNvPr id="1" name=""/>
+        <p:cNvGrpSpPr/>
+        <p:nvPr/>
+      </p:nvGrpSpPr>
+      <p:grpSpPr>
+        <a:xfrm>
+          <a:off x="0" y="0"/>
+          <a:ext cx="0" cy="0"/>
+          <a:chOff x="0" y="0"/>
+          <a:chExt cx="0" cy="0"/>
+        </a:xfrm>
+      </p:grpSpPr>
+      <p:sp>
+        <p:nvSpPr>
           <p:cNvPr id="6" name="מלבן 5">
             <a:extLst>
               <a:ext uri="{FF2B5EF4-FFF2-40B4-BE49-F238E27FC236}">
@@ -4291,8 +4415,8 @@
         </p:nvSpPr>
         <p:spPr>
           <a:xfrm>
-            <a:off x="10121437" y="1909875"/>
-            <a:ext cx="1027523" cy="1200329"/>
+            <a:off x="10101540" y="1977550"/>
+            <a:ext cx="1027523" cy="1015663"/>
           </a:xfrm>
           <a:prstGeom prst="rect">
             <a:avLst/>
@@ -4320,14 +4444,11 @@
                   </a:outerShdw>
                 </a:effectLst>
               </a:rPr>
-              <a:t>מצב כלל התלמידות (שבועי) + אפשרויות עדכון שבועיות </a:t>
-            </a:r>
-            <a:r>
-              <a:rPr lang="he-IL" sz="1200" b="0" cap="none" spc="0" dirty="0" err="1">
+              <a:t>מצב כלל התלמידות </a:t>
+            </a:r>
+            <a:r>
+              <a:rPr lang="he-IL" sz="1200" dirty="0">
                 <a:ln w="0"/>
-                <a:solidFill>
-                  <a:schemeClr val="tx1"/>
-                </a:solidFill>
                 <a:effectLst>
                   <a:outerShdw blurRad="38100" dist="19050" dir="2700000" algn="tl" rotWithShape="0">
                     <a:schemeClr val="dk1">
@@ -4336,7 +4457,33 @@
                   </a:outerShdw>
                 </a:effectLst>
               </a:rPr>
-              <a:t>מהירןת</a:t>
+              <a:t>(כל </a:t>
+            </a:r>
+            <a:r>
+              <a:rPr lang="he-IL" sz="1200" dirty="0" err="1">
+                <a:ln w="0"/>
+                <a:effectLst>
+                  <a:outerShdw blurRad="38100" dist="19050" dir="2700000" algn="tl" rotWithShape="0">
+                    <a:schemeClr val="dk1">
+                      <a:alpha val="40000"/>
+                    </a:schemeClr>
+                  </a:outerShdw>
+                </a:effectLst>
+              </a:rPr>
+              <a:t>טאב</a:t>
+            </a:r>
+            <a:r>
+              <a:rPr lang="he-IL" sz="1200" dirty="0">
+                <a:ln w="0"/>
+                <a:effectLst>
+                  <a:outerShdw blurRad="38100" dist="19050" dir="2700000" algn="tl" rotWithShape="0">
+                    <a:schemeClr val="dk1">
+                      <a:alpha val="40000"/>
+                    </a:schemeClr>
+                  </a:outerShdw>
+                </a:effectLst>
+              </a:rPr>
+              <a:t> הוא שבועי מחולק לפי הימים)</a:t>
             </a:r>
             <a:endParaRPr lang="he-IL" sz="1200" b="0" cap="none" spc="0" dirty="0">
               <a:ln w="0"/>
@@ -6480,8 +6627,8 @@
         </p:nvCxnSpPr>
         <p:spPr>
           <a:xfrm>
-            <a:off x="10635199" y="3110204"/>
-            <a:ext cx="900064" cy="2454891"/>
+            <a:off x="10615302" y="2993213"/>
+            <a:ext cx="919961" cy="2571882"/>
           </a:xfrm>
           <a:prstGeom prst="straightConnector1">
             <a:avLst/>
@@ -6852,6 +6999,155 @@
           </a:p>
         </p:txBody>
       </p:sp>
+      <p:sp>
+        <p:nvSpPr>
+          <p:cNvPr id="30" name="מלבן 29">
+            <a:extLst>
+              <a:ext uri="{FF2B5EF4-FFF2-40B4-BE49-F238E27FC236}">
+                <a16:creationId xmlns:a16="http://schemas.microsoft.com/office/drawing/2014/main" id="{77C01BD4-706E-3303-E68D-12E3CB7CE297}"/>
+              </a:ext>
+            </a:extLst>
+          </p:cNvPr>
+          <p:cNvSpPr/>
+          <p:nvPr/>
+        </p:nvSpPr>
+        <p:spPr>
+          <a:xfrm>
+            <a:off x="8857071" y="1905555"/>
+            <a:ext cx="1027523" cy="467331"/>
+          </a:xfrm>
+          <a:prstGeom prst="rect">
+            <a:avLst/>
+          </a:prstGeom>
+          <a:solidFill>
+            <a:schemeClr val="accent6">
+              <a:lumMod val="60000"/>
+              <a:lumOff val="40000"/>
+            </a:schemeClr>
+          </a:solidFill>
+        </p:spPr>
+        <p:style>
+          <a:lnRef idx="2">
+            <a:schemeClr val="accent1">
+              <a:shade val="15000"/>
+            </a:schemeClr>
+          </a:lnRef>
+          <a:fillRef idx="1">
+            <a:schemeClr val="accent1"/>
+          </a:fillRef>
+          <a:effectRef idx="0">
+            <a:schemeClr val="accent1"/>
+          </a:effectRef>
+          <a:fontRef idx="minor">
+            <a:schemeClr val="lt1"/>
+          </a:fontRef>
+        </p:style>
+        <p:txBody>
+          <a:bodyPr rtlCol="1" anchor="ctr"/>
+          <a:lstStyle/>
+          <a:p>
+            <a:pPr algn="ctr"/>
+            <a:endParaRPr lang="he-IL"/>
+          </a:p>
+        </p:txBody>
+      </p:sp>
+      <p:sp>
+        <p:nvSpPr>
+          <p:cNvPr id="52" name="מלבן 51">
+            <a:extLst>
+              <a:ext uri="{FF2B5EF4-FFF2-40B4-BE49-F238E27FC236}">
+                <a16:creationId xmlns:a16="http://schemas.microsoft.com/office/drawing/2014/main" id="{02233FFC-A5B4-9E0A-4DD7-5CEEC09FBE8D}"/>
+              </a:ext>
+            </a:extLst>
+          </p:cNvPr>
+          <p:cNvSpPr/>
+          <p:nvPr/>
+        </p:nvSpPr>
+        <p:spPr>
+          <a:xfrm>
+            <a:off x="8836320" y="1823004"/>
+            <a:ext cx="1027523" cy="646331"/>
+          </a:xfrm>
+          <a:prstGeom prst="rect">
+            <a:avLst/>
+          </a:prstGeom>
+          <a:noFill/>
+        </p:spPr>
+        <p:txBody>
+          <a:bodyPr wrap="square" lIns="91440" tIns="45720" rIns="91440" bIns="45720">
+            <a:spAutoFit/>
+          </a:bodyPr>
+          <a:lstStyle/>
+          <a:p>
+            <a:pPr algn="ctr"/>
+            <a:r>
+              <a:rPr lang="he-IL" sz="1200" dirty="0">
+                <a:ln w="0"/>
+                <a:effectLst>
+                  <a:outerShdw blurRad="38100" dist="19050" dir="2700000" algn="tl" rotWithShape="0">
+                    <a:schemeClr val="dk1">
+                      <a:alpha val="40000"/>
+                    </a:schemeClr>
+                  </a:outerShdw>
+                </a:effectLst>
+              </a:rPr>
+              <a:t>עריכת נקודות שיעור עבור תלמידה  </a:t>
+            </a:r>
+          </a:p>
+        </p:txBody>
+      </p:sp>
+      <p:sp>
+        <p:nvSpPr>
+          <p:cNvPr id="53" name="מלבן 52">
+            <a:extLst>
+              <a:ext uri="{FF2B5EF4-FFF2-40B4-BE49-F238E27FC236}">
+                <a16:creationId xmlns:a16="http://schemas.microsoft.com/office/drawing/2014/main" id="{E120B312-C7F7-1A4B-776E-44AE822BE0DB}"/>
+              </a:ext>
+            </a:extLst>
+          </p:cNvPr>
+          <p:cNvSpPr/>
+          <p:nvPr/>
+        </p:nvSpPr>
+        <p:spPr>
+          <a:xfrm>
+            <a:off x="8847321" y="2711364"/>
+            <a:ext cx="1027523" cy="467331"/>
+          </a:xfrm>
+          <a:prstGeom prst="rect">
+            <a:avLst/>
+          </a:prstGeom>
+          <a:solidFill>
+            <a:schemeClr val="accent6">
+              <a:lumMod val="60000"/>
+              <a:lumOff val="40000"/>
+            </a:schemeClr>
+          </a:solidFill>
+        </p:spPr>
+        <p:style>
+          <a:lnRef idx="2">
+            <a:schemeClr val="accent1">
+              <a:shade val="15000"/>
+            </a:schemeClr>
+          </a:lnRef>
+          <a:fillRef idx="1">
+            <a:schemeClr val="accent1"/>
+          </a:fillRef>
+          <a:effectRef idx="0">
+            <a:schemeClr val="accent1"/>
+          </a:effectRef>
+          <a:fontRef idx="minor">
+            <a:schemeClr val="lt1"/>
+          </a:fontRef>
+        </p:style>
+        <p:txBody>
+          <a:bodyPr rtlCol="1" anchor="ctr"/>
+          <a:lstStyle/>
+          <a:p>
+            <a:pPr algn="ctr"/>
+            <a:endParaRPr lang="he-IL"/>
+          </a:p>
+        </p:txBody>
+      </p:sp>
     </p:spTree>
     <p:extLst>
       <p:ext uri="{BB962C8B-B14F-4D97-AF65-F5344CB8AC3E}">
@@ -6865,7 +7161,7 @@
 </p:sld>
 </file>
 
-<file path=ppt/slides/slide11.xml><?xml version="1.0" encoding="utf-8"?>
+<file path=ppt/slides/slide12.xml><?xml version="1.0" encoding="utf-8"?>
 <p:sld xmlns:a="http://schemas.openxmlformats.org/drawingml/2006/main" xmlns:r="http://schemas.openxmlformats.org/officeDocument/2006/relationships" xmlns:p="http://schemas.openxmlformats.org/presentationml/2006/main">
   <p:cSld>
     <p:spTree>
@@ -7193,753 +7489,41 @@
           </a:p>
         </p:txBody>
       </p:sp>
-      <p:grpSp>
-        <p:nvGrpSpPr>
-          <p:cNvPr id="20" name="קבוצה 19">
-            <a:extLst>
-              <a:ext uri="{FF2B5EF4-FFF2-40B4-BE49-F238E27FC236}">
-                <a16:creationId xmlns:a16="http://schemas.microsoft.com/office/drawing/2014/main" id="{87BB2792-BA62-2827-EF50-B79EAE79D380}"/>
-              </a:ext>
-            </a:extLst>
-          </p:cNvPr>
-          <p:cNvGrpSpPr/>
+      <p:pic>
+        <p:nvPicPr>
+          <p:cNvPr id="4" name="תמונה 3">
+            <a:extLst>
+              <a:ext uri="{FF2B5EF4-FFF2-40B4-BE49-F238E27FC236}">
+                <a16:creationId xmlns:a16="http://schemas.microsoft.com/office/drawing/2014/main" id="{B6344AAA-774C-F86C-16C4-FFEB7306EA13}"/>
+              </a:ext>
+            </a:extLst>
+          </p:cNvPr>
+          <p:cNvPicPr>
+            <a:picLocks noChangeAspect="1"/>
+          </p:cNvPicPr>
           <p:nvPr/>
-        </p:nvGrpSpPr>
-        <p:grpSpPr>
-          <a:xfrm>
-            <a:off x="176855" y="2280262"/>
-            <a:ext cx="4601817" cy="4472608"/>
-            <a:chOff x="3796748" y="1808922"/>
-            <a:chExt cx="4601817" cy="4472608"/>
-          </a:xfrm>
-        </p:grpSpPr>
-        <p:sp>
-          <p:nvSpPr>
-            <p:cNvPr id="8" name="מלבן: פינות מעוגלות 7">
-              <a:extLst>
-                <a:ext uri="{FF2B5EF4-FFF2-40B4-BE49-F238E27FC236}">
-                  <a16:creationId xmlns:a16="http://schemas.microsoft.com/office/drawing/2014/main" id="{4D95DD5A-0607-FA87-381D-90D2BB1FA669}"/>
-                </a:ext>
-              </a:extLst>
-            </p:cNvPr>
-            <p:cNvSpPr/>
-            <p:nvPr/>
-          </p:nvSpPr>
-          <p:spPr>
-            <a:xfrm>
-              <a:off x="3796748" y="1808922"/>
-              <a:ext cx="4601817" cy="4472608"/>
-            </a:xfrm>
-            <a:prstGeom prst="roundRect">
-              <a:avLst/>
-            </a:prstGeom>
+        </p:nvPicPr>
+        <p:blipFill>
+          <a:blip r:embed="rId2"/>
+          <a:stretch>
+            <a:fillRect/>
+          </a:stretch>
+        </p:blipFill>
+        <p:spPr>
+          <a:xfrm>
+            <a:off x="838200" y="2342331"/>
+            <a:ext cx="3442787" cy="4266192"/>
+          </a:xfrm>
+          <a:prstGeom prst="rect">
+            <a:avLst/>
+          </a:prstGeom>
+          <a:ln>
             <a:solidFill>
-              <a:schemeClr val="bg1">
-                <a:lumMod val="95000"/>
-              </a:schemeClr>
+              <a:schemeClr val="tx1"/>
             </a:solidFill>
-          </p:spPr>
-          <p:style>
-            <a:lnRef idx="2">
-              <a:schemeClr val="accent1">
-                <a:shade val="15000"/>
-              </a:schemeClr>
-            </a:lnRef>
-            <a:fillRef idx="1">
-              <a:schemeClr val="accent1"/>
-            </a:fillRef>
-            <a:effectRef idx="0">
-              <a:schemeClr val="accent1"/>
-            </a:effectRef>
-            <a:fontRef idx="minor">
-              <a:schemeClr val="lt1"/>
-            </a:fontRef>
-          </p:style>
-          <p:txBody>
-            <a:bodyPr rtlCol="1" anchor="ctr"/>
-            <a:lstStyle/>
-            <a:p>
-              <a:pPr algn="ctr"/>
-              <a:endParaRPr lang="he-IL"/>
-            </a:p>
-          </p:txBody>
-        </p:sp>
-        <p:sp>
-          <p:nvSpPr>
-            <p:cNvPr id="9" name="מלבן: פינות מעוגלות 8">
-              <a:extLst>
-                <a:ext uri="{FF2B5EF4-FFF2-40B4-BE49-F238E27FC236}">
-                  <a16:creationId xmlns:a16="http://schemas.microsoft.com/office/drawing/2014/main" id="{59DD3E84-3FFA-925B-766F-4DAD3E91C4C2}"/>
-                </a:ext>
-              </a:extLst>
-            </p:cNvPr>
-            <p:cNvSpPr/>
-            <p:nvPr/>
-          </p:nvSpPr>
-          <p:spPr>
-            <a:xfrm>
-              <a:off x="4480891" y="4095991"/>
-              <a:ext cx="3230217" cy="467139"/>
-            </a:xfrm>
-            <a:prstGeom prst="roundRect">
-              <a:avLst/>
-            </a:prstGeom>
-            <a:solidFill>
-              <a:schemeClr val="bg1"/>
-            </a:solidFill>
-            <a:ln>
-              <a:solidFill>
-                <a:schemeClr val="tx1"/>
-              </a:solidFill>
-            </a:ln>
-          </p:spPr>
-          <p:style>
-            <a:lnRef idx="2">
-              <a:schemeClr val="accent1">
-                <a:shade val="15000"/>
-              </a:schemeClr>
-            </a:lnRef>
-            <a:fillRef idx="1">
-              <a:schemeClr val="accent1"/>
-            </a:fillRef>
-            <a:effectRef idx="0">
-              <a:schemeClr val="accent1"/>
-            </a:effectRef>
-            <a:fontRef idx="minor">
-              <a:schemeClr val="lt1"/>
-            </a:fontRef>
-          </p:style>
-          <p:txBody>
-            <a:bodyPr rtlCol="1" anchor="ctr"/>
-            <a:lstStyle/>
-            <a:p>
-              <a:pPr algn="ctr"/>
-              <a:endParaRPr lang="he-IL"/>
-            </a:p>
-          </p:txBody>
-        </p:sp>
-        <p:sp>
-          <p:nvSpPr>
-            <p:cNvPr id="10" name="מלבן: פינות מעוגלות 9">
-              <a:extLst>
-                <a:ext uri="{FF2B5EF4-FFF2-40B4-BE49-F238E27FC236}">
-                  <a16:creationId xmlns:a16="http://schemas.microsoft.com/office/drawing/2014/main" id="{41A52A45-0279-0FC8-B08A-6B1D8B58548F}"/>
-                </a:ext>
-              </a:extLst>
-            </p:cNvPr>
-            <p:cNvSpPr/>
-            <p:nvPr/>
-          </p:nvSpPr>
-          <p:spPr>
-            <a:xfrm>
-              <a:off x="4482548" y="2961861"/>
-              <a:ext cx="3230217" cy="467139"/>
-            </a:xfrm>
-            <a:prstGeom prst="roundRect">
-              <a:avLst/>
-            </a:prstGeom>
-            <a:solidFill>
-              <a:schemeClr val="bg1"/>
-            </a:solidFill>
-            <a:ln>
-              <a:solidFill>
-                <a:schemeClr val="tx1"/>
-              </a:solidFill>
-            </a:ln>
-          </p:spPr>
-          <p:style>
-            <a:lnRef idx="2">
-              <a:schemeClr val="accent1">
-                <a:shade val="15000"/>
-              </a:schemeClr>
-            </a:lnRef>
-            <a:fillRef idx="1">
-              <a:schemeClr val="accent1"/>
-            </a:fillRef>
-            <a:effectRef idx="0">
-              <a:schemeClr val="accent1"/>
-            </a:effectRef>
-            <a:fontRef idx="minor">
-              <a:schemeClr val="lt1"/>
-            </a:fontRef>
-          </p:style>
-          <p:txBody>
-            <a:bodyPr rtlCol="1" anchor="ctr"/>
-            <a:lstStyle/>
-            <a:p>
-              <a:pPr algn="ctr"/>
-              <a:endParaRPr lang="he-IL"/>
-            </a:p>
-          </p:txBody>
-        </p:sp>
-        <p:sp>
-          <p:nvSpPr>
-            <p:cNvPr id="11" name="מלבן 10">
-              <a:extLst>
-                <a:ext uri="{FF2B5EF4-FFF2-40B4-BE49-F238E27FC236}">
-                  <a16:creationId xmlns:a16="http://schemas.microsoft.com/office/drawing/2014/main" id="{92156144-E2BE-38F9-8FD6-D94C73C0001B}"/>
-                </a:ext>
-              </a:extLst>
-            </p:cNvPr>
-            <p:cNvSpPr/>
-            <p:nvPr/>
-          </p:nvSpPr>
-          <p:spPr>
-            <a:xfrm>
-              <a:off x="4372743" y="2432727"/>
-              <a:ext cx="1704314" cy="461665"/>
-            </a:xfrm>
-            <a:prstGeom prst="rect">
-              <a:avLst/>
-            </a:prstGeom>
-            <a:noFill/>
-          </p:spPr>
-          <p:txBody>
-            <a:bodyPr wrap="square" lIns="91440" tIns="45720" rIns="91440" bIns="45720">
-              <a:spAutoFit/>
-            </a:bodyPr>
-            <a:lstStyle/>
-            <a:p>
-              <a:pPr algn="ctr"/>
-              <a:r>
-                <a:rPr lang="en-US" sz="2400" b="0" cap="none" spc="0" dirty="0">
-                  <a:ln w="0"/>
-                  <a:solidFill>
-                    <a:schemeClr val="tx1"/>
-                  </a:solidFill>
-                  <a:effectLst>
-                    <a:outerShdw blurRad="38100" dist="19050" dir="2700000" algn="tl" rotWithShape="0">
-                      <a:schemeClr val="dk1">
-                        <a:alpha val="40000"/>
-                      </a:schemeClr>
-                    </a:outerShdw>
-                  </a:effectLst>
-                </a:rPr>
-                <a:t>Id number : </a:t>
-              </a:r>
-              <a:endParaRPr lang="he-IL" sz="2400" b="0" cap="none" spc="0" dirty="0">
-                <a:ln w="0"/>
-                <a:solidFill>
-                  <a:schemeClr val="tx1"/>
-                </a:solidFill>
-                <a:effectLst>
-                  <a:outerShdw blurRad="38100" dist="19050" dir="2700000" algn="tl" rotWithShape="0">
-                    <a:schemeClr val="dk1">
-                      <a:alpha val="40000"/>
-                    </a:schemeClr>
-                  </a:outerShdw>
-                </a:effectLst>
-              </a:endParaRPr>
-            </a:p>
-          </p:txBody>
-        </p:sp>
-        <p:sp>
-          <p:nvSpPr>
-            <p:cNvPr id="12" name="מלבן 11">
-              <a:extLst>
-                <a:ext uri="{FF2B5EF4-FFF2-40B4-BE49-F238E27FC236}">
-                  <a16:creationId xmlns:a16="http://schemas.microsoft.com/office/drawing/2014/main" id="{84DE8F65-E156-9C6F-E81E-81D1638A964A}"/>
-                </a:ext>
-              </a:extLst>
-            </p:cNvPr>
-            <p:cNvSpPr/>
-            <p:nvPr/>
-          </p:nvSpPr>
-          <p:spPr>
-            <a:xfrm>
-              <a:off x="4424039" y="3594569"/>
-              <a:ext cx="1601721" cy="461665"/>
-            </a:xfrm>
-            <a:prstGeom prst="rect">
-              <a:avLst/>
-            </a:prstGeom>
-            <a:noFill/>
-          </p:spPr>
-          <p:txBody>
-            <a:bodyPr wrap="square" lIns="91440" tIns="45720" rIns="91440" bIns="45720">
-              <a:spAutoFit/>
-            </a:bodyPr>
-            <a:lstStyle/>
-            <a:p>
-              <a:pPr algn="ctr"/>
-              <a:r>
-                <a:rPr lang="en-US" sz="2400" dirty="0">
-                  <a:ln w="0"/>
-                  <a:effectLst>
-                    <a:outerShdw blurRad="38100" dist="19050" dir="2700000" algn="tl" rotWithShape="0">
-                      <a:schemeClr val="dk1">
-                        <a:alpha val="40000"/>
-                      </a:schemeClr>
-                    </a:outerShdw>
-                  </a:effectLst>
-                </a:rPr>
-                <a:t>Password : </a:t>
-              </a:r>
-              <a:endParaRPr lang="he-IL" sz="2400" b="0" cap="none" spc="0" dirty="0">
-                <a:ln w="0"/>
-                <a:solidFill>
-                  <a:schemeClr val="tx1"/>
-                </a:solidFill>
-                <a:effectLst>
-                  <a:outerShdw blurRad="38100" dist="19050" dir="2700000" algn="tl" rotWithShape="0">
-                    <a:schemeClr val="dk1">
-                      <a:alpha val="40000"/>
-                    </a:schemeClr>
-                  </a:outerShdw>
-                </a:effectLst>
-              </a:endParaRPr>
-            </a:p>
-          </p:txBody>
-        </p:sp>
-        <p:sp>
-          <p:nvSpPr>
-            <p:cNvPr id="13" name="מלבן 12">
-              <a:extLst>
-                <a:ext uri="{FF2B5EF4-FFF2-40B4-BE49-F238E27FC236}">
-                  <a16:creationId xmlns:a16="http://schemas.microsoft.com/office/drawing/2014/main" id="{287B42DB-E7CA-7E3E-083E-5DDDF9B55C34}"/>
-                </a:ext>
-              </a:extLst>
-            </p:cNvPr>
-            <p:cNvSpPr/>
-            <p:nvPr/>
-          </p:nvSpPr>
-          <p:spPr>
-            <a:xfrm>
-              <a:off x="5096865" y="3020693"/>
-              <a:ext cx="1215396" cy="369332"/>
-            </a:xfrm>
-            <a:prstGeom prst="rect">
-              <a:avLst/>
-            </a:prstGeom>
-            <a:noFill/>
-          </p:spPr>
-          <p:txBody>
-            <a:bodyPr wrap="square" lIns="91440" tIns="45720" rIns="91440" bIns="45720">
-              <a:spAutoFit/>
-            </a:bodyPr>
-            <a:lstStyle/>
-            <a:p>
-              <a:pPr algn="ctr"/>
-              <a:r>
-                <a:rPr lang="en-US" b="0" cap="none" spc="0" dirty="0">
-                  <a:ln w="0">
-                    <a:solidFill>
-                      <a:schemeClr val="bg1">
-                        <a:lumMod val="50000"/>
-                      </a:schemeClr>
-                    </a:solidFill>
-                  </a:ln>
-                  <a:solidFill>
-                    <a:schemeClr val="bg1">
-                      <a:lumMod val="50000"/>
-                    </a:schemeClr>
-                  </a:solidFill>
-                  <a:effectLst>
-                    <a:outerShdw blurRad="38100" dist="19050" dir="2700000" algn="tl" rotWithShape="0">
-                      <a:schemeClr val="dk1">
-                        <a:alpha val="40000"/>
-                      </a:schemeClr>
-                    </a:outerShdw>
-                  </a:effectLst>
-                </a:rPr>
-                <a:t>Id number </a:t>
-              </a:r>
-              <a:endParaRPr lang="he-IL" b="0" cap="none" spc="0" dirty="0">
-                <a:ln w="0">
-                  <a:solidFill>
-                    <a:schemeClr val="bg1">
-                      <a:lumMod val="50000"/>
-                    </a:schemeClr>
-                  </a:solidFill>
-                </a:ln>
-                <a:solidFill>
-                  <a:schemeClr val="bg1">
-                    <a:lumMod val="50000"/>
-                  </a:schemeClr>
-                </a:solidFill>
-                <a:effectLst>
-                  <a:outerShdw blurRad="38100" dist="19050" dir="2700000" algn="tl" rotWithShape="0">
-                    <a:schemeClr val="dk1">
-                      <a:alpha val="40000"/>
-                    </a:schemeClr>
-                  </a:outerShdw>
-                </a:effectLst>
-              </a:endParaRPr>
-            </a:p>
-          </p:txBody>
-        </p:sp>
-        <p:sp>
-          <p:nvSpPr>
-            <p:cNvPr id="14" name="מלבן 13">
-              <a:extLst>
-                <a:ext uri="{FF2B5EF4-FFF2-40B4-BE49-F238E27FC236}">
-                  <a16:creationId xmlns:a16="http://schemas.microsoft.com/office/drawing/2014/main" id="{4E4123DE-2C9C-C05C-C7A1-8FB7B30E12DC}"/>
-                </a:ext>
-              </a:extLst>
-            </p:cNvPr>
-            <p:cNvSpPr/>
-            <p:nvPr/>
-          </p:nvSpPr>
-          <p:spPr>
-            <a:xfrm>
-              <a:off x="5096865" y="4081477"/>
-              <a:ext cx="1151277" cy="461665"/>
-            </a:xfrm>
-            <a:prstGeom prst="rect">
-              <a:avLst/>
-            </a:prstGeom>
-            <a:noFill/>
-          </p:spPr>
-          <p:txBody>
-            <a:bodyPr wrap="square" lIns="91440" tIns="45720" rIns="91440" bIns="45720">
-              <a:spAutoFit/>
-            </a:bodyPr>
-            <a:lstStyle/>
-            <a:p>
-              <a:pPr algn="ctr"/>
-              <a:r>
-                <a:rPr lang="en-US" dirty="0">
-                  <a:ln w="0">
-                    <a:solidFill>
-                      <a:schemeClr val="bg1">
-                        <a:lumMod val="50000"/>
-                      </a:schemeClr>
-                    </a:solidFill>
-                  </a:ln>
-                  <a:solidFill>
-                    <a:schemeClr val="bg1">
-                      <a:lumMod val="50000"/>
-                    </a:schemeClr>
-                  </a:solidFill>
-                  <a:effectLst>
-                    <a:outerShdw blurRad="38100" dist="19050" dir="2700000" algn="tl" rotWithShape="0">
-                      <a:schemeClr val="dk1">
-                        <a:alpha val="40000"/>
-                      </a:schemeClr>
-                    </a:outerShdw>
-                  </a:effectLst>
-                </a:rPr>
-                <a:t>Password</a:t>
-              </a:r>
-              <a:r>
-                <a:rPr lang="en-US" sz="2400" dirty="0">
-                  <a:ln w="0"/>
-                  <a:effectLst>
-                    <a:outerShdw blurRad="38100" dist="19050" dir="2700000" algn="tl" rotWithShape="0">
-                      <a:schemeClr val="dk1">
-                        <a:alpha val="40000"/>
-                      </a:schemeClr>
-                    </a:outerShdw>
-                  </a:effectLst>
-                </a:rPr>
-                <a:t> </a:t>
-              </a:r>
-              <a:endParaRPr lang="he-IL" sz="2400" b="0" cap="none" spc="0" dirty="0">
-                <a:ln w="0"/>
-                <a:solidFill>
-                  <a:schemeClr val="tx1"/>
-                </a:solidFill>
-                <a:effectLst>
-                  <a:outerShdw blurRad="38100" dist="19050" dir="2700000" algn="tl" rotWithShape="0">
-                    <a:schemeClr val="dk1">
-                      <a:alpha val="40000"/>
-                    </a:schemeClr>
-                  </a:outerShdw>
-                </a:effectLst>
-              </a:endParaRPr>
-            </a:p>
-          </p:txBody>
-        </p:sp>
-        <p:pic>
-          <p:nvPicPr>
-            <p:cNvPr id="15" name="גרפיקה 14" descr="נעל">
-              <a:extLst>
-                <a:ext uri="{FF2B5EF4-FFF2-40B4-BE49-F238E27FC236}">
-                  <a16:creationId xmlns:a16="http://schemas.microsoft.com/office/drawing/2014/main" id="{271FA38C-3092-F4E1-9777-F5823CD33443}"/>
-                </a:ext>
-              </a:extLst>
-            </p:cNvPr>
-            <p:cNvPicPr>
-              <a:picLocks noChangeAspect="1"/>
-            </p:cNvPicPr>
-            <p:nvPr/>
-          </p:nvPicPr>
-          <p:blipFill>
-            <a:blip r:embed="rId2">
-              <a:extLst>
-                <a:ext uri="{96DAC541-7B7A-43D3-8B79-37D633B846F1}">
-                  <asvg:svgBlip xmlns:asvg="http://schemas.microsoft.com/office/drawing/2016/SVG/main" r:embed="rId3"/>
-                </a:ext>
-              </a:extLst>
-            </a:blip>
-            <a:stretch>
-              <a:fillRect/>
-            </a:stretch>
-          </p:blipFill>
-          <p:spPr>
-            <a:xfrm>
-              <a:off x="4561397" y="4129177"/>
-              <a:ext cx="417345" cy="417345"/>
-            </a:xfrm>
-            <a:prstGeom prst="rect">
-              <a:avLst/>
-            </a:prstGeom>
-          </p:spPr>
-        </p:pic>
-        <p:pic>
-          <p:nvPicPr>
-            <p:cNvPr id="16" name="גרפיקה 15" descr="משתמש">
-              <a:extLst>
-                <a:ext uri="{FF2B5EF4-FFF2-40B4-BE49-F238E27FC236}">
-                  <a16:creationId xmlns:a16="http://schemas.microsoft.com/office/drawing/2014/main" id="{D37AE115-FD33-FF86-FD71-73944EE841B2}"/>
-                </a:ext>
-              </a:extLst>
-            </p:cNvPr>
-            <p:cNvPicPr>
-              <a:picLocks noChangeAspect="1"/>
-            </p:cNvPicPr>
-            <p:nvPr/>
-          </p:nvPicPr>
-          <p:blipFill>
-            <a:blip r:embed="rId4">
-              <a:extLst>
-                <a:ext uri="{96DAC541-7B7A-43D3-8B79-37D633B846F1}">
-                  <asvg:svgBlip xmlns:asvg="http://schemas.microsoft.com/office/drawing/2016/SVG/main" r:embed="rId5"/>
-                </a:ext>
-              </a:extLst>
-            </a:blip>
-            <a:stretch>
-              <a:fillRect/>
-            </a:stretch>
-          </p:blipFill>
-          <p:spPr>
-            <a:xfrm>
-              <a:off x="4568328" y="2989557"/>
-              <a:ext cx="450435" cy="450435"/>
-            </a:xfrm>
-            <a:prstGeom prst="rect">
-              <a:avLst/>
-            </a:prstGeom>
-          </p:spPr>
-        </p:pic>
-        <p:sp>
-          <p:nvSpPr>
-            <p:cNvPr id="17" name="מלבן 16">
-              <a:extLst>
-                <a:ext uri="{FF2B5EF4-FFF2-40B4-BE49-F238E27FC236}">
-                  <a16:creationId xmlns:a16="http://schemas.microsoft.com/office/drawing/2014/main" id="{F58667DD-2279-0F29-C564-55EDE01D4F44}"/>
-                </a:ext>
-              </a:extLst>
-            </p:cNvPr>
-            <p:cNvSpPr/>
-            <p:nvPr/>
-          </p:nvSpPr>
-          <p:spPr>
-            <a:xfrm>
-              <a:off x="4702534" y="4857874"/>
-              <a:ext cx="1542410" cy="307777"/>
-            </a:xfrm>
-            <a:prstGeom prst="rect">
-              <a:avLst/>
-            </a:prstGeom>
-            <a:noFill/>
-          </p:spPr>
-          <p:txBody>
-            <a:bodyPr wrap="square" lIns="91440" tIns="45720" rIns="91440" bIns="45720">
-              <a:spAutoFit/>
-            </a:bodyPr>
-            <a:lstStyle/>
-            <a:p>
-              <a:pPr algn="ctr"/>
-              <a:r>
-                <a:rPr lang="en-US" sz="1400" dirty="0">
-                  <a:ln w="0"/>
-                  <a:effectLst>
-                    <a:outerShdw blurRad="38100" dist="19050" dir="2700000" algn="tl" rotWithShape="0">
-                      <a:schemeClr val="dk1">
-                        <a:alpha val="40000"/>
-                      </a:schemeClr>
-                    </a:outerShdw>
-                  </a:effectLst>
-                </a:rPr>
-                <a:t>Remember me</a:t>
-              </a:r>
-              <a:r>
-                <a:rPr lang="en-US" sz="1400" b="0" cap="none" spc="0" dirty="0">
-                  <a:ln w="0"/>
-                  <a:solidFill>
-                    <a:schemeClr val="tx1"/>
-                  </a:solidFill>
-                  <a:effectLst>
-                    <a:outerShdw blurRad="38100" dist="19050" dir="2700000" algn="tl" rotWithShape="0">
-                      <a:schemeClr val="dk1">
-                        <a:alpha val="40000"/>
-                      </a:schemeClr>
-                    </a:outerShdw>
-                  </a:effectLst>
-                </a:rPr>
-                <a:t> </a:t>
-              </a:r>
-              <a:endParaRPr lang="he-IL" sz="1400" b="0" cap="none" spc="0" dirty="0">
-                <a:ln w="0"/>
-                <a:solidFill>
-                  <a:schemeClr val="tx1"/>
-                </a:solidFill>
-                <a:effectLst>
-                  <a:outerShdw blurRad="38100" dist="19050" dir="2700000" algn="tl" rotWithShape="0">
-                    <a:schemeClr val="dk1">
-                      <a:alpha val="40000"/>
-                    </a:schemeClr>
-                  </a:outerShdw>
-                </a:effectLst>
-              </a:endParaRPr>
-            </a:p>
-          </p:txBody>
-        </p:sp>
-        <p:sp>
-          <p:nvSpPr>
-            <p:cNvPr id="18" name="מלבן 17">
-              <a:extLst>
-                <a:ext uri="{FF2B5EF4-FFF2-40B4-BE49-F238E27FC236}">
-                  <a16:creationId xmlns:a16="http://schemas.microsoft.com/office/drawing/2014/main" id="{35B3B3F0-E750-9F0D-3B7E-832BB624CAC8}"/>
-                </a:ext>
-              </a:extLst>
-            </p:cNvPr>
-            <p:cNvSpPr/>
-            <p:nvPr/>
-          </p:nvSpPr>
-          <p:spPr>
-            <a:xfrm>
-              <a:off x="6351190" y="4857874"/>
-              <a:ext cx="1773242" cy="307777"/>
-            </a:xfrm>
-            <a:prstGeom prst="rect">
-              <a:avLst/>
-            </a:prstGeom>
-            <a:noFill/>
-          </p:spPr>
-          <p:txBody>
-            <a:bodyPr wrap="square" lIns="91440" tIns="45720" rIns="91440" bIns="45720">
-              <a:spAutoFit/>
-            </a:bodyPr>
-            <a:lstStyle/>
-            <a:p>
-              <a:pPr algn="ctr"/>
-              <a:r>
-                <a:rPr lang="en-US" sz="1400" dirty="0">
-                  <a:ln w="0">
-                    <a:solidFill>
-                      <a:srgbClr val="0070C0"/>
-                    </a:solidFill>
-                  </a:ln>
-                  <a:solidFill>
-                    <a:srgbClr val="0070C0"/>
-                  </a:solidFill>
-                  <a:effectLst>
-                    <a:outerShdw blurRad="38100" dist="19050" dir="2700000" algn="tl" rotWithShape="0">
-                      <a:schemeClr val="dk1">
-                        <a:alpha val="40000"/>
-                      </a:schemeClr>
-                    </a:outerShdw>
-                  </a:effectLst>
-                </a:rPr>
-                <a:t>Forgot password?</a:t>
-              </a:r>
-              <a:r>
-                <a:rPr lang="en-US" sz="1400" b="0" cap="none" spc="0" dirty="0">
-                  <a:ln w="0">
-                    <a:solidFill>
-                      <a:srgbClr val="0070C0"/>
-                    </a:solidFill>
-                  </a:ln>
-                  <a:solidFill>
-                    <a:srgbClr val="0070C0"/>
-                  </a:solidFill>
-                  <a:effectLst>
-                    <a:outerShdw blurRad="38100" dist="19050" dir="2700000" algn="tl" rotWithShape="0">
-                      <a:schemeClr val="dk1">
-                        <a:alpha val="40000"/>
-                      </a:schemeClr>
-                    </a:outerShdw>
-                  </a:effectLst>
-                </a:rPr>
-                <a:t> </a:t>
-              </a:r>
-              <a:endParaRPr lang="he-IL" sz="1400" b="0" cap="none" spc="0" dirty="0">
-                <a:ln w="0">
-                  <a:solidFill>
-                    <a:srgbClr val="0070C0"/>
-                  </a:solidFill>
-                </a:ln>
-                <a:solidFill>
-                  <a:srgbClr val="0070C0"/>
-                </a:solidFill>
-                <a:effectLst>
-                  <a:outerShdw blurRad="38100" dist="19050" dir="2700000" algn="tl" rotWithShape="0">
-                    <a:schemeClr val="dk1">
-                      <a:alpha val="40000"/>
-                    </a:schemeClr>
-                  </a:outerShdw>
-                </a:effectLst>
-              </a:endParaRPr>
-            </a:p>
-          </p:txBody>
-        </p:sp>
-        <p:sp>
-          <p:nvSpPr>
-            <p:cNvPr id="19" name="מלבן 18">
-              <a:extLst>
-                <a:ext uri="{FF2B5EF4-FFF2-40B4-BE49-F238E27FC236}">
-                  <a16:creationId xmlns:a16="http://schemas.microsoft.com/office/drawing/2014/main" id="{0BE9E992-E17E-D2CB-E708-20630EF387E9}"/>
-                </a:ext>
-              </a:extLst>
-            </p:cNvPr>
-            <p:cNvSpPr/>
-            <p:nvPr/>
-          </p:nvSpPr>
-          <p:spPr>
-            <a:xfrm>
-              <a:off x="4568328" y="4949688"/>
-              <a:ext cx="134206" cy="129208"/>
-            </a:xfrm>
-            <a:prstGeom prst="rect">
-              <a:avLst/>
-            </a:prstGeom>
-            <a:solidFill>
-              <a:schemeClr val="bg1"/>
-            </a:solidFill>
-            <a:ln>
-              <a:solidFill>
-                <a:schemeClr val="tx1"/>
-              </a:solidFill>
-            </a:ln>
-          </p:spPr>
-          <p:style>
-            <a:lnRef idx="2">
-              <a:schemeClr val="accent1">
-                <a:shade val="15000"/>
-              </a:schemeClr>
-            </a:lnRef>
-            <a:fillRef idx="1">
-              <a:schemeClr val="accent1"/>
-            </a:fillRef>
-            <a:effectRef idx="0">
-              <a:schemeClr val="accent1"/>
-            </a:effectRef>
-            <a:fontRef idx="minor">
-              <a:schemeClr val="lt1"/>
-            </a:fontRef>
-          </p:style>
-          <p:txBody>
-            <a:bodyPr rtlCol="1" anchor="ctr"/>
-            <a:lstStyle/>
-            <a:p>
-              <a:pPr algn="ctr"/>
-              <a:endParaRPr lang="he-IL"/>
-            </a:p>
-          </p:txBody>
-        </p:sp>
-      </p:grpSp>
+          </a:ln>
+        </p:spPr>
+      </p:pic>
     </p:spTree>
     <p:extLst>
       <p:ext uri="{BB962C8B-B14F-4D97-AF65-F5344CB8AC3E}">
@@ -7975,7 +7559,7 @@
           <p:cNvPr id="2" name="כותרת 1">
             <a:extLst>
               <a:ext uri="{FF2B5EF4-FFF2-40B4-BE49-F238E27FC236}">
-                <a16:creationId xmlns:a16="http://schemas.microsoft.com/office/drawing/2014/main" id="{DFEBFD5E-D34E-4140-55D6-C0398AD819F3}"/>
+                <a16:creationId xmlns:a16="http://schemas.microsoft.com/office/drawing/2014/main" id="{C6686C1B-2F4F-4FDA-8E1B-C0578345E128}"/>
               </a:ext>
             </a:extLst>
           </p:cNvPr>
@@ -7993,7 +7577,7 @@
           <a:p>
             <a:r>
               <a:rPr lang="he-IL" dirty="0"/>
-              <a:t>כניסת מורות – בשלב ראשוני רק מחנכות</a:t>
+              <a:t>כניסת מורות – כללי </a:t>
             </a:r>
           </a:p>
         </p:txBody>
@@ -8003,7 +7587,7 @@
           <p:cNvPr id="3" name="מציין מיקום תוכן 2">
             <a:extLst>
               <a:ext uri="{FF2B5EF4-FFF2-40B4-BE49-F238E27FC236}">
-                <a16:creationId xmlns:a16="http://schemas.microsoft.com/office/drawing/2014/main" id="{3BEC4C64-A6E0-BCEB-46B2-CE05A2A5A3B1}"/>
+                <a16:creationId xmlns:a16="http://schemas.microsoft.com/office/drawing/2014/main" id="{CF60D022-79EB-59D2-1B3A-15725DAD0FA3}"/>
               </a:ext>
             </a:extLst>
           </p:cNvPr>
@@ -8016,32 +7600,39 @@
         </p:nvSpPr>
         <p:spPr/>
         <p:txBody>
-          <a:bodyPr/>
+          <a:bodyPr>
+            <a:normAutofit/>
+          </a:bodyPr>
           <a:lstStyle/>
           <a:p>
             <a:r>
               <a:rPr lang="he-IL" dirty="0"/>
-              <a:t>צפיה בכל התלמידות של המורה.</a:t>
-            </a:r>
-          </a:p>
-          <a:p>
-            <a:r>
-              <a:rPr lang="he-IL" dirty="0"/>
-              <a:t>ניתן לראות שם תלמידה, מס' נקודות ומס' שוברים שבועי, ניתן להכניס נתונים של השבוע הנוכחי בלבד (כמות נקודות והאם ניתן שובר), לצורך עדכון מהיר.</a:t>
-            </a:r>
-          </a:p>
-          <a:p>
-            <a:r>
-              <a:rPr lang="he-IL" dirty="0"/>
-              <a:t>בלחיצה על תלמידה מגיעים לכרטיס האישי שלה.</a:t>
-            </a:r>
+              <a:t>שם מורה, תאריך עברי ולועזי, מספר התלמידות בכיתה</a:t>
+            </a:r>
+          </a:p>
+          <a:p>
+            <a:pPr lvl="2"/>
+            <a:endParaRPr lang="he-IL" dirty="0"/>
+          </a:p>
+          <a:p>
+            <a:pPr lvl="1"/>
+            <a:endParaRPr lang="he-IL" dirty="0"/>
+          </a:p>
+          <a:p>
+            <a:endParaRPr lang="he-IL" b="1" dirty="0"/>
+          </a:p>
+          <a:p>
+            <a:endParaRPr lang="he-IL" dirty="0"/>
+          </a:p>
+          <a:p>
+            <a:endParaRPr lang="he-IL" dirty="0"/>
           </a:p>
         </p:txBody>
       </p:sp>
     </p:spTree>
     <p:extLst>
       <p:ext uri="{BB962C8B-B14F-4D97-AF65-F5344CB8AC3E}">
-        <p14:creationId xmlns:p14="http://schemas.microsoft.com/office/powerpoint/2010/main" val="459599735"/>
+        <p14:creationId xmlns:p14="http://schemas.microsoft.com/office/powerpoint/2010/main" val="3734914431"/>
       </p:ext>
     </p:extLst>
   </p:cSld>
@@ -8073,7 +7664,7 @@
           <p:cNvPr id="2" name="כותרת 1">
             <a:extLst>
               <a:ext uri="{FF2B5EF4-FFF2-40B4-BE49-F238E27FC236}">
-                <a16:creationId xmlns:a16="http://schemas.microsoft.com/office/drawing/2014/main" id="{80D6FB60-312D-2125-529B-E2F6705703B6}"/>
+                <a16:creationId xmlns:a16="http://schemas.microsoft.com/office/drawing/2014/main" id="{700FC5B3-172F-4084-C4C5-C3170D63D49D}"/>
               </a:ext>
             </a:extLst>
           </p:cNvPr>
@@ -8091,7 +7682,7 @@
           <a:p>
             <a:r>
               <a:rPr lang="he-IL" dirty="0"/>
-              <a:t>מסך פרופיל תלמידה</a:t>
+              <a:t>כניסת מורות – מצב תלמידות + היסטוריה </a:t>
             </a:r>
           </a:p>
         </p:txBody>
@@ -8101,7 +7692,7 @@
           <p:cNvPr id="3" name="מציין מיקום תוכן 2">
             <a:extLst>
               <a:ext uri="{FF2B5EF4-FFF2-40B4-BE49-F238E27FC236}">
-                <a16:creationId xmlns:a16="http://schemas.microsoft.com/office/drawing/2014/main" id="{6CF1FEE2-0CB2-AE9F-C083-DE1DC56A5000}"/>
+                <a16:creationId xmlns:a16="http://schemas.microsoft.com/office/drawing/2014/main" id="{CDA6175F-99B4-E367-1A00-8E57650930EE}"/>
               </a:ext>
             </a:extLst>
           </p:cNvPr>
@@ -8115,91 +7706,60 @@
         <p:spPr/>
         <p:txBody>
           <a:bodyPr>
-            <a:normAutofit fontScale="77500" lnSpcReduction="20000"/>
+            <a:normAutofit/>
           </a:bodyPr>
           <a:lstStyle/>
           <a:p>
             <a:r>
               <a:rPr lang="he-IL" dirty="0"/>
-              <a:t>פרטי התלמידה בגדול (שם, </a:t>
+              <a:t>מספר תלמידות עם הצטיינות שבועית (בלחיצה על זה יראו מי התלמידות עם ההצטיינות השבועית)</a:t>
             </a:r>
           </a:p>
           <a:p>
             <a:r>
               <a:rPr lang="he-IL" dirty="0"/>
-              <a:t>סרגל סינונים לפי תקופות (שבועי, תקופתי, שנתי)</a:t>
+              <a:t>כפתור היסטוריה ששם ניתן לצפות בנתוני שבועות קודמים לפי השבועות </a:t>
+            </a:r>
+          </a:p>
+          <a:p>
+            <a:r>
+              <a:rPr lang="he-IL" dirty="0" err="1"/>
+              <a:t>טאבים</a:t>
+            </a:r>
+            <a:r>
+              <a:rPr lang="he-IL" dirty="0"/>
+              <a:t> של תלמידות מחולקים לפי ימי השבוע </a:t>
             </a:r>
           </a:p>
           <a:p>
             <a:pPr lvl="1"/>
             <a:r>
               <a:rPr lang="he-IL" dirty="0"/>
-              <a:t>שבועי – ניתן לראות את מספר הנקודות של השבוע, האם היא קיבלה שובר, והאם היא מקבלת תעודת הצטיינות – רק כשנמצאים בסוף תקופת ההצטיינות ואפשרות לעריכת פרטים אלו </a:t>
+              <a:t>בלחיצה ניתן להכניס נתונים – הודעת פופ אפ מחולקת לשיעורים ושם מכניסים את מספר הנקודות בשיעור </a:t>
             </a:r>
           </a:p>
           <a:p>
             <a:pPr lvl="1"/>
             <a:r>
               <a:rPr lang="he-IL" dirty="0"/>
-              <a:t>תקופתי – ניתן לראות מחולק על פי שבועות בדיוק מה קרה כמה נקודות צברה כל שבוע וכמה שוברים ניתן לראות גם בצורה ויזואלית ע"י מסלול את כמות השוברים וכמה נשאר כדי לקבל תעודת הצטיינות </a:t>
-            </a:r>
-          </a:p>
-          <a:p>
-            <a:pPr lvl="1"/>
+              <a:t> כפתור "הצטיינות שבועית" (מתחת כל תלמידה) – ניתן לעריכה רק מיום שישי בבוקר עד יום ראשון בשעה 08:30 – הודעת פופ אפ האם התלמידה מצטיינת שבוע </a:t>
+            </a:r>
+          </a:p>
+          <a:p>
+            <a:pPr lvl="2"/>
             <a:r>
               <a:rPr lang="he-IL" dirty="0"/>
-              <a:t>שנתי – מסלול המציג את כמות התעודות שהתלמידה צברה</a:t>
-            </a:r>
-          </a:p>
-          <a:p>
+              <a:t>אם כן: מקבלת אוטומטית שובר (או 2 – לכיתות המסוימות) – יהיה ניתן לערוך מספר שוברים ותעודת הצטיינות שבועית </a:t>
+            </a:r>
+          </a:p>
+          <a:p>
+            <a:pPr lvl="2"/>
             <a:r>
               <a:rPr lang="he-IL" dirty="0"/>
-              <a:t>אפשרות </a:t>
-            </a:r>
-            <a:r>
-              <a:rPr lang="he-IL" dirty="0" err="1"/>
-              <a:t>לצפיה</a:t>
-            </a:r>
-            <a:r>
-              <a:rPr lang="he-IL" dirty="0"/>
-              <a:t> בכל ההערות/הארות שהמורה נתנה לתלמידה והוספת הערה חדשה </a:t>
-            </a:r>
-          </a:p>
-          <a:p>
-            <a:r>
-              <a:rPr lang="he-IL" dirty="0"/>
-              <a:t>צפיה בסף הכיתה לצורך קבלת שובר שבועי ואפשרות לשינוי הסף – (האם הסף הוא משהו קבוע שקובעים בתחילת שנה ואז יש צורך לציין את זה למורה כדי שתבדוק מי הן התלמידות שמגיע להן שובר (יש חריגות) או שהסף נקבע כל שבוע מחדש לפי רמת הכיתה באותו שבוע ע"י המורה ואז אין צורך לציין את הסף אלא המורה מחליטה למי מגיע שובר ולמי לא </a:t>
-            </a:r>
-          </a:p>
-          <a:p>
-            <a:r>
-              <a:rPr lang="he-IL" dirty="0"/>
-              <a:t>בהמשך ניתוח גרפי התנהגות תלמידה לפי שבוע, תקופתי, שנתי וכו' </a:t>
-            </a:r>
-          </a:p>
-          <a:p>
-            <a:r>
-              <a:rPr lang="he-IL" dirty="0"/>
-              <a:t>כפתור היסטוריה וניתן לראות כל שבוע בדיוק כמה נקודות ניתנו האם ניתן שובר האם ניתן תעודת הצטיינות והערות והארות שנכתבו</a:t>
-            </a:r>
-          </a:p>
-          <a:p>
-            <a:endParaRPr lang="he-IL" dirty="0"/>
-          </a:p>
-          <a:p>
-            <a:endParaRPr lang="he-IL" dirty="0"/>
-          </a:p>
-          <a:p>
-            <a:endParaRPr lang="he-IL" dirty="0"/>
-          </a:p>
-          <a:p>
-            <a:pPr lvl="1"/>
-            <a:endParaRPr lang="he-IL" dirty="0"/>
-          </a:p>
-          <a:p>
-            <a:pPr marL="0" indent="0">
-              <a:buNone/>
-            </a:pPr>
+              <a:t>אם לא : ניתן להחליט האם יש שובר וכמה או האם יש תעודת הצטיינות שבועית </a:t>
+            </a:r>
+          </a:p>
+          <a:p>
             <a:endParaRPr lang="he-IL" dirty="0"/>
           </a:p>
         </p:txBody>
@@ -8207,7 +7767,7 @@
     </p:spTree>
     <p:extLst>
       <p:ext uri="{BB962C8B-B14F-4D97-AF65-F5344CB8AC3E}">
-        <p14:creationId xmlns:p14="http://schemas.microsoft.com/office/powerpoint/2010/main" val="4026757981"/>
+        <p14:creationId xmlns:p14="http://schemas.microsoft.com/office/powerpoint/2010/main" val="3017415310"/>
       </p:ext>
     </p:extLst>
   </p:cSld>
@@ -8239,7 +7799,7 @@
           <p:cNvPr id="2" name="כותרת 1">
             <a:extLst>
               <a:ext uri="{FF2B5EF4-FFF2-40B4-BE49-F238E27FC236}">
-                <a16:creationId xmlns:a16="http://schemas.microsoft.com/office/drawing/2014/main" id="{89A99409-B62F-F01A-E367-EA12225A1331}"/>
+                <a16:creationId xmlns:a16="http://schemas.microsoft.com/office/drawing/2014/main" id="{5C7F3606-546D-0CBC-2B65-D64EB4DC26E4}"/>
               </a:ext>
             </a:extLst>
           </p:cNvPr>
@@ -8257,7 +7817,7 @@
           <a:p>
             <a:r>
               <a:rPr lang="he-IL" dirty="0"/>
-              <a:t>כניסת מנהלת אתר – צוות ניהולי </a:t>
+              <a:t>כניסת מורות – גרפים </a:t>
             </a:r>
           </a:p>
         </p:txBody>
@@ -8267,7 +7827,7 @@
           <p:cNvPr id="3" name="מציין מיקום תוכן 2">
             <a:extLst>
               <a:ext uri="{FF2B5EF4-FFF2-40B4-BE49-F238E27FC236}">
-                <a16:creationId xmlns:a16="http://schemas.microsoft.com/office/drawing/2014/main" id="{60325346-9797-A151-A805-E4B6F8D7BBAB}"/>
+                <a16:creationId xmlns:a16="http://schemas.microsoft.com/office/drawing/2014/main" id="{E1054ADD-64EA-20BC-5BBE-E9B05C50FE65}"/>
               </a:ext>
             </a:extLst>
           </p:cNvPr>
@@ -8280,26 +7840,81 @@
         </p:nvSpPr>
         <p:spPr/>
         <p:txBody>
-          <a:bodyPr/>
+          <a:bodyPr>
+            <a:normAutofit fontScale="92500"/>
+          </a:bodyPr>
           <a:lstStyle/>
           <a:p>
             <a:r>
               <a:rPr lang="he-IL" dirty="0"/>
-              <a:t>יתבצע בשלב עתידי </a:t>
+              <a:t>גרפים של כל תלמידה (שם תלמידה מעל כל גרף)</a:t>
             </a:r>
           </a:p>
           <a:p>
             <a:r>
               <a:rPr lang="he-IL" dirty="0"/>
-              <a:t>הוקמה תשתית לפיתוח עתידני </a:t>
-            </a:r>
+              <a:t>בלחיצה על גרף ניתן יהיה לראות אותו בגדול </a:t>
+            </a:r>
+          </a:p>
+          <a:p>
+            <a:r>
+              <a:rPr lang="he-IL" dirty="0"/>
+              <a:t>לכל תלמידה שני גרפים :</a:t>
+            </a:r>
+          </a:p>
+          <a:p>
+            <a:pPr lvl="1"/>
+            <a:r>
+              <a:rPr lang="he-IL" dirty="0"/>
+              <a:t>גרף עוגה – אחוזים של השבועות שהצטיינתי מתוך השבועות עד כה </a:t>
+            </a:r>
+          </a:p>
+          <a:p>
+            <a:pPr lvl="1"/>
+            <a:r>
+              <a:rPr lang="he-IL" dirty="0"/>
+              <a:t>גרף עמודות – מספר הנקודות שצברתי בכל שבוע עד כה, עם ציון של סף הכיתה או התלמידה בגרף</a:t>
+            </a:r>
+          </a:p>
+          <a:p>
+            <a:r>
+              <a:rPr lang="he-IL" dirty="0"/>
+              <a:t>גרפים של כיתה </a:t>
+            </a:r>
+          </a:p>
+          <a:p>
+            <a:pPr lvl="1"/>
+            <a:r>
+              <a:rPr lang="he-IL" dirty="0"/>
+              <a:t>גרף עם פונקציות של כל התלמידות בכיתה - מספר הנקודות שהן צברו בכל שבוע, עם סף הכיתה להבין במוחש מי התלמידות מתחת הסף משמעותי ומי מעל הסף משמעותית </a:t>
+            </a:r>
+          </a:p>
+          <a:p>
+            <a:pPr lvl="1"/>
+            <a:r>
+              <a:rPr lang="he-IL" dirty="0"/>
+              <a:t>גרף עוגה – הצטיינות שבועית של התלמידות בכיתה ביחס להצטיינות המקסימלית עד כה של כל הבנות בכיתה </a:t>
+            </a:r>
+          </a:p>
+          <a:p>
+            <a:pPr lvl="1"/>
+            <a:endParaRPr lang="he-IL" dirty="0"/>
+          </a:p>
+          <a:p>
+            <a:pPr marL="0" indent="0">
+              <a:buNone/>
+            </a:pPr>
+            <a:endParaRPr lang="he-IL" dirty="0"/>
+          </a:p>
+          <a:p>
+            <a:endParaRPr lang="he-IL" dirty="0"/>
           </a:p>
         </p:txBody>
       </p:sp>
     </p:spTree>
     <p:extLst>
       <p:ext uri="{BB962C8B-B14F-4D97-AF65-F5344CB8AC3E}">
-        <p14:creationId xmlns:p14="http://schemas.microsoft.com/office/powerpoint/2010/main" val="3570078872"/>
+        <p14:creationId xmlns:p14="http://schemas.microsoft.com/office/powerpoint/2010/main" val="2217430307"/>
       </p:ext>
     </p:extLst>
   </p:cSld>
@@ -8331,7 +7946,7 @@
           <p:cNvPr id="2" name="כותרת 1">
             <a:extLst>
               <a:ext uri="{FF2B5EF4-FFF2-40B4-BE49-F238E27FC236}">
-                <a16:creationId xmlns:a16="http://schemas.microsoft.com/office/drawing/2014/main" id="{FB8C7D03-B858-92EF-B427-41B9AF920CCE}"/>
+                <a16:creationId xmlns:a16="http://schemas.microsoft.com/office/drawing/2014/main" id="{1D29A857-F1D3-BA1C-0C82-DE7C00C73564}"/>
               </a:ext>
             </a:extLst>
           </p:cNvPr>
@@ -8349,7 +7964,7 @@
           <a:p>
             <a:r>
               <a:rPr lang="he-IL" dirty="0"/>
-              <a:t>כניסת תלמידות – מסך מצב אישי</a:t>
+              <a:t>כניסת מורות – הודעות </a:t>
             </a:r>
           </a:p>
         </p:txBody>
@@ -8359,7 +7974,7 @@
           <p:cNvPr id="3" name="מציין מיקום תוכן 2">
             <a:extLst>
               <a:ext uri="{FF2B5EF4-FFF2-40B4-BE49-F238E27FC236}">
-                <a16:creationId xmlns:a16="http://schemas.microsoft.com/office/drawing/2014/main" id="{5247E59C-293D-6310-2988-8E2F632D9F09}"/>
+                <a16:creationId xmlns:a16="http://schemas.microsoft.com/office/drawing/2014/main" id="{725C3501-B0A0-187D-608E-17941A9DCA64}"/>
               </a:ext>
             </a:extLst>
           </p:cNvPr>
@@ -8377,53 +7992,35 @@
           <a:p>
             <a:r>
               <a:rPr lang="he-IL" dirty="0"/>
-              <a:t>צפיה במצב האישי של התלמידה ( בהמשך מצב התקדמות גרפים וכו')</a:t>
-            </a:r>
-          </a:p>
-          <a:p>
+              <a:t>לכל כרטיסיית תלמידה יש 2 מצבים מצב עריכת נקודות ומצב הודעות :</a:t>
+            </a:r>
+          </a:p>
+          <a:p>
+            <a:pPr lvl="1"/>
             <a:r>
               <a:rPr lang="he-IL" dirty="0"/>
-              <a:t>צפיה במספר הנקודות, השוברים והבועה </a:t>
-            </a:r>
-          </a:p>
-          <a:p>
+              <a:t>אפשרות להוספת הודעה חדשה בפופ אפ </a:t>
+            </a:r>
+          </a:p>
+          <a:p>
+            <a:pPr lvl="1"/>
             <a:r>
               <a:rPr lang="he-IL" dirty="0"/>
-              <a:t>צפיה בהארות שהמורות כתבו</a:t>
-            </a:r>
-          </a:p>
-          <a:p>
-            <a:r>
-              <a:rPr lang="he-IL" dirty="0"/>
-              <a:t>כפתור מעבר לקיוסק </a:t>
-            </a:r>
-          </a:p>
-          <a:p>
-            <a:r>
-              <a:rPr lang="he-IL" dirty="0"/>
-              <a:t>בהמשך מעבר לתגמול החודשי רעיונות לשיפור והוספת מוצרים </a:t>
-            </a:r>
-          </a:p>
-          <a:p>
-            <a:r>
-              <a:rPr lang="he-IL" dirty="0"/>
-              <a:t>צפיה במצב אישי לפי חודש </a:t>
-            </a:r>
-            <a:r>
-              <a:rPr lang="en-US" dirty="0"/>
-              <a:t>/</a:t>
-            </a:r>
-            <a:r>
-              <a:rPr lang="he-IL" dirty="0"/>
-              <a:t> שנה וכו'</a:t>
-            </a:r>
+              <a:t>צפיה בכל ההודעות של התלמידה </a:t>
+            </a:r>
+          </a:p>
+          <a:p>
+            <a:pPr marL="457200" lvl="1" indent="0">
+              <a:buNone/>
+            </a:pPr>
+            <a:endParaRPr lang="he-IL" dirty="0"/>
           </a:p>
         </p:txBody>
       </p:sp>
     </p:spTree>
     <p:extLst>
       <p:ext uri="{BB962C8B-B14F-4D97-AF65-F5344CB8AC3E}">
-        <p14:creationId xmlns:p14="http://schemas.microsoft.com/office/powerpoint/2010/main" val="3078501909"/>
+        <p14:creationId xmlns:p14="http://schemas.microsoft.com/office/powerpoint/2010/main" val="3673423025"/>
       </p:ext>
     </p:extLst>
   </p:cSld>
@@ -8455,7 +8052,7 @@
           <p:cNvPr id="2" name="כותרת 1">
             <a:extLst>
               <a:ext uri="{FF2B5EF4-FFF2-40B4-BE49-F238E27FC236}">
-                <a16:creationId xmlns:a16="http://schemas.microsoft.com/office/drawing/2014/main" id="{2D483F29-B6D7-02F2-1921-797F5A338BB5}"/>
+                <a16:creationId xmlns:a16="http://schemas.microsoft.com/office/drawing/2014/main" id="{ADFF9E9E-F405-86BC-1468-7D404F7565E9}"/>
               </a:ext>
             </a:extLst>
           </p:cNvPr>
@@ -8473,7 +8070,7 @@
           <a:p>
             <a:r>
               <a:rPr lang="he-IL" dirty="0"/>
-              <a:t>כניסת תלמידות - הקיוסק</a:t>
+              <a:t>כניסת תלמידות </a:t>
             </a:r>
           </a:p>
         </p:txBody>
@@ -8483,7 +8080,7 @@
           <p:cNvPr id="3" name="מציין מיקום תוכן 2">
             <a:extLst>
               <a:ext uri="{FF2B5EF4-FFF2-40B4-BE49-F238E27FC236}">
-                <a16:creationId xmlns:a16="http://schemas.microsoft.com/office/drawing/2014/main" id="{927EFC5C-B47B-DA8D-7FD5-B0C87E4C5790}"/>
+                <a16:creationId xmlns:a16="http://schemas.microsoft.com/office/drawing/2014/main" id="{5F07FC5C-CB96-44F9-D20C-6FF4E0A2F4CF}"/>
               </a:ext>
             </a:extLst>
           </p:cNvPr>
@@ -8496,48 +8093,91 @@
         </p:nvSpPr>
         <p:spPr/>
         <p:txBody>
-          <a:bodyPr/>
+          <a:bodyPr>
+            <a:normAutofit fontScale="70000" lnSpcReduction="20000"/>
+          </a:bodyPr>
           <a:lstStyle/>
           <a:p>
             <a:r>
               <a:rPr lang="he-IL" dirty="0"/>
-              <a:t>צפיה בכל המוצרים </a:t>
+              <a:t>שם, כיתה, פרשה, נאם היא מצטיינת שבוע </a:t>
             </a:r>
           </a:p>
           <a:p>
             <a:r>
               <a:rPr lang="he-IL" dirty="0"/>
-              <a:t>אפשרויות סינון על פי קטגוריות</a:t>
+              <a:t>מספר נקודות שצברתי השבוע </a:t>
             </a:r>
           </a:p>
           <a:p>
             <a:r>
               <a:rPr lang="he-IL" dirty="0"/>
-              <a:t>אפשרויות סינון על פי המוצרים החדשים ביותר, הנמכרים ביותר ועוד </a:t>
+              <a:t>האם קיבלתי שובר </a:t>
             </a:r>
           </a:p>
           <a:p>
             <a:r>
               <a:rPr lang="he-IL" dirty="0"/>
-              <a:t>לחיצה על מוצר עוברת למסך מוצר </a:t>
-            </a:r>
-          </a:p>
-          <a:p>
+              <a:t>מספר שוברים סך </a:t>
+            </a:r>
+            <a:r>
+              <a:rPr lang="he-IL" dirty="0" err="1"/>
+              <a:t>הכל</a:t>
+            </a:r>
             <a:r>
               <a:rPr lang="he-IL" dirty="0"/>
-              <a:t>אפשרות למעבר לסל הקניות </a:t>
+              <a:t> למימוש </a:t>
             </a:r>
           </a:p>
           <a:p>
             <a:r>
               <a:rPr lang="he-IL" dirty="0"/>
-              <a:t>אפשרות למעבר לתשלום </a:t>
+              <a:t>האם קיבלתי תעודת הצטיינות </a:t>
             </a:r>
           </a:p>
           <a:p>
             <a:r>
               <a:rPr lang="he-IL" dirty="0"/>
-              <a:t>אפשרות חזרה לפרופיל </a:t>
+              <a:t>מפת הדרך להצטיינות חודשית </a:t>
+            </a:r>
+          </a:p>
+          <a:p>
+            <a:r>
+              <a:rPr lang="he-IL" dirty="0"/>
+              <a:t>כפתור שליחת הודעות לצוות ניהול על רעיונות חדשים</a:t>
+            </a:r>
+          </a:p>
+          <a:p>
+            <a:r>
+              <a:rPr lang="he-IL" dirty="0"/>
+              <a:t>גרפים/היסטוריה 	</a:t>
+            </a:r>
+          </a:p>
+          <a:p>
+            <a:pPr lvl="1"/>
+            <a:r>
+              <a:rPr lang="he-IL" dirty="0"/>
+              <a:t>גרף עוגה - פילוח באחוזים של הצטיינות שבועית - ז"א שבועות שהצטיינתי ביחס לכל השבועות בשנה עד כה</a:t>
+            </a:r>
+          </a:p>
+          <a:p>
+            <a:pPr lvl="1"/>
+            <a:r>
+              <a:rPr lang="he-IL" dirty="0"/>
+              <a:t>גרף עמודות - מציין את כמות הנקודות שהתלמידה צברה מתחילת שנה - כל שבוע יש נקודה ויהיה מודגש בגרף הסף של הנקודות שמשם מוגדרת כמצטיינת, אם הייתה מצטיינת שבוע סימון וכתוב את כמות השוברים שקיבלה ותעודת הצטיינות אם קיבלה</a:t>
+            </a:r>
+          </a:p>
+          <a:p>
+            <a:r>
+              <a:rPr lang="he-IL" dirty="0"/>
+              <a:t>הודעות מצוות</a:t>
+            </a:r>
+          </a:p>
+          <a:p>
+            <a:pPr lvl="1"/>
+            <a:r>
+              <a:rPr lang="he-IL" dirty="0"/>
+              <a:t>צפיה בכל ההודעות של הצוות, הודעות חדשות (מהשבוע הנוכחי) מופיעות במודגש</a:t>
             </a:r>
           </a:p>
         </p:txBody>
@@ -8545,7 +8185,7 @@
     </p:spTree>
     <p:extLst>
       <p:ext uri="{BB962C8B-B14F-4D97-AF65-F5344CB8AC3E}">
-        <p14:creationId xmlns:p14="http://schemas.microsoft.com/office/powerpoint/2010/main" val="567978253"/>
+        <p14:creationId xmlns:p14="http://schemas.microsoft.com/office/powerpoint/2010/main" val="2769476378"/>
       </p:ext>
     </p:extLst>
   </p:cSld>
@@ -8577,7 +8217,7 @@
           <p:cNvPr id="2" name="כותרת 1">
             <a:extLst>
               <a:ext uri="{FF2B5EF4-FFF2-40B4-BE49-F238E27FC236}">
-                <a16:creationId xmlns:a16="http://schemas.microsoft.com/office/drawing/2014/main" id="{3D5F06B6-05D2-971C-3551-9BDBBEF4B860}"/>
+                <a16:creationId xmlns:a16="http://schemas.microsoft.com/office/drawing/2014/main" id="{89A99409-B62F-F01A-E367-EA12225A1331}"/>
               </a:ext>
             </a:extLst>
           </p:cNvPr>
@@ -8595,7 +8235,7 @@
           <a:p>
             <a:r>
               <a:rPr lang="he-IL" dirty="0"/>
-              <a:t>כניסת תלמידות – עמוד מוצר</a:t>
+              <a:t>כניסת מנהלת אתר – צוות ניהולי </a:t>
             </a:r>
           </a:p>
         </p:txBody>
@@ -8605,7 +8245,7 @@
           <p:cNvPr id="3" name="מציין מיקום תוכן 2">
             <a:extLst>
               <a:ext uri="{FF2B5EF4-FFF2-40B4-BE49-F238E27FC236}">
-                <a16:creationId xmlns:a16="http://schemas.microsoft.com/office/drawing/2014/main" id="{A689539C-3472-9018-7A08-17CC6D7DDEBE}"/>
+                <a16:creationId xmlns:a16="http://schemas.microsoft.com/office/drawing/2014/main" id="{60325346-9797-A151-A805-E4B6F8D7BBAB}"/>
               </a:ext>
             </a:extLst>
           </p:cNvPr>
@@ -8623,33 +8263,21 @@
           <a:p>
             <a:r>
               <a:rPr lang="he-IL" dirty="0"/>
-              <a:t>פרטי המוצר והתמונה בגדול </a:t>
+              <a:t>יתבצע בשלב עתידי </a:t>
             </a:r>
           </a:p>
           <a:p>
             <a:r>
               <a:rPr lang="he-IL" dirty="0"/>
-              <a:t>אפשרות להוספה לסל הקניות </a:t>
-            </a:r>
-          </a:p>
-          <a:p>
-            <a:r>
-              <a:rPr lang="he-IL" dirty="0"/>
-              <a:t>אפשרות לחזרה לעמוד הקיוסק </a:t>
-            </a:r>
-          </a:p>
-          <a:p>
-            <a:pPr marL="0" indent="0">
-              <a:buNone/>
-            </a:pPr>
-            <a:endParaRPr lang="he-IL" dirty="0"/>
+              <a:t>הוקמה תשתית לפיתוח עתידני </a:t>
+            </a:r>
           </a:p>
         </p:txBody>
       </p:sp>
     </p:spTree>
     <p:extLst>
       <p:ext uri="{BB962C8B-B14F-4D97-AF65-F5344CB8AC3E}">
-        <p14:creationId xmlns:p14="http://schemas.microsoft.com/office/powerpoint/2010/main" val="2730816063"/>
+        <p14:creationId xmlns:p14="http://schemas.microsoft.com/office/powerpoint/2010/main" val="3570078872"/>
       </p:ext>
     </p:extLst>
   </p:cSld>
@@ -8681,7 +8309,7 @@
           <p:cNvPr id="2" name="כותרת 1">
             <a:extLst>
               <a:ext uri="{FF2B5EF4-FFF2-40B4-BE49-F238E27FC236}">
-                <a16:creationId xmlns:a16="http://schemas.microsoft.com/office/drawing/2014/main" id="{1BDCEDCE-6727-1211-5701-FCA2B4538D89}"/>
+                <a16:creationId xmlns:a16="http://schemas.microsoft.com/office/drawing/2014/main" id="{2D483F29-B6D7-02F2-1921-797F5A338BB5}"/>
               </a:ext>
             </a:extLst>
           </p:cNvPr>
@@ -8699,7 +8327,7 @@
           <a:p>
             <a:r>
               <a:rPr lang="he-IL" dirty="0"/>
-              <a:t>כניסת תלמידות – סל הקניות </a:t>
+              <a:t>כניסת תלמידות - הקיוסק</a:t>
             </a:r>
           </a:p>
         </p:txBody>
@@ -8709,7 +8337,7 @@
           <p:cNvPr id="3" name="מציין מיקום תוכן 2">
             <a:extLst>
               <a:ext uri="{FF2B5EF4-FFF2-40B4-BE49-F238E27FC236}">
-                <a16:creationId xmlns:a16="http://schemas.microsoft.com/office/drawing/2014/main" id="{752A6DB4-0556-934E-B85A-7ED3EBB064A7}"/>
+                <a16:creationId xmlns:a16="http://schemas.microsoft.com/office/drawing/2014/main" id="{927EFC5C-B47B-DA8D-7FD5-B0C87E4C5790}"/>
               </a:ext>
             </a:extLst>
           </p:cNvPr>
@@ -8722,47 +8350,58 @@
         </p:nvSpPr>
         <p:spPr/>
         <p:txBody>
-          <a:bodyPr/>
+          <a:bodyPr>
+            <a:normAutofit/>
+          </a:bodyPr>
           <a:lstStyle/>
           <a:p>
             <a:r>
               <a:rPr lang="he-IL" dirty="0"/>
-              <a:t>צפיה בכל הפריטים בסל </a:t>
+              <a:t>צפיה בכל המוצרים </a:t>
             </a:r>
           </a:p>
           <a:p>
             <a:r>
               <a:rPr lang="he-IL" dirty="0"/>
-              <a:t>על כל פריט אפשרות למחוק אותו מהסל</a:t>
+              <a:t>אפשרויות סינון על פי קטגוריות על פי מחיר </a:t>
             </a:r>
           </a:p>
           <a:p>
             <a:r>
               <a:rPr lang="he-IL" dirty="0"/>
-              <a:t>צפיה בכמות השוברים הכללית של הקניה </a:t>
+              <a:t>הדגשה על מוצרים מסוימים שהם החדשים ביותר, הנמכרים ביותר ועוד </a:t>
             </a:r>
           </a:p>
           <a:p>
             <a:r>
               <a:rPr lang="he-IL" dirty="0"/>
-              <a:t>כפתור לסיום הזמנה – בעת לחיצה עליו תוצג הודעת הזהרה "אין החלפות והחזרות כלל!" לחיצה על אישור בהודעת ההזהרה תעדכן את כמות השוברים ותשלח מייל לצוות ניהול על ביצוע הזמנה התלמידה תקבל מספר הזמנה לצורך אימות ההזמנה – זמני בשלב עתידי יותר יהיה ממשק ניהול ולשם ישלחו הזמנות שצריכות טיפול</a:t>
+              <a:t>לכל מוצר כתוב שם מוצר, תיאור, לאיזה קטגוריה שייך, כמה במלאי, מחיר, אפשרות להוספת המוצר לסל </a:t>
             </a:r>
           </a:p>
           <a:p>
             <a:r>
               <a:rPr lang="he-IL" dirty="0"/>
-              <a:t>כפתור לחזרה לעמוד הקיוסק </a:t>
-            </a:r>
-          </a:p>
-          <a:p>
-            <a:endParaRPr lang="he-IL" dirty="0"/>
+              <a:t>אפשרות למעבר לסל הקניות </a:t>
+            </a:r>
+          </a:p>
+          <a:p>
+            <a:r>
+              <a:rPr lang="he-IL" dirty="0"/>
+              <a:t>אפשרות למעבר לתשלום </a:t>
+            </a:r>
+          </a:p>
+          <a:p>
+            <a:r>
+              <a:rPr lang="he-IL" dirty="0"/>
+              <a:t>אפשרות חזרה לפרופיל </a:t>
+            </a:r>
           </a:p>
         </p:txBody>
       </p:sp>
     </p:spTree>
     <p:extLst>
       <p:ext uri="{BB962C8B-B14F-4D97-AF65-F5344CB8AC3E}">
-        <p14:creationId xmlns:p14="http://schemas.microsoft.com/office/powerpoint/2010/main" val="3372685935"/>
+        <p14:creationId xmlns:p14="http://schemas.microsoft.com/office/powerpoint/2010/main" val="567978253"/>
       </p:ext>
     </p:extLst>
   </p:cSld>

</xml_diff>